<commit_message>
Updated recommendation to increase UDP buffer memory
</commit_message>
<xml_diff>
--- a/SCReAM-BW-test-tool.pptx
+++ b/SCReAM-BW-test-tool.pptx
@@ -2662,7 +2662,7 @@
               </a:rPr>
               <a:t>  |  2020-03-20  |  Public  |  Page </a:t>
             </a:r>
-            <a:fld id="{93A976C2-68B9-4E03-B98F-32FE7E7336E2}" type="slidenum">
+            <a:fld id="{B849C92B-C631-4103-B7AA-1E298CC78578}" type="slidenum">
               <a:rPr lang="en-US" sz="800" b="0" i="0" u="none" smtClean="0">
                 <a:solidFill>
                   <a:srgbClr val="1A1816"/>
@@ -3167,7 +3167,7 @@
               </a:rPr>
               <a:t>  |  2020-03-20  |  Public  |  Page </a:t>
             </a:r>
-            <a:fld id="{6FEBC5E3-754B-4924-AFE6-05F207B05342}" type="slidenum">
+            <a:fld id="{77D5EA97-A2DE-40EF-9B81-68CBEA2D742D}" type="slidenum">
               <a:rPr lang="en-US" sz="800" b="0" i="0" u="none" smtClean="0">
                 <a:solidFill>
                   <a:schemeClr val="bg1"/>
@@ -3480,7 +3480,7 @@
               </a:rPr>
               <a:t>  |  2020-03-20  |  Public  |  Page </a:t>
             </a:r>
-            <a:fld id="{BB5A701F-BA32-4A90-9FB8-57072253961C}" type="slidenum">
+            <a:fld id="{50398804-4C5D-4103-AFF7-036B1CFA3AD5}" type="slidenum">
               <a:rPr lang="en-US" sz="800" b="0" i="0" u="none" smtClean="0">
                 <a:solidFill>
                   <a:srgbClr val="1A1816"/>
@@ -3713,7 +3713,7 @@
               </a:rPr>
               <a:t>  |  2020-03-20  |  Public  |  Page </a:t>
             </a:r>
-            <a:fld id="{8C848BBE-9EF6-466B-9162-421630EA19AC}" type="slidenum">
+            <a:fld id="{CBD9B7C3-1AC1-43E2-9B5B-C9A864A6FF95}" type="slidenum">
               <a:rPr lang="en-US" sz="800" b="0" i="0" u="none" smtClean="0">
                 <a:solidFill>
                   <a:srgbClr val="1A1816"/>
@@ -3873,7 +3873,7 @@
               </a:rPr>
               <a:t>  |  2020-03-20  |  Public  |  Page </a:t>
             </a:r>
-            <a:fld id="{A7155596-B371-4E0F-8155-12F3EE7616C0}" type="slidenum">
+            <a:fld id="{97F105E0-6980-44EE-A567-D5FC82ECDA28}" type="slidenum">
               <a:rPr lang="en-US" sz="800" b="0" i="0" u="none" smtClean="0">
                 <a:solidFill>
                   <a:srgbClr val="1A1816"/>
@@ -4079,7 +4079,7 @@
               </a:rPr>
               <a:t>  |  2020-03-20  |  Public  |  Page </a:t>
             </a:r>
-            <a:fld id="{220F0A1E-68E9-4F7A-B18E-B2BDD365EA67}" type="slidenum">
+            <a:fld id="{F18F1E3D-72A5-408F-A0F1-31E4E86A6D5A}" type="slidenum">
               <a:rPr lang="en-US" sz="800" b="0" i="0" u="none" smtClean="0">
                 <a:solidFill>
                   <a:srgbClr val="1A1816"/>
@@ -4377,7 +4377,7 @@
               </a:rPr>
               <a:t>  |  2020-03-20  |  Public  |  Page </a:t>
             </a:r>
-            <a:fld id="{16EF87F7-EDFA-4E75-8B82-6C14EBC0C129}" type="slidenum">
+            <a:fld id="{F3A344D7-E140-45D8-86C2-652F19DFB39C}" type="slidenum">
               <a:rPr lang="en-US" sz="800" b="0" i="0" u="none" smtClean="0">
                 <a:solidFill>
                   <a:schemeClr val="bg1"/>
@@ -4675,7 +4675,7 @@
               </a:rPr>
               <a:t>  |  2020-03-20  |  Public  |  Page </a:t>
             </a:r>
-            <a:fld id="{D32D34BB-6E7B-455C-A05B-EBD679AF53C6}" type="slidenum">
+            <a:fld id="{C1DF33F2-A8AF-4D4E-8A26-9D061EFE1296}" type="slidenum">
               <a:rPr lang="en-US" sz="800" b="0" i="0" u="none" smtClean="0">
                 <a:solidFill>
                   <a:schemeClr val="bg1"/>
@@ -4973,7 +4973,7 @@
               </a:rPr>
               <a:t>  |  2020-03-20  |  Public  |  Page </a:t>
             </a:r>
-            <a:fld id="{2CC723C2-24D2-4D7A-BDBB-B94E67E7CB70}" type="slidenum">
+            <a:fld id="{03AD1571-7D87-4D8A-83A7-34C5EBA16BB9}" type="slidenum">
               <a:rPr lang="en-US" sz="800" b="0" i="0" u="none" smtClean="0">
                 <a:solidFill>
                   <a:schemeClr val="bg1"/>
@@ -5271,7 +5271,7 @@
               </a:rPr>
               <a:t>  |  2020-03-20  |  Public  |  Page </a:t>
             </a:r>
-            <a:fld id="{013CF3C3-033D-4C5A-AB84-E7C9DD964DD7}" type="slidenum">
+            <a:fld id="{602AD30C-1076-45BC-8849-6D1B11038955}" type="slidenum">
               <a:rPr lang="en-US" sz="800" b="0" i="0" u="none" smtClean="0">
                 <a:solidFill>
                   <a:schemeClr val="bg1"/>
@@ -5569,7 +5569,7 @@
               </a:rPr>
               <a:t>  |  2020-03-20  |  Public  |  Page </a:t>
             </a:r>
-            <a:fld id="{31BD8FB7-3349-4A89-8635-128F48613FDB}" type="slidenum">
+            <a:fld id="{5DB1953B-BFE4-4826-A3CB-997209D755BE}" type="slidenum">
               <a:rPr lang="en-US" sz="800" b="0" i="0" u="none" smtClean="0">
                 <a:solidFill>
                   <a:schemeClr val="bg1"/>
@@ -6083,7 +6083,7 @@
               </a:rPr>
               <a:t>  |  2020-03-20  |  Public  |  Page </a:t>
             </a:r>
-            <a:fld id="{F1B0602B-D3DE-4B6B-A758-37549524B3B2}" type="slidenum">
+            <a:fld id="{137A0126-ABE1-4FD0-8BAD-DA24E022C725}" type="slidenum">
               <a:rPr lang="en-US" sz="800" b="0" i="0" u="none" smtClean="0">
                 <a:solidFill>
                   <a:schemeClr val="bg1"/>
@@ -6387,7 +6387,7 @@
               </a:rPr>
               <a:t>  |  2020-03-20  |  Public  |  Page </a:t>
             </a:r>
-            <a:fld id="{DCC99C9F-FD59-430B-90FC-69CDFC23204D}" type="slidenum">
+            <a:fld id="{D8C2E545-C9C7-44B6-85FD-B8873F36AEA8}" type="slidenum">
               <a:rPr lang="en-US" sz="800" b="0" i="0" u="none" smtClean="0">
                 <a:solidFill>
                   <a:schemeClr val="bg1"/>
@@ -6685,7 +6685,7 @@
               </a:rPr>
               <a:t>  |  2020-03-20  |  Public  |  Page </a:t>
             </a:r>
-            <a:fld id="{44E1A52B-8C6E-44F8-B413-0FB5C6537438}" type="slidenum">
+            <a:fld id="{B6276A48-5259-42AF-AB50-E62A98016126}" type="slidenum">
               <a:rPr lang="en-US" sz="800" b="0" i="0" u="none" smtClean="0">
                 <a:solidFill>
                   <a:schemeClr val="bg1"/>
@@ -6972,7 +6972,7 @@
               </a:rPr>
               <a:t>  |  2020-03-20  |  Public  |  Page </a:t>
             </a:r>
-            <a:fld id="{518AA979-339A-43D5-9F95-0C31CCE8E79A}" type="slidenum">
+            <a:fld id="{EEB19463-FEE3-4E86-BDD1-558B1147D8B5}" type="slidenum">
               <a:rPr lang="en-US" sz="800" b="0" i="0" u="none" smtClean="0">
                 <a:solidFill>
                   <a:srgbClr val="1A1816"/>
@@ -7259,7 +7259,7 @@
               </a:rPr>
               <a:t>  |  2020-03-20  |  Public  |  Page </a:t>
             </a:r>
-            <a:fld id="{095648FC-EC08-4E32-9880-D134EB76D408}" type="slidenum">
+            <a:fld id="{571F911B-7FB4-4CF9-852E-AD79B30E3159}" type="slidenum">
               <a:rPr lang="en-US" sz="800" b="0" i="0" u="none" smtClean="0">
                 <a:solidFill>
                   <a:srgbClr val="1A1816"/>
@@ -7552,7 +7552,7 @@
               </a:rPr>
               <a:t>  |  2020-03-20  |  Public  |  Page </a:t>
             </a:r>
-            <a:fld id="{16478756-113A-4412-B85D-017F39896EA6}" type="slidenum">
+            <a:fld id="{8E63B24A-DE33-4AB3-93E6-DA720A7874AB}" type="slidenum">
               <a:rPr lang="en-US" sz="800" b="0" i="0" u="none" smtClean="0">
                 <a:solidFill>
                   <a:srgbClr val="1A1816"/>
@@ -7839,7 +7839,7 @@
               </a:rPr>
               <a:t>  |  2020-03-20  |  Public  |  Page </a:t>
             </a:r>
-            <a:fld id="{9D4DF839-D999-4312-A62F-3D0EDFCA8708}" type="slidenum">
+            <a:fld id="{74F82E6E-1B8E-4FAD-92C2-943CECE3B610}" type="slidenum">
               <a:rPr lang="en-US" sz="800" b="0" i="0" u="none" smtClean="0">
                 <a:solidFill>
                   <a:srgbClr val="1A1816"/>
@@ -8161,7 +8161,7 @@
               </a:rPr>
               <a:t>  |  2020-03-20  |  Public  |  Page </a:t>
             </a:r>
-            <a:fld id="{74D2E6DC-3BC0-4720-B5F8-49D5C85A891D}" type="slidenum">
+            <a:fld id="{4EB63AFF-E5C1-4824-AB8F-F668FF09F25F}" type="slidenum">
               <a:rPr lang="en-US" sz="800" b="0" i="0" u="none" smtClean="0">
                 <a:solidFill>
                   <a:srgbClr val="1A1816"/>
@@ -8448,7 +8448,7 @@
               </a:rPr>
               <a:t>  |  2020-03-20  |  Public  |  Page </a:t>
             </a:r>
-            <a:fld id="{4014188B-5817-4D95-AF86-E652111A53D5}" type="slidenum">
+            <a:fld id="{C5E3D660-1812-4704-A7AA-F1AC7067D239}" type="slidenum">
               <a:rPr lang="en-US" sz="800" b="0" i="0" u="none" smtClean="0">
                 <a:solidFill>
                   <a:srgbClr val="1A1816"/>
@@ -8770,7 +8770,7 @@
               </a:rPr>
               <a:t>  |  2020-03-20  |  Public  |  Page </a:t>
             </a:r>
-            <a:fld id="{72DB256C-78AF-4012-A243-1A848EA80FFF}" type="slidenum">
+            <a:fld id="{667DC38F-369A-4EAC-A358-CB57A58010A2}" type="slidenum">
               <a:rPr lang="en-US" sz="800" b="0" i="0" u="none" smtClean="0">
                 <a:solidFill>
                   <a:srgbClr val="1A1816"/>
@@ -9132,7 +9132,7 @@
               </a:rPr>
               <a:t>  |  2020-03-20  |  Public  |  Page </a:t>
             </a:r>
-            <a:fld id="{013C2E00-263A-4036-8E41-B44AFD6DE070}" type="slidenum">
+            <a:fld id="{6E4B486C-B391-432E-9E54-F54CB0C6A3EE}" type="slidenum">
               <a:rPr lang="en-US" sz="800" b="0" i="0" u="none" smtClean="0">
                 <a:solidFill>
                   <a:srgbClr val="1A1816"/>
@@ -9474,7 +9474,7 @@
               </a:rPr>
               <a:t>  |  2020-03-20  |  Public  |  Page </a:t>
             </a:r>
-            <a:fld id="{524A8A03-9B2D-46A6-8B30-7A946FE0F7CF}" type="slidenum">
+            <a:fld id="{ABE7F858-8ADC-443A-913F-8080DAEE886D}" type="slidenum">
               <a:rPr lang="en-US" sz="800" b="0" i="0" u="none" smtClean="0">
                 <a:solidFill>
                   <a:srgbClr val="1A1816"/>
@@ -9823,7 +9823,7 @@
               </a:rPr>
               <a:t>  |  2020-03-20  |  Public  |  Page </a:t>
             </a:r>
-            <a:fld id="{101EA80E-6C5B-4785-9218-22CAF260C032}" type="slidenum">
+            <a:fld id="{D4A0F904-5CB4-4C05-8535-A5D2D625AA33}" type="slidenum">
               <a:rPr lang="en-US" sz="800" b="0" i="0" u="none" smtClean="0">
                 <a:solidFill>
                   <a:srgbClr val="1A1816"/>
@@ -10185,7 +10185,7 @@
               </a:rPr>
               <a:t>  |  2020-03-20  |  Public  |  Page </a:t>
             </a:r>
-            <a:fld id="{B9F699AC-D438-4647-A5B0-0F64FF047309}" type="slidenum">
+            <a:fld id="{DB6CAACE-F71E-49E2-BAC1-EC2FBAD70CE6}" type="slidenum">
               <a:rPr lang="en-US" sz="800" b="0" i="0" u="none" smtClean="0">
                 <a:solidFill>
                   <a:srgbClr val="1A1816"/>
@@ -10547,7 +10547,7 @@
               </a:rPr>
               <a:t>  |  2020-03-20  |  Public  |  Page </a:t>
             </a:r>
-            <a:fld id="{BEE87B68-D69C-49E7-A0CA-7F2384F15F9A}" type="slidenum">
+            <a:fld id="{0114785F-AF2A-49A4-8E2B-3B49340E5F15}" type="slidenum">
               <a:rPr lang="en-US" sz="800" b="0" i="0" u="none" smtClean="0">
                 <a:solidFill>
                   <a:srgbClr val="1A1816"/>
@@ -10909,7 +10909,7 @@
               </a:rPr>
               <a:t>  |  2020-03-20  |  Public  |  Page </a:t>
             </a:r>
-            <a:fld id="{6250B935-A7B1-4569-AB65-040AB88A9A05}" type="slidenum">
+            <a:fld id="{55E5BFBC-11AD-48EE-BFD4-19AFA73F0539}" type="slidenum">
               <a:rPr lang="en-US" sz="800" b="0" i="0" u="none" smtClean="0">
                 <a:solidFill>
                   <a:srgbClr val="1A1816"/>
@@ -11271,7 +11271,7 @@
               </a:rPr>
               <a:t>  |  2020-03-20  |  Public  |  Page </a:t>
             </a:r>
-            <a:fld id="{C8481C84-9DE6-4A79-B2E3-F7F76A1B0745}" type="slidenum">
+            <a:fld id="{D14D63D1-EBB8-4BB5-B7D6-2CEE2463770E}" type="slidenum">
               <a:rPr lang="en-US" sz="800" b="0" i="0" u="none" smtClean="0">
                 <a:solidFill>
                   <a:srgbClr val="1A1816"/>
@@ -11693,7 +11693,7 @@
               </a:rPr>
               <a:t>  |  2020-03-20  |  Public  |  Page </a:t>
             </a:r>
-            <a:fld id="{40B0A48A-2D1E-45F4-87F5-7764B9CE1CCA}" type="slidenum">
+            <a:fld id="{E33B1299-0F24-425A-AAAD-0DD2BF30E801}" type="slidenum">
               <a:rPr lang="en-US" sz="800" b="0" i="0" u="none" smtClean="0">
                 <a:solidFill>
                   <a:srgbClr val="1A1816"/>
@@ -12109,7 +12109,7 @@
               </a:rPr>
               <a:t>  |  2020-03-20  |  Public  |  Page </a:t>
             </a:r>
-            <a:fld id="{26BAC0FA-FE2D-448B-86B6-1614A4E2574F}" type="slidenum">
+            <a:fld id="{7C72E3A8-D170-4393-BF72-731DF97AA157}" type="slidenum">
               <a:rPr lang="en-US" sz="800" b="0" i="0" u="none" smtClean="0">
                 <a:solidFill>
                   <a:srgbClr val="1A1816"/>
@@ -12584,7 +12584,7 @@
               </a:rPr>
               <a:t>  |  2020-03-20  |  Public  |  Page </a:t>
             </a:r>
-            <a:fld id="{5F29BF83-2E54-4C39-8A7A-A386F9BCDBA9}" type="slidenum">
+            <a:fld id="{19189E6B-F555-43A7-A1F3-39A3C0B2DEF3}" type="slidenum">
               <a:rPr lang="en-US" sz="800" b="0" i="0" u="none" smtClean="0">
                 <a:solidFill>
                   <a:srgbClr val="1A1816"/>
@@ -13079,7 +13079,7 @@
               </a:rPr>
               <a:t>  |  2020-03-20  |  Public  |  Page </a:t>
             </a:r>
-            <a:fld id="{F12E475D-DDD8-48A1-A39A-2350CC0E5DF5}" type="slidenum">
+            <a:fld id="{4004E49C-63DB-4DFD-A1D9-DDFC2325BA2C}" type="slidenum">
               <a:rPr lang="en-US" sz="800" b="0" i="0" u="none" smtClean="0">
                 <a:solidFill>
                   <a:srgbClr val="1A1816"/>
@@ -13535,7 +13535,7 @@
               </a:rPr>
               <a:t>  |  2020-03-20  |  Public  |  Page </a:t>
             </a:r>
-            <a:fld id="{538EF37F-E7AC-4346-8AE1-2AF25A982090}" type="slidenum">
+            <a:fld id="{BF083321-627B-4265-8C13-C6B49D98ADC5}" type="slidenum">
               <a:rPr lang="en-US" sz="800" b="0" i="0" u="none" smtClean="0">
                 <a:solidFill>
                   <a:srgbClr val="1A1816"/>
@@ -13923,7 +13923,7 @@
               </a:rPr>
               <a:t>  |  2020-03-20  |  Public  |  Page </a:t>
             </a:r>
-            <a:fld id="{14D73CBF-1DB9-45A4-ABC5-F94CDE045F7C}" type="slidenum">
+            <a:fld id="{8B105E84-BECC-44A9-A8D7-267ADEB50956}" type="slidenum">
               <a:rPr lang="en-US" sz="800" b="0" i="0" u="none" smtClean="0">
                 <a:solidFill>
                   <a:schemeClr val="bg1"/>
@@ -14442,7 +14442,7 @@
               </a:rPr>
               <a:t>  |  2020-03-20  |  Public  |  Page </a:t>
             </a:r>
-            <a:fld id="{465E82EE-086D-4BE1-982D-9A5149876B09}" type="slidenum">
+            <a:fld id="{72C5D54A-5402-4699-A59A-D31CE83AB105}" type="slidenum">
               <a:rPr lang="en-US" sz="800" b="0" i="0" u="none" smtClean="0">
                 <a:solidFill>
                   <a:srgbClr val="1A1816"/>
@@ -15151,7 +15151,7 @@
               </a:rPr>
               <a:t>  |  2020-03-20  |  Public  |  Page </a:t>
             </a:r>
-            <a:fld id="{0B924549-DEE7-453A-9CAE-C3C4C40BB056}" type="slidenum">
+            <a:fld id="{0AE1781E-3F1C-4727-976C-8770CCEB5AE9}" type="slidenum">
               <a:rPr lang="en-US" sz="800" b="0" i="0" u="none" smtClean="0">
                 <a:solidFill>
                   <a:srgbClr val="1A1816"/>
@@ -16630,7 +16630,7 @@
               </a:rPr>
               <a:t>  |  2020-03-20  |  Public  |  Page </a:t>
             </a:r>
-            <a:fld id="{8361465D-C9BF-49D3-BF02-29708BF463F8}" type="slidenum">
+            <a:fld id="{87213B4E-646C-49D3-AD78-20EE867D3095}" type="slidenum">
               <a:rPr lang="en-US" sz="800" b="0" i="0" u="none" smtClean="0">
                 <a:solidFill>
                   <a:schemeClr val="bg1"/>
@@ -17142,7 +17142,7 @@
               </a:rPr>
               <a:t>  |  2020-03-20  |  Public  |  Page </a:t>
             </a:r>
-            <a:fld id="{F4179AF7-165F-4EE5-9D6F-070F399679D3}" type="slidenum">
+            <a:fld id="{C6DB5963-8A66-43FA-8862-A8E2E26DAA38}" type="slidenum">
               <a:rPr lang="en-US" sz="800" b="0" i="0" u="none" smtClean="0">
                 <a:solidFill>
                   <a:schemeClr val="bg1"/>
@@ -17537,7 +17537,7 @@
               </a:rPr>
               <a:t>  |  2020-03-20  |  Public  |  Page </a:t>
             </a:r>
-            <a:fld id="{5ABFF242-CA7F-4F62-B758-6848D004AFE0}" type="slidenum">
+            <a:fld id="{4BDDCC84-0CAA-4E47-9774-EBE289499824}" type="slidenum">
               <a:rPr lang="en-US" sz="800" b="0" i="0" u="none" smtClean="0">
                 <a:solidFill>
                   <a:schemeClr val="bg1"/>
@@ -18037,7 +18037,7 @@
               </a:rPr>
               <a:t>  |  2020-03-20  |  Public  |  Page </a:t>
             </a:r>
-            <a:fld id="{5350E911-A6AF-4B4F-9DFC-51AD57EF76CA}" type="slidenum">
+            <a:fld id="{E60230CB-7453-4B09-A701-DEACBA045902}" type="slidenum">
               <a:rPr lang="en-US" sz="800" b="0" i="0" u="none" smtClean="0">
                 <a:solidFill>
                   <a:schemeClr val="bg1"/>
@@ -18537,7 +18537,7 @@
               </a:rPr>
               <a:t>  |  2020-03-20  |  Public  |  Page </a:t>
             </a:r>
-            <a:fld id="{083A4796-3AD7-49F3-A86A-C04412CC197B}" type="slidenum">
+            <a:fld id="{A6C6540A-88A4-4E66-B7CA-67D5A32328A8}" type="slidenum">
               <a:rPr lang="en-US" sz="800" b="0" i="0" u="none" smtClean="0">
                 <a:solidFill>
                   <a:schemeClr val="bg1"/>
@@ -19546,7 +19546,7 @@
             </a:br>
             <a:r>
               <a:rPr lang="en-US" sz="5400" dirty="0"/>
-              <a:t>2020-06-25</a:t>
+              <a:t>2020-07-03</a:t>
             </a:r>
           </a:p>
         </p:txBody>
@@ -21473,12 +21473,8 @@
           </a:p>
           <a:p>
             <a:r>
-              <a:rPr lang="en-US" sz="2400"/>
-              <a:t>UDP </a:t>
-            </a:r>
-            <a:r>
               <a:rPr lang="en-US" sz="2400" dirty="0"/>
-              <a:t>sockets may need more memory at high bitrates to avoid packet loss </a:t>
+              <a:t>UDP sockets may need more memory at high bitrates to avoid packet loss </a:t>
             </a:r>
           </a:p>
           <a:p>
@@ -21528,7 +21524,9 @@
             <a:endParaRPr lang="en-US" sz="1800" dirty="0"/>
           </a:p>
           <a:p>
-            <a:pPr lvl="1"/>
+            <a:pPr marL="183600" lvl="1" indent="0">
+              <a:buNone/>
+            </a:pPr>
             <a:endParaRPr lang="en-US" sz="1600" dirty="0"/>
           </a:p>
           <a:p>
@@ -21743,6 +21741,155 @@
             <a:r>
               <a:rPr lang="en-US" dirty="0"/>
               <a:t>Other</a:t>
+            </a:r>
+          </a:p>
+        </p:txBody>
+      </p:sp>
+      <p:sp>
+        <p:nvSpPr>
+          <p:cNvPr id="3" name="TextBox 2">
+            <a:extLst>
+              <a:ext uri="{FF2B5EF4-FFF2-40B4-BE49-F238E27FC236}">
+                <a16:creationId xmlns:a16="http://schemas.microsoft.com/office/drawing/2014/main" id="{2B1AD6D8-1A3A-4D25-9461-58AB4B9CA23A}"/>
+              </a:ext>
+            </a:extLst>
+          </p:cNvPr>
+          <p:cNvSpPr txBox="1"/>
+          <p:nvPr/>
+        </p:nvSpPr>
+        <p:spPr>
+          <a:xfrm>
+            <a:off x="937260" y="5798820"/>
+            <a:ext cx="2827020" cy="830580"/>
+          </a:xfrm>
+          <a:prstGeom prst="rect">
+            <a:avLst/>
+          </a:prstGeom>
+          <a:ln w="57150">
+            <a:solidFill>
+              <a:schemeClr val="accent1"/>
+            </a:solidFill>
+          </a:ln>
+        </p:spPr>
+        <p:txBody>
+          <a:bodyPr vert="horz" wrap="none" lIns="72000" tIns="36000" rIns="72000" bIns="36000" rtlCol="0" anchor="t">
+            <a:noAutofit/>
+          </a:bodyPr>
+          <a:lstStyle/>
+          <a:p>
+            <a:pPr marL="0" indent="0">
+              <a:buNone/>
+            </a:pPr>
+            <a:r>
+              <a:rPr lang="en-US" sz="1000" dirty="0" err="1"/>
+              <a:t>sudo</a:t>
+            </a:r>
+            <a:r>
+              <a:rPr lang="en-US" sz="1000" dirty="0"/>
+              <a:t> </a:t>
+            </a:r>
+            <a:r>
+              <a:rPr lang="en-US" sz="1000" dirty="0" err="1"/>
+              <a:t>sysctl</a:t>
+            </a:r>
+            <a:r>
+              <a:rPr lang="en-US" sz="1000" dirty="0"/>
+              <a:t> -w </a:t>
+            </a:r>
+            <a:r>
+              <a:rPr lang="en-US" sz="1000" dirty="0" err="1"/>
+              <a:t>net.core.wmem_max</a:t>
+            </a:r>
+            <a:r>
+              <a:rPr lang="en-US" sz="1000" dirty="0"/>
+              <a:t>=26214400</a:t>
+            </a:r>
+          </a:p>
+          <a:p>
+            <a:pPr marL="0" indent="0">
+              <a:buNone/>
+            </a:pPr>
+            <a:r>
+              <a:rPr lang="en-US" sz="1000" dirty="0" err="1"/>
+              <a:t>sudo</a:t>
+            </a:r>
+            <a:r>
+              <a:rPr lang="en-US" sz="1000" dirty="0"/>
+              <a:t> </a:t>
+            </a:r>
+            <a:r>
+              <a:rPr lang="en-US" sz="1000" dirty="0" err="1"/>
+              <a:t>sysctl</a:t>
+            </a:r>
+            <a:r>
+              <a:rPr lang="en-US" sz="1000" dirty="0"/>
+              <a:t> -w </a:t>
+            </a:r>
+            <a:r>
+              <a:rPr lang="en-US" sz="1000" dirty="0" err="1"/>
+              <a:t>net.core.wmem_default</a:t>
+            </a:r>
+            <a:r>
+              <a:rPr lang="en-US" sz="1000" dirty="0"/>
+              <a:t>=26214400</a:t>
+            </a:r>
+          </a:p>
+          <a:p>
+            <a:pPr marL="0" indent="0">
+              <a:buNone/>
+            </a:pPr>
+            <a:r>
+              <a:rPr lang="en-US" sz="1000" dirty="0" err="1"/>
+              <a:t>sudo</a:t>
+            </a:r>
+            <a:r>
+              <a:rPr lang="en-US" sz="1000" dirty="0"/>
+              <a:t> </a:t>
+            </a:r>
+            <a:r>
+              <a:rPr lang="en-US" sz="1000" dirty="0" err="1"/>
+              <a:t>sysctl</a:t>
+            </a:r>
+            <a:r>
+              <a:rPr lang="en-US" sz="1000" dirty="0"/>
+              <a:t> -w </a:t>
+            </a:r>
+            <a:r>
+              <a:rPr lang="en-US" sz="1000" dirty="0" err="1"/>
+              <a:t>net.core.rmem_max</a:t>
+            </a:r>
+            <a:r>
+              <a:rPr lang="en-US" sz="1000" dirty="0"/>
+              <a:t>=26214400</a:t>
+            </a:r>
+          </a:p>
+          <a:p>
+            <a:pPr marL="0" indent="0">
+              <a:buNone/>
+            </a:pPr>
+            <a:r>
+              <a:rPr lang="en-US" sz="1000" dirty="0" err="1"/>
+              <a:t>sudo</a:t>
+            </a:r>
+            <a:r>
+              <a:rPr lang="en-US" sz="1000" dirty="0"/>
+              <a:t> </a:t>
+            </a:r>
+            <a:r>
+              <a:rPr lang="en-US" sz="1000" dirty="0" err="1"/>
+              <a:t>sysctl</a:t>
+            </a:r>
+            <a:r>
+              <a:rPr lang="en-US" sz="1000" dirty="0"/>
+              <a:t> -w </a:t>
+            </a:r>
+            <a:r>
+              <a:rPr lang="en-US" sz="1000" dirty="0" err="1"/>
+              <a:t>net.core.rmem_default</a:t>
+            </a:r>
+            <a:r>
+              <a:rPr lang="en-US" sz="1000" dirty="0"/>
+              <a:t>=26214400</a:t>
             </a:r>
           </a:p>
         </p:txBody>
@@ -23175,7 +23322,7 @@
           <a:graphicData uri="http://schemas.openxmlformats.org/presentationml/2006/ole">
             <mc:AlternateContent xmlns:mc="http://schemas.openxmlformats.org/markup-compatibility/2006">
               <mc:Choice xmlns:v="urn:schemas-microsoft-com:vml" Requires="v">
-                <p:oleObj spid="_x0000_s1057" name="Visio" r:id="rId5" imgW="2533577" imgH="3257685" progId="Visio.Drawing.11">
+                <p:oleObj spid="_x0000_s1059" name="Visio" r:id="rId5" imgW="2533577" imgH="3257685" progId="Visio.Drawing.11">
                   <p:embed/>
                 </p:oleObj>
               </mc:Choice>
@@ -27349,10 +27496,18 @@
 </file>
 
 <file path=customXml/item1.xml><?xml version="1.0" encoding="utf-8"?>
-<TemplafyFormConfiguration><![CDATA[{"formFields":[{"required":true,"placeholder":"","lines":0,"type":"textBox","name":"DocumentTitle","label":"Document Title","helpTexts":{"prefix":"","postfix":""},"spacing":{},"fullyQualifiedName":"DocumentTitle"},{"dataSource":"Confidentiality","displayColumn":"confidentiality","hideIfNoUserInteractionRequired":false,"distinct":true,"required":true,"autoSelectFirstOption":false,"type":"dropDown","name":"ConfidentialityClass","label":"Confidentiality Class","helpTexts":{"prefix":"","postfix":""},"spacing":{},"fullyQualifiedName":"ConfidentialityClass"},{"dataSource":"External Confidentiality label","displayColumn":"externalConfidentiality","hideIfNoUserInteractionRequired":false,"distinct":true,"required":false,"autoSelectFirstOption":false,"defaultValue":"1","type":"dropDown","name":"ExternalConfidentialityLabel","label":"External Confidentiality label","helpTexts":{"prefix":"","postfix":"If no external confidentiality class then please choose the blank value"},"spacing":{},"fullyQualifiedName":"ExternalConfidentialityLabel"},{"dataSource":"PowerPoint Document Type","column":"documentType","required":false,"placeholder":"","autoSelectFirstOption":false,"type":"comboBox","name":"DocTypePresentation","label":"Document Type Presentation","helpTexts":{"prefix":"","postfix":"If the document type differs from the default value, click on the X to delete and type/choose another type."},"spacing":{},"fullyQualifiedName":"DocTypePresentation"},{"required":false,"placeholder":"","lines":0,"type":"textBox","name":"DocumentNumber","label":"Document Number","helpTexts":{"prefix":"","postfix":""},"spacing":{},"fullyQualifiedName":"DocumentNumber"},{"dataSource":"Language code","displayColumn":"showName","hideIfNoUserInteractionRequired":false,"distinct":true,"required":false,"autoSelectFirstOption":false,"defaultValue":"1","type":"dropDown","name":"LanguageCode","label":"Language Code","helpTexts":{"prefix":"","postfix":"The language code will be appended to the Document No."},"spacing":{},"fullyQualifiedName":"LanguageCode"},{"dataSource":"Revision","column":"revision","required":false,"placeholder":"","autoSelectFirstOption":false,"type":"comboBox","name":"Revision","label":"Revision","helpTexts":{"prefix":"","postfix":""},"spacing":{},"fullyQualifiedName":"Revision"},{"required":false,"type":"datePicker","name":"Date","label":"Date","helpTexts":{"prefix":"","postfix":""},"spacing":{},"fullyQualifiedName":"Date"},{"type":"heading","name":"FooterVisibilityOptions","label":"Footer Visibility Options","helpTexts":{"prefix":"","postfix":""},"spacing":{},"fullyQualifiedName":"FooterVisibilityOptions"},{"dataSource":"PPT FooterVisibility","displayColumn":"templateType","hideIfNoUserInteractionRequired":false,"distinct":true,"required":true,"autoSelectFirstOption":false,"defaultValue":"1","type":"dropDown","name":"TemplateType","label":"Is this a document or presentation?","helpTexts":{"prefix":"","postfix":""},"spacing":{},"fullyQualifiedName":"TemplateType"},{"dataSource":"PPT FooterVisibility","displayColumn":"docTitle_label","hideIfNoUserInteractionRequired":false,"distinct":true,"required":false,"autoSelectFirstOption":true,"filter":{"column":"templateType","otherFieldName":"TemplateType","fullyQualifiedOtherFieldName":"TemplateType","otherFieldColumn":"TemplateType","formReference":"none","operator":"equals"},"type":"dropDown","name":"DocTitle","label":"Show document title in footer?","helpTexts":{"prefix":"","postfix":""},"spacing":{},"fullyQualifiedName":"DocTitle"},{"dataSource":"PPT FooterVisibility","displayColumn":"totalPageNo_text","hideIfNoUserInteractionRequired":false,"distinct":true,"required":false,"autoSelectFirstOption":true,"filter":{"column":"templateType","otherFieldName":"TemplateType","fullyQualifiedOtherFieldName":"TemplateType","otherFieldColumn":"TemplateType","formReference":"none","operator":"equals"},"type":"dropDown","name":"TotalPageNo","label":"Page numbering","helpTexts":{"prefix":"","postfix":""},"spacing":{},"fullyQualifiedName":"TotalPageNo"},{"required":false,"placeholder":"","lines":0,"defaultValue":"{{UserProfile.Prepared}}","type":"textBox","name":"Prepared","label":"Prepared By (Subject Responsible)","helpTexts":{"prefix":"","postfix":""},"spacing":{},"fullyQualifiedName":"Prepared"},{"required":false,"placeholder":"","lines":0,"type":"textBox","name":"ApprovedBy","label":"Approved By (Document Responsible)","helpTexts":{"prefix":"","postfix":""},"spacing":{},"fullyQualifiedName":"ApprovedBy"},{"required":false,"placeholder":"","lines":0,"type":"textBox","name":"Checked","label":"Checked","helpTexts":{"prefix":"","postfix":""},"spacing":{},"fullyQualifiedName":"Checked"},{"required":false,"placeholder":"","lines":0,"type":"textBox","name":"Reference","label":"Reference","helpTexts":{"prefix":"","postfix":""},"spacing":{},"fullyQualifiedName":"Reference"},{"required":false,"placeholder":"","lines":0,"type":"textBox","name":"Keywords","label":"Keywords","helpTexts":{"prefix":"","postfix":""},"spacing":{},"fullyQualifiedName":"Keywords"}],"formDataEntries":[{"name":"DocumentTitle","value":"HfKMJ7wB7KPEWJpFWibMqg=="},{"name":"ConfidentialityClass","value":"cT/FOwTWaPknrhRlNMh4SQ=="},{"name":"ExternalConfidentialityLabel","value":"u2D/MG3wyuAQhkGvE2fPaA=="},{"name":"LanguageCode","value":"5wlu7ZdPxHQj1W0w+yTNSg=="},{"name":"Date","value":"vb48xUhp/+BouvbbBJesXw=="},{"name":"TemplateType","value":"PxVEvJY8nE7m/hY9622Sng=="},{"name":"DocTitle","value":"PxVEvJY8nE7m/hY9622Sng=="},{"name":"TotalPageNo","value":"PxVEvJY8nE7m/hY9622Sng=="},{"name":"Prepared","value":"PqdHBiLjqdpOMxfLUK9Tonaq9XwuinzCFKYJ7RK3+SI="}]}]]></TemplafyFormConfiguration>
+<TemplafySlideFormConfiguration><![CDATA[{"formFields":[],"formDataEntries":[]}]]></TemplafySlideFormConfiguration>
 </file>
 
 <file path=customXml/item10.xml><?xml version="1.0" encoding="utf-8"?>
+<TemplafySlideFormConfiguration><![CDATA[{"formFields":[],"formDataEntries":[]}]]></TemplafySlideFormConfiguration>
+</file>
+
+<file path=customXml/item11.xml><?xml version="1.0" encoding="utf-8"?>
+<TemplafySlideTemplateConfiguration><![CDATA[{"elementsMetadata":[],"documentContentValidatorConfiguration":{"enableDocumentContentValidator":false,"documentContentValidatorVersion":0},"slideId":"637027476704980324","enableDocumentContentUpdater":true,"version":"1.9"}]]></TemplafySlideTemplateConfiguration>
+</file>
+
+<file path=customXml/item12.xml><?xml version="1.0" encoding="utf-8"?>
 <ct:contentTypeSchema xmlns:ct="http://schemas.microsoft.com/office/2006/metadata/contentType" xmlns:ma="http://schemas.microsoft.com/office/2006/metadata/properties/metaAttributes" ct:_="" ma:_="" ma:contentTypeName="Document" ma:contentTypeID="0x0101002C8661F604A9A64C9627B875CBEE0D49" ma:contentTypeVersion="13" ma:contentTypeDescription="Create a new document." ma:contentTypeScope="" ma:versionID="efb89547655977800231d60c8e2388d5">
   <xsd:schema xmlns:xsd="http://www.w3.org/2001/XMLSchema" xmlns:xs="http://www.w3.org/2001/XMLSchema" xmlns:p="http://schemas.microsoft.com/office/2006/metadata/properties" xmlns:ns3="92e1255f-bb7b-4dc9-b051-584cc104eb44" xmlns:ns4="a6550eff-0fc9-443f-8e77-72cbcf778382" targetNamespace="http://schemas.microsoft.com/office/2006/metadata/properties" ma:root="true" ma:fieldsID="5147822fdb6803771ba7305cbc438486" ns3:_="" ns4:_="">
     <xsd:import namespace="92e1255f-bb7b-4dc9-b051-584cc104eb44"/>
@@ -27575,69 +27730,23 @@
 </ct:contentTypeSchema>
 </file>
 
-<file path=customXml/item11.xml><?xml version="1.0" encoding="utf-8"?>
-<TemplafySlideTemplateConfiguration><![CDATA[{"documentContentValidatorConfiguration":{"enableDocumentContentValidator":false,"documentContentValidatorVersion":0},"elementsMetadata":[],"slideId":"637171128435648944","enableDocumentContentUpdater":true,"version":"1.9"}]]></TemplafySlideTemplateConfiguration>
+<file path=customXml/item13.xml><?xml version="1.0" encoding="utf-8"?>
+<TemplafyTemplateConfiguration><![CDATA[{"elementsMetadata":[{"type":"shape","id":"5d67e717-74bf-41a6-8dce-47082e2c1da1","elementConfiguration":{"inheritDimensions":"inheritNone","height":"1.34 cm","binding":"Form.LogoInsertion.Pplogoname","disableUpdates":false,"type":"image"}}],"transformationConfigurations":[{"language":"{{DocumentLanguage}}","disableUpdates":false,"type":"proofingLanguage"},{"propertyName":"FooterText","propertyValue":"true","disableUpdates":false,"type":"customDocumentProperty"},{"propertyName":"SecurityClass","propertyValue":"{{Form.ConfidentialityClass.Confidentiality}}","disableUpdates":false,"type":"customDocumentProperty"},{"propertyName":"ExtConf","propertyValue":"{{Form.ExternalConfidentialityLabel.ExternalConfidentiality}}","disableUpdates":false,"type":"customDocumentProperty"},{"propertyName":"Prepared","propertyValue":"{{Form.Prepared}}","disableUpdates":false,"type":"customDocumentProperty"},{"propertyName":"ApprovedBy","propertyValue":"{{Form.ApprovedBy}}","disableUpdates":false,"type":"customDocumentProperty"},{"propertyName":"DocNo","propertyValue":"{{Form.DocumentNumber}} {{Form.LanguageCode.LanguageCode}}","disableUpdates":false,"type":"customDocumentProperty"},{"propertyName":"Checked","propertyValue":"{{Form.Checked}}","disableUpdates":false,"type":"customDocumentProperty"},{"propertyName":"Date","propertyValue":"{{Form.Date}}","disableUpdates":false,"type":"customDocumentProperty"},{"propertyName":"Reference","propertyValue":"{{Form.Reference}}","disableUpdates":false,"type":"customDocumentProperty"},{"propertyName":"Title","propertyValue":"{{Form.DocumentTitle}}","disableUpdates":false,"type":"customDocumentProperty"},{"propertyName":"Keyword","propertyValue":"{{Form.Keywords}}","disableUpdates":false,"type":"customDocumentProperty"},{"propertyName":"DocumentType","propertyValue":"Presentation2011","disableUpdates":false,"type":"customDocumentProperty"},{"propertyName":"Language","propertyValue":"EnglishUS","disableUpdates":false,"type":"customDocumentProperty"},{"propertyName":"TemplateID","propertyValue":"FALSE","disableUpdates":false,"type":"customDocumentProperty"},{"propertyName":"ConfCtrl","propertyValue":"FALSE","disableUpdates":false,"type":"customDocumentProperty"},{"propertyName":"title","propertyValue":"{{Form.DocumentTitle}}","disableUpdates":false,"type":"documentProperty"},{"propertyName":"keywords","propertyValue":"{{Form.Keywords}}","disableUpdates":false,"type":"documentProperty"},{"propertyName":"creator","propertyValue":"{{Form.Prepared}}","disableUpdates":false,"type":"documentProperty"},{"propertyName":"DocTitle","propertyValue":"{{Form.DocTitle.DocTitle}}","disableUpdates":false,"type":"customDocumentProperty"},{"propertyName":"IsDocument","propertyValue":"{{Form.TemplateType.IsDocument}}","disableUpdates":false,"type":"customDocumentProperty"},{"propertyName":"IsPresentation","propertyValue":"{{Form.TemplateType.IsPresentation}}","disableUpdates":false,"type":"customDocumentProperty"},{"propertyName":"company","propertyValue":"Ericsson","disableUpdates":false,"type":"documentProperty"},{"propertyName":"PageNumberVisible","propertyValue":"{{Form.TotalPageNo.TotalPageNo_value}}","disableUpdates":false,"type":"customDocumentProperty"},{"propertyName":"Revision","propertyValue":"{{Form.Revision}}","disableUpdates":false,"type":"customDocumentProperty"},{"propertyName":"DocType","propertyValue":"{{Form.DocTypePresentation}}","disableUpdates":false,"type":"customDocumentProperty"},{"propertyName":"TemplateVersion","propertyValue":"R2A","disableUpdates":false,"type":"customDocumentProperty"},{"propertyName":"PackageNo","propertyValue":"LXA 119 603","disableUpdates":false,"type":"customDocumentProperty"},{"propertyName":"PackageVersion","propertyValue":"R6B","disableUpdates":false,"type":"customDocumentProperty"},{"propertyName":"TemplateName","propertyValue":"CXC 173 2731/1","disableUpdates":false,"type":"customDocumentProperty"},{"propertyName":"DocName","propertyValue":" ","disableUpdates":false,"type":"customDocumentProperty"},{"propertyName":"description","propertyValue":"{{Form.DocumentNumber}} {{Form.LanguageCode.LanguageCode}}\nRev {{Form.Revision}}","disableUpdates":false,"type":"documentProperty"}],"templateName":"New presentation (Standard landscape)","templateDescription":"","enableDocumentContentUpdater":true,"version":"1.9"}]]></TemplafyTemplateConfiguration>
 </file>
 
-<file path=customXml/item12.xml><?xml version="1.0" encoding="utf-8"?>
-<TemplafySlideTemplateConfiguration><![CDATA[{"documentContentValidatorConfiguration":{"enableDocumentContentValidator":false,"documentContentValidatorVersion":0},"elementsMetadata":[],"slideId":"637037983905221558","enableDocumentContentUpdater":true,"version":"1.9"}]]></TemplafySlideTemplateConfiguration>
+<file path=customXml/item14.xml><?xml version="1.0" encoding="utf-8"?>
+<TemplafySlideTemplateConfiguration><![CDATA[{"documentContentValidatorConfiguration":{"enableDocumentContentValidator":false,"documentContentValidatorVersion":0},"elementsMetadata":[],"slideId":"637171128435180813","enableDocumentContentUpdater":true,"version":"1.9"}]]></TemplafySlideTemplateConfiguration>
 </file>
 
-<file path=customXml/item13.xml><?xml version="1.0" encoding="utf-8"?>
+<file path=customXml/item15.xml><?xml version="1.0" encoding="utf-8"?>
+<TemplafySlideTemplateConfiguration><![CDATA[{"documentContentValidatorConfiguration":{"enableDocumentContentValidator":false,"documentContentValidatorVersion":0},"elementsMetadata":[],"slideId":"637037983905678162","enableDocumentContentUpdater":true,"version":"1.9"}]]></TemplafySlideTemplateConfiguration>
+</file>
+
+<file path=customXml/item16.xml><?xml version="1.0" encoding="utf-8"?>
 <TemplafySlideFormConfiguration><![CDATA[{"formFields":[],"formDataEntries":[]}]]></TemplafySlideFormConfiguration>
 </file>
 
-<file path=customXml/item14.xml><?xml version="1.0" encoding="utf-8"?>
-<TemplafySlideFormConfiguration><![CDATA[{"formFields":[],"formDataEntries":[]}]]></TemplafySlideFormConfiguration>
-</file>
-
-<file path=customXml/item15.xml><?xml version="1.0" encoding="utf-8"?>
-<TemplafySlideTemplateConfiguration><![CDATA[{"elementsMetadata":[],"documentContentValidatorConfiguration":{"enableDocumentContentValidator":false,"documentContentValidatorVersion":0},"slideId":"637027476704980324","enableDocumentContentUpdater":true,"version":"1.9"}]]></TemplafySlideTemplateConfiguration>
-</file>
-
-<file path=customXml/item16.xml><?xml version="1.0" encoding="utf-8"?>
-<TemplafySlideTemplateConfiguration><![CDATA[{"documentContentValidatorConfiguration":{"enableDocumentContentValidator":false,"documentContentValidatorVersion":0},"elementsMetadata":[],"slideId":"637037983905221557","enableDocumentContentUpdater":true,"version":"1.9"}]]></TemplafySlideTemplateConfiguration>
-</file>
-
 <file path=customXml/item17.xml><?xml version="1.0" encoding="utf-8"?>
-<TemplafySlideFormConfiguration><![CDATA[{"formFields":[],"formDataEntries":[]}]]></TemplafySlideFormConfiguration>
-</file>
-
-<file path=customXml/item18.xml><?xml version="1.0" encoding="utf-8"?>
-<TemplafySlideFormConfiguration><![CDATA[{"formFields":[],"formDataEntries":[]}]]></TemplafySlideFormConfiguration>
-</file>
-
-<file path=customXml/item19.xml><?xml version="1.0" encoding="utf-8"?>
-<TemplafyTemplateConfiguration><![CDATA[{"elementsMetadata":[{"type":"shape","id":"5d67e717-74bf-41a6-8dce-47082e2c1da1","elementConfiguration":{"inheritDimensions":"inheritNone","height":"1.34 cm","binding":"Form.LogoInsertion.Pplogoname","disableUpdates":false,"type":"image"}}],"transformationConfigurations":[{"language":"{{DocumentLanguage}}","disableUpdates":false,"type":"proofingLanguage"},{"propertyName":"FooterText","propertyValue":"true","disableUpdates":false,"type":"customDocumentProperty"},{"propertyName":"SecurityClass","propertyValue":"{{Form.ConfidentialityClass.Confidentiality}}","disableUpdates":false,"type":"customDocumentProperty"},{"propertyName":"ExtConf","propertyValue":"{{Form.ExternalConfidentialityLabel.ExternalConfidentiality}}","disableUpdates":false,"type":"customDocumentProperty"},{"propertyName":"Prepared","propertyValue":"{{Form.Prepared}}","disableUpdates":false,"type":"customDocumentProperty"},{"propertyName":"ApprovedBy","propertyValue":"{{Form.ApprovedBy}}","disableUpdates":false,"type":"customDocumentProperty"},{"propertyName":"DocNo","propertyValue":"{{Form.DocumentNumber}} {{Form.LanguageCode.LanguageCode}}","disableUpdates":false,"type":"customDocumentProperty"},{"propertyName":"Checked","propertyValue":"{{Form.Checked}}","disableUpdates":false,"type":"customDocumentProperty"},{"propertyName":"Date","propertyValue":"{{Form.Date}}","disableUpdates":false,"type":"customDocumentProperty"},{"propertyName":"Reference","propertyValue":"{{Form.Reference}}","disableUpdates":false,"type":"customDocumentProperty"},{"propertyName":"Title","propertyValue":"{{Form.DocumentTitle}}","disableUpdates":false,"type":"customDocumentProperty"},{"propertyName":"Keyword","propertyValue":"{{Form.Keywords}}","disableUpdates":false,"type":"customDocumentProperty"},{"propertyName":"DocumentType","propertyValue":"Presentation2011","disableUpdates":false,"type":"customDocumentProperty"},{"propertyName":"Language","propertyValue":"EnglishUS","disableUpdates":false,"type":"customDocumentProperty"},{"propertyName":"TemplateID","propertyValue":"FALSE","disableUpdates":false,"type":"customDocumentProperty"},{"propertyName":"ConfCtrl","propertyValue":"FALSE","disableUpdates":false,"type":"customDocumentProperty"},{"propertyName":"title","propertyValue":"{{Form.DocumentTitle}}","disableUpdates":false,"type":"documentProperty"},{"propertyName":"keywords","propertyValue":"{{Form.Keywords}}","disableUpdates":false,"type":"documentProperty"},{"propertyName":"creator","propertyValue":"{{Form.Prepared}}","disableUpdates":false,"type":"documentProperty"},{"propertyName":"DocTitle","propertyValue":"{{Form.DocTitle.DocTitle}}","disableUpdates":false,"type":"customDocumentProperty"},{"propertyName":"IsDocument","propertyValue":"{{Form.TemplateType.IsDocument}}","disableUpdates":false,"type":"customDocumentProperty"},{"propertyName":"IsPresentation","propertyValue":"{{Form.TemplateType.IsPresentation}}","disableUpdates":false,"type":"customDocumentProperty"},{"propertyName":"company","propertyValue":"Ericsson","disableUpdates":false,"type":"documentProperty"},{"propertyName":"PageNumberVisible","propertyValue":"{{Form.TotalPageNo.TotalPageNo_value}}","disableUpdates":false,"type":"customDocumentProperty"},{"propertyName":"Revision","propertyValue":"{{Form.Revision}}","disableUpdates":false,"type":"customDocumentProperty"},{"propertyName":"DocType","propertyValue":"{{Form.DocTypePresentation}}","disableUpdates":false,"type":"customDocumentProperty"},{"propertyName":"TemplateVersion","propertyValue":"R2A","disableUpdates":false,"type":"customDocumentProperty"},{"propertyName":"PackageNo","propertyValue":"LXA 119 603","disableUpdates":false,"type":"customDocumentProperty"},{"propertyName":"PackageVersion","propertyValue":"R6B","disableUpdates":false,"type":"customDocumentProperty"},{"propertyName":"TemplateName","propertyValue":"CXC 173 2731/1","disableUpdates":false,"type":"customDocumentProperty"},{"propertyName":"DocName","propertyValue":" ","disableUpdates":false,"type":"customDocumentProperty"},{"propertyName":"description","propertyValue":"{{Form.DocumentNumber}} {{Form.LanguageCode.LanguageCode}}\nRev {{Form.Revision}}","disableUpdates":false,"type":"documentProperty"}],"templateName":"New presentation (Standard landscape)","templateDescription":"","enableDocumentContentUpdater":true,"version":"1.9"}]]></TemplafyTemplateConfiguration>
-</file>
-
-<file path=customXml/item2.xml><?xml version="1.0" encoding="utf-8"?>
-<TemplafySlideTemplateConfiguration><![CDATA[{"documentContentValidatorConfiguration":{"enableDocumentContentValidator":false,"documentContentValidatorVersion":0},"elementsMetadata":[],"slideId":"637050925554934895","enableDocumentContentUpdater":true,"version":"1.9"}]]></TemplafySlideTemplateConfiguration>
-</file>
-
-<file path=customXml/item3.xml><?xml version="1.0" encoding="utf-8"?>
-<TemplafySlideFormConfiguration><![CDATA[{"formFields":[],"formDataEntries":[]}]]></TemplafySlideFormConfiguration>
-</file>
-
-<file path=customXml/item4.xml><?xml version="1.0" encoding="utf-8"?>
-<TemplafySlideTemplateConfiguration><![CDATA[{"documentContentValidatorConfiguration":{"enableDocumentContentValidator":false,"documentContentValidatorVersion":0},"elementsMetadata":[],"slideId":"637171128435180813","enableDocumentContentUpdater":true,"version":"1.9"}]]></TemplafySlideTemplateConfiguration>
-</file>
-
-<file path=customXml/item5.xml><?xml version="1.0" encoding="utf-8"?>
-<TemplafySlideFormConfiguration><![CDATA[{"formFields":[],"formDataEntries":[]}]]></TemplafySlideFormConfiguration>
-</file>
-
-<file path=customXml/item6.xml><?xml version="1.0" encoding="utf-8"?>
-<TemplafySlideFormConfiguration><![CDATA[{"formFields":[],"formDataEntries":[]}]]></TemplafySlideFormConfiguration>
-</file>
-
-<file path=customXml/item7.xml><?xml version="1.0" encoding="utf-8"?>
-<p:properties xmlns:p="http://schemas.microsoft.com/office/2006/metadata/properties" xmlns:xsi="http://www.w3.org/2001/XMLSchema-instance" xmlns:pc="http://schemas.microsoft.com/office/infopath/2007/PartnerControls">
-  <documentManagement/>
-</p:properties>
-</file>
-
-<file path=customXml/item8.xml><?xml version="1.0" encoding="utf-8"?>
 <?mso-contentType ?>
 <FormTemplates xmlns="http://schemas.microsoft.com/sharepoint/v3/contenttype/forms">
   <Display>DocumentLibraryForm</Display>
@@ -27646,17 +27755,67 @@
 </FormTemplates>
 </file>
 
+<file path=customXml/item18.xml><?xml version="1.0" encoding="utf-8"?>
+<TemplafySlideFormConfiguration><![CDATA[{"formFields":[],"formDataEntries":[]}]]></TemplafySlideFormConfiguration>
+</file>
+
+<file path=customXml/item19.xml><?xml version="1.0" encoding="utf-8"?>
+<TemplafySlideFormConfiguration><![CDATA[{"formFields":[],"formDataEntries":[]}]]></TemplafySlideFormConfiguration>
+</file>
+
+<file path=customXml/item2.xml><?xml version="1.0" encoding="utf-8"?>
+<p:properties xmlns:p="http://schemas.microsoft.com/office/2006/metadata/properties" xmlns:xsi="http://www.w3.org/2001/XMLSchema-instance" xmlns:pc="http://schemas.microsoft.com/office/infopath/2007/PartnerControls">
+  <documentManagement/>
+</p:properties>
+</file>
+
+<file path=customXml/item3.xml><?xml version="1.0" encoding="utf-8"?>
+<TemplafySlideTemplateConfiguration><![CDATA[{"documentContentValidatorConfiguration":{"enableDocumentContentValidator":false,"documentContentValidatorVersion":0},"elementsMetadata":[],"slideId":"637037983905221558","enableDocumentContentUpdater":true,"version":"1.9"}]]></TemplafySlideTemplateConfiguration>
+</file>
+
+<file path=customXml/item4.xml><?xml version="1.0" encoding="utf-8"?>
+<TemplafySlideFormConfiguration><![CDATA[{"formFields":[],"formDataEntries":[]}]]></TemplafySlideFormConfiguration>
+</file>
+
+<file path=customXml/item5.xml><?xml version="1.0" encoding="utf-8"?>
+<TemplafySlideTemplateConfiguration><![CDATA[{"documentContentValidatorConfiguration":{"enableDocumentContentValidator":false,"documentContentValidatorVersion":0},"elementsMetadata":[],"slideId":"637050925554934895","enableDocumentContentUpdater":true,"version":"1.9"}]]></TemplafySlideTemplateConfiguration>
+</file>
+
+<file path=customXml/item6.xml><?xml version="1.0" encoding="utf-8"?>
+<TemplafySlideTemplateConfiguration><![CDATA[{"documentContentValidatorConfiguration":{"enableDocumentContentValidator":false,"documentContentValidatorVersion":0},"elementsMetadata":[],"slideId":"637037983905221557","enableDocumentContentUpdater":true,"version":"1.9"}]]></TemplafySlideTemplateConfiguration>
+</file>
+
+<file path=customXml/item7.xml><?xml version="1.0" encoding="utf-8"?>
+<TemplafyFormConfiguration><![CDATA[{"formFields":[{"required":true,"placeholder":"","lines":0,"type":"textBox","name":"DocumentTitle","label":"Document Title","helpTexts":{"prefix":"","postfix":""},"spacing":{},"fullyQualifiedName":"DocumentTitle"},{"dataSource":"Confidentiality","displayColumn":"confidentiality","hideIfNoUserInteractionRequired":false,"distinct":true,"required":true,"autoSelectFirstOption":false,"type":"dropDown","name":"ConfidentialityClass","label":"Confidentiality Class","helpTexts":{"prefix":"","postfix":""},"spacing":{},"fullyQualifiedName":"ConfidentialityClass"},{"dataSource":"External Confidentiality label","displayColumn":"externalConfidentiality","hideIfNoUserInteractionRequired":false,"distinct":true,"required":false,"autoSelectFirstOption":false,"defaultValue":"1","type":"dropDown","name":"ExternalConfidentialityLabel","label":"External Confidentiality label","helpTexts":{"prefix":"","postfix":"If no external confidentiality class then please choose the blank value"},"spacing":{},"fullyQualifiedName":"ExternalConfidentialityLabel"},{"dataSource":"PowerPoint Document Type","column":"documentType","required":false,"placeholder":"","autoSelectFirstOption":false,"type":"comboBox","name":"DocTypePresentation","label":"Document Type Presentation","helpTexts":{"prefix":"","postfix":"If the document type differs from the default value, click on the X to delete and type/choose another type."},"spacing":{},"fullyQualifiedName":"DocTypePresentation"},{"required":false,"placeholder":"","lines":0,"type":"textBox","name":"DocumentNumber","label":"Document Number","helpTexts":{"prefix":"","postfix":""},"spacing":{},"fullyQualifiedName":"DocumentNumber"},{"dataSource":"Language code","displayColumn":"showName","hideIfNoUserInteractionRequired":false,"distinct":true,"required":false,"autoSelectFirstOption":false,"defaultValue":"1","type":"dropDown","name":"LanguageCode","label":"Language Code","helpTexts":{"prefix":"","postfix":"The language code will be appended to the Document No."},"spacing":{},"fullyQualifiedName":"LanguageCode"},{"dataSource":"Revision","column":"revision","required":false,"placeholder":"","autoSelectFirstOption":false,"type":"comboBox","name":"Revision","label":"Revision","helpTexts":{"prefix":"","postfix":""},"spacing":{},"fullyQualifiedName":"Revision"},{"required":false,"type":"datePicker","name":"Date","label":"Date","helpTexts":{"prefix":"","postfix":""},"spacing":{},"fullyQualifiedName":"Date"},{"type":"heading","name":"FooterVisibilityOptions","label":"Footer Visibility Options","helpTexts":{"prefix":"","postfix":""},"spacing":{},"fullyQualifiedName":"FooterVisibilityOptions"},{"dataSource":"PPT FooterVisibility","displayColumn":"templateType","hideIfNoUserInteractionRequired":false,"distinct":true,"required":true,"autoSelectFirstOption":false,"defaultValue":"1","type":"dropDown","name":"TemplateType","label":"Is this a document or presentation?","helpTexts":{"prefix":"","postfix":""},"spacing":{},"fullyQualifiedName":"TemplateType"},{"dataSource":"PPT FooterVisibility","displayColumn":"docTitle_label","hideIfNoUserInteractionRequired":false,"distinct":true,"required":false,"autoSelectFirstOption":true,"filter":{"column":"templateType","otherFieldName":"TemplateType","fullyQualifiedOtherFieldName":"TemplateType","otherFieldColumn":"TemplateType","formReference":"none","operator":"equals"},"type":"dropDown","name":"DocTitle","label":"Show document title in footer?","helpTexts":{"prefix":"","postfix":""},"spacing":{},"fullyQualifiedName":"DocTitle"},{"dataSource":"PPT FooterVisibility","displayColumn":"totalPageNo_text","hideIfNoUserInteractionRequired":false,"distinct":true,"required":false,"autoSelectFirstOption":true,"filter":{"column":"templateType","otherFieldName":"TemplateType","fullyQualifiedOtherFieldName":"TemplateType","otherFieldColumn":"TemplateType","formReference":"none","operator":"equals"},"type":"dropDown","name":"TotalPageNo","label":"Page numbering","helpTexts":{"prefix":"","postfix":""},"spacing":{},"fullyQualifiedName":"TotalPageNo"},{"required":false,"placeholder":"","lines":0,"defaultValue":"{{UserProfile.Prepared}}","type":"textBox","name":"Prepared","label":"Prepared By (Subject Responsible)","helpTexts":{"prefix":"","postfix":""},"spacing":{},"fullyQualifiedName":"Prepared"},{"required":false,"placeholder":"","lines":0,"type":"textBox","name":"ApprovedBy","label":"Approved By (Document Responsible)","helpTexts":{"prefix":"","postfix":""},"spacing":{},"fullyQualifiedName":"ApprovedBy"},{"required":false,"placeholder":"","lines":0,"type":"textBox","name":"Checked","label":"Checked","helpTexts":{"prefix":"","postfix":""},"spacing":{},"fullyQualifiedName":"Checked"},{"required":false,"placeholder":"","lines":0,"type":"textBox","name":"Reference","label":"Reference","helpTexts":{"prefix":"","postfix":""},"spacing":{},"fullyQualifiedName":"Reference"},{"required":false,"placeholder":"","lines":0,"type":"textBox","name":"Keywords","label":"Keywords","helpTexts":{"prefix":"","postfix":""},"spacing":{},"fullyQualifiedName":"Keywords"}],"formDataEntries":[{"name":"DocumentTitle","value":"HfKMJ7wB7KPEWJpFWibMqg=="},{"name":"ConfidentialityClass","value":"cT/FOwTWaPknrhRlNMh4SQ=="},{"name":"ExternalConfidentialityLabel","value":"u2D/MG3wyuAQhkGvE2fPaA=="},{"name":"LanguageCode","value":"5wlu7ZdPxHQj1W0w+yTNSg=="},{"name":"Date","value":"vb48xUhp/+BouvbbBJesXw=="},{"name":"TemplateType","value":"PxVEvJY8nE7m/hY9622Sng=="},{"name":"DocTitle","value":"PxVEvJY8nE7m/hY9622Sng=="},{"name":"TotalPageNo","value":"PxVEvJY8nE7m/hY9622Sng=="},{"name":"Prepared","value":"PqdHBiLjqdpOMxfLUK9Tonaq9XwuinzCFKYJ7RK3+SI="}]}]]></TemplafyFormConfiguration>
+</file>
+
+<file path=customXml/item8.xml><?xml version="1.0" encoding="utf-8"?>
+<TemplafySlideFormConfiguration><![CDATA[{"formFields":[],"formDataEntries":[]}]]></TemplafySlideFormConfiguration>
+</file>
+
 <file path=customXml/item9.xml><?xml version="1.0" encoding="utf-8"?>
-<TemplafySlideTemplateConfiguration><![CDATA[{"documentContentValidatorConfiguration":{"enableDocumentContentValidator":false,"documentContentValidatorVersion":0},"elementsMetadata":[],"slideId":"637037983905678162","enableDocumentContentUpdater":true,"version":"1.9"}]]></TemplafySlideTemplateConfiguration>
+<TemplafySlideTemplateConfiguration><![CDATA[{"documentContentValidatorConfiguration":{"enableDocumentContentValidator":false,"documentContentValidatorVersion":0},"elementsMetadata":[],"slideId":"637171128435648944","enableDocumentContentUpdater":true,"version":"1.9"}]]></TemplafySlideTemplateConfiguration>
 </file>
 
 <file path=customXml/itemProps1.xml><?xml version="1.0" encoding="utf-8"?>
-<ds:datastoreItem xmlns:ds="http://schemas.openxmlformats.org/officeDocument/2006/customXml" ds:itemID="{D92C3DF5-A179-4E2D-BD20-07044B39171F}">
+<ds:datastoreItem xmlns:ds="http://schemas.openxmlformats.org/officeDocument/2006/customXml" ds:itemID="{822D38AD-8010-4CD3-BD6B-117CB8DF70A4}">
   <ds:schemaRefs/>
 </ds:datastoreItem>
 </file>
 
 <file path=customXml/itemProps10.xml><?xml version="1.0" encoding="utf-8"?>
+<ds:datastoreItem xmlns:ds="http://schemas.openxmlformats.org/officeDocument/2006/customXml" ds:itemID="{58CC0B31-82B9-497A-9A2E-F3F72D0BBDAD}">
+  <ds:schemaRefs/>
+</ds:datastoreItem>
+</file>
+
+<file path=customXml/itemProps11.xml><?xml version="1.0" encoding="utf-8"?>
+<ds:datastoreItem xmlns:ds="http://schemas.openxmlformats.org/officeDocument/2006/customXml" ds:itemID="{C09F197C-6A49-47D0-B877-F88807989676}">
+  <ds:schemaRefs/>
+</ds:datastoreItem>
+</file>
+
+<file path=customXml/itemProps12.xml><?xml version="1.0" encoding="utf-8"?>
 <ds:datastoreItem xmlns:ds="http://schemas.openxmlformats.org/officeDocument/2006/customXml" ds:itemID="{058EED06-94C4-4781-888F-0A8BB816BC9F}">
   <ds:schemaRefs>
     <ds:schemaRef ds:uri="http://schemas.microsoft.com/office/2006/metadata/contentType"/>
@@ -27675,91 +27834,51 @@
 </ds:datastoreItem>
 </file>
 
-<file path=customXml/itemProps11.xml><?xml version="1.0" encoding="utf-8"?>
-<ds:datastoreItem xmlns:ds="http://schemas.openxmlformats.org/officeDocument/2006/customXml" ds:itemID="{C750C5DC-043F-4BD3-940C-EB6F7625E286}">
+<file path=customXml/itemProps13.xml><?xml version="1.0" encoding="utf-8"?>
+<ds:datastoreItem xmlns:ds="http://schemas.openxmlformats.org/officeDocument/2006/customXml" ds:itemID="{07958A4E-FAB1-42E4-B6B5-29B01F63F87B}">
   <ds:schemaRefs/>
 </ds:datastoreItem>
 </file>
 
-<file path=customXml/itemProps12.xml><?xml version="1.0" encoding="utf-8"?>
-<ds:datastoreItem xmlns:ds="http://schemas.openxmlformats.org/officeDocument/2006/customXml" ds:itemID="{683FEB75-8CFA-449C-A6B1-B1E4A86A58A1}">
+<file path=customXml/itemProps14.xml><?xml version="1.0" encoding="utf-8"?>
+<ds:datastoreItem xmlns:ds="http://schemas.openxmlformats.org/officeDocument/2006/customXml" ds:itemID="{AB2F4486-6448-49E3-8249-BB9C7492711D}">
   <ds:schemaRefs/>
 </ds:datastoreItem>
 </file>
 
-<file path=customXml/itemProps13.xml><?xml version="1.0" encoding="utf-8"?>
+<file path=customXml/itemProps15.xml><?xml version="1.0" encoding="utf-8"?>
+<ds:datastoreItem xmlns:ds="http://schemas.openxmlformats.org/officeDocument/2006/customXml" ds:itemID="{1CE36EA9-2186-4EB1-871A-8AE59C2A13BB}">
+  <ds:schemaRefs/>
+</ds:datastoreItem>
+</file>
+
+<file path=customXml/itemProps16.xml><?xml version="1.0" encoding="utf-8"?>
+<ds:datastoreItem xmlns:ds="http://schemas.openxmlformats.org/officeDocument/2006/customXml" ds:itemID="{D72A95EB-8536-47FD-944A-8DD76726FC96}">
+  <ds:schemaRefs/>
+</ds:datastoreItem>
+</file>
+
+<file path=customXml/itemProps17.xml><?xml version="1.0" encoding="utf-8"?>
+<ds:datastoreItem xmlns:ds="http://schemas.openxmlformats.org/officeDocument/2006/customXml" ds:itemID="{F5A7E41D-6E7F-4B05-AFAB-F540BD4C068B}">
+  <ds:schemaRefs>
+    <ds:schemaRef ds:uri="http://schemas.microsoft.com/sharepoint/v3/contenttype/forms"/>
+  </ds:schemaRefs>
+</ds:datastoreItem>
+</file>
+
+<file path=customXml/itemProps18.xml><?xml version="1.0" encoding="utf-8"?>
 <ds:datastoreItem xmlns:ds="http://schemas.openxmlformats.org/officeDocument/2006/customXml" ds:itemID="{B9AEDDE3-EA02-4A8F-B8F8-0606A0AA45FC}">
   <ds:schemaRefs/>
 </ds:datastoreItem>
 </file>
 
-<file path=customXml/itemProps14.xml><?xml version="1.0" encoding="utf-8"?>
-<ds:datastoreItem xmlns:ds="http://schemas.openxmlformats.org/officeDocument/2006/customXml" ds:itemID="{D72A95EB-8536-47FD-944A-8DD76726FC96}">
-  <ds:schemaRefs/>
-</ds:datastoreItem>
-</file>
-
-<file path=customXml/itemProps15.xml><?xml version="1.0" encoding="utf-8"?>
-<ds:datastoreItem xmlns:ds="http://schemas.openxmlformats.org/officeDocument/2006/customXml" ds:itemID="{C09F197C-6A49-47D0-B877-F88807989676}">
-  <ds:schemaRefs/>
-</ds:datastoreItem>
-</file>
-
-<file path=customXml/itemProps16.xml><?xml version="1.0" encoding="utf-8"?>
-<ds:datastoreItem xmlns:ds="http://schemas.openxmlformats.org/officeDocument/2006/customXml" ds:itemID="{72516535-7702-46AF-9B1F-8623A67A824E}">
-  <ds:schemaRefs/>
-</ds:datastoreItem>
-</file>
-
-<file path=customXml/itemProps17.xml><?xml version="1.0" encoding="utf-8"?>
-<ds:datastoreItem xmlns:ds="http://schemas.openxmlformats.org/officeDocument/2006/customXml" ds:itemID="{32BA7684-6BE4-4F73-B22E-30934AB379B8}">
-  <ds:schemaRefs/>
-</ds:datastoreItem>
-</file>
-
-<file path=customXml/itemProps18.xml><?xml version="1.0" encoding="utf-8"?>
+<file path=customXml/itemProps19.xml><?xml version="1.0" encoding="utf-8"?>
 <ds:datastoreItem xmlns:ds="http://schemas.openxmlformats.org/officeDocument/2006/customXml" ds:itemID="{C99E78A0-C9D4-446F-B674-4DD3E2B46C5D}">
   <ds:schemaRefs/>
 </ds:datastoreItem>
 </file>
 
-<file path=customXml/itemProps19.xml><?xml version="1.0" encoding="utf-8"?>
-<ds:datastoreItem xmlns:ds="http://schemas.openxmlformats.org/officeDocument/2006/customXml" ds:itemID="{07958A4E-FAB1-42E4-B6B5-29B01F63F87B}">
-  <ds:schemaRefs/>
-</ds:datastoreItem>
-</file>
-
 <file path=customXml/itemProps2.xml><?xml version="1.0" encoding="utf-8"?>
-<ds:datastoreItem xmlns:ds="http://schemas.openxmlformats.org/officeDocument/2006/customXml" ds:itemID="{03AF3FDC-ACD1-46F3-A43E-782322DF9816}">
-  <ds:schemaRefs/>
-</ds:datastoreItem>
-</file>
-
-<file path=customXml/itemProps3.xml><?xml version="1.0" encoding="utf-8"?>
-<ds:datastoreItem xmlns:ds="http://schemas.openxmlformats.org/officeDocument/2006/customXml" ds:itemID="{822D38AD-8010-4CD3-BD6B-117CB8DF70A4}">
-  <ds:schemaRefs/>
-</ds:datastoreItem>
-</file>
-
-<file path=customXml/itemProps4.xml><?xml version="1.0" encoding="utf-8"?>
-<ds:datastoreItem xmlns:ds="http://schemas.openxmlformats.org/officeDocument/2006/customXml" ds:itemID="{AB2F4486-6448-49E3-8249-BB9C7492711D}">
-  <ds:schemaRefs/>
-</ds:datastoreItem>
-</file>
-
-<file path=customXml/itemProps5.xml><?xml version="1.0" encoding="utf-8"?>
-<ds:datastoreItem xmlns:ds="http://schemas.openxmlformats.org/officeDocument/2006/customXml" ds:itemID="{58CC0B31-82B9-497A-9A2E-F3F72D0BBDAD}">
-  <ds:schemaRefs/>
-</ds:datastoreItem>
-</file>
-
-<file path=customXml/itemProps6.xml><?xml version="1.0" encoding="utf-8"?>
-<ds:datastoreItem xmlns:ds="http://schemas.openxmlformats.org/officeDocument/2006/customXml" ds:itemID="{847502A6-7CBE-43AF-BDF6-4D4423521D8C}">
-  <ds:schemaRefs/>
-</ds:datastoreItem>
-</file>
-
-<file path=customXml/itemProps7.xml><?xml version="1.0" encoding="utf-8"?>
 <ds:datastoreItem xmlns:ds="http://schemas.openxmlformats.org/officeDocument/2006/customXml" ds:itemID="{56F2EE69-0CCA-4F48-BE22-EC4A886C57A7}">
   <ds:schemaRefs>
     <ds:schemaRef ds:uri="http://schemas.microsoft.com/office/infopath/2007/PartnerControls"/>
@@ -27776,16 +27895,44 @@
 </ds:datastoreItem>
 </file>
 
+<file path=customXml/itemProps3.xml><?xml version="1.0" encoding="utf-8"?>
+<ds:datastoreItem xmlns:ds="http://schemas.openxmlformats.org/officeDocument/2006/customXml" ds:itemID="{683FEB75-8CFA-449C-A6B1-B1E4A86A58A1}">
+  <ds:schemaRefs/>
+</ds:datastoreItem>
+</file>
+
+<file path=customXml/itemProps4.xml><?xml version="1.0" encoding="utf-8"?>
+<ds:datastoreItem xmlns:ds="http://schemas.openxmlformats.org/officeDocument/2006/customXml" ds:itemID="{32BA7684-6BE4-4F73-B22E-30934AB379B8}">
+  <ds:schemaRefs/>
+</ds:datastoreItem>
+</file>
+
+<file path=customXml/itemProps5.xml><?xml version="1.0" encoding="utf-8"?>
+<ds:datastoreItem xmlns:ds="http://schemas.openxmlformats.org/officeDocument/2006/customXml" ds:itemID="{03AF3FDC-ACD1-46F3-A43E-782322DF9816}">
+  <ds:schemaRefs/>
+</ds:datastoreItem>
+</file>
+
+<file path=customXml/itemProps6.xml><?xml version="1.0" encoding="utf-8"?>
+<ds:datastoreItem xmlns:ds="http://schemas.openxmlformats.org/officeDocument/2006/customXml" ds:itemID="{72516535-7702-46AF-9B1F-8623A67A824E}">
+  <ds:schemaRefs/>
+</ds:datastoreItem>
+</file>
+
+<file path=customXml/itemProps7.xml><?xml version="1.0" encoding="utf-8"?>
+<ds:datastoreItem xmlns:ds="http://schemas.openxmlformats.org/officeDocument/2006/customXml" ds:itemID="{D92C3DF5-A179-4E2D-BD20-07044B39171F}">
+  <ds:schemaRefs/>
+</ds:datastoreItem>
+</file>
+
 <file path=customXml/itemProps8.xml><?xml version="1.0" encoding="utf-8"?>
-<ds:datastoreItem xmlns:ds="http://schemas.openxmlformats.org/officeDocument/2006/customXml" ds:itemID="{F5A7E41D-6E7F-4B05-AFAB-F540BD4C068B}">
-  <ds:schemaRefs>
-    <ds:schemaRef ds:uri="http://schemas.microsoft.com/sharepoint/v3/contenttype/forms"/>
-  </ds:schemaRefs>
+<ds:datastoreItem xmlns:ds="http://schemas.openxmlformats.org/officeDocument/2006/customXml" ds:itemID="{847502A6-7CBE-43AF-BDF6-4D4423521D8C}">
+  <ds:schemaRefs/>
 </ds:datastoreItem>
 </file>
 
 <file path=customXml/itemProps9.xml><?xml version="1.0" encoding="utf-8"?>
-<ds:datastoreItem xmlns:ds="http://schemas.openxmlformats.org/officeDocument/2006/customXml" ds:itemID="{1CE36EA9-2186-4EB1-871A-8AE59C2A13BB}">
+<ds:datastoreItem xmlns:ds="http://schemas.openxmlformats.org/officeDocument/2006/customXml" ds:itemID="{C750C5DC-043F-4BD3-940C-EB6F7625E286}">
   <ds:schemaRefs/>
 </ds:datastoreItem>
 </file>
</xml_diff>

<commit_message>
Made rmem / wmem suggestion more visible
</commit_message>
<xml_diff>
--- a/SCReAM-BW-test-tool.pptx
+++ b/SCReAM-BW-test-tool.pptx
@@ -2662,7 +2662,7 @@
               </a:rPr>
               <a:t>  |  2020-03-20  |  Public  |  Page </a:t>
             </a:r>
-            <a:fld id="{B849C92B-C631-4103-B7AA-1E298CC78578}" type="slidenum">
+            <a:fld id="{32940D27-CA2B-40E0-9351-B6997C5B1CC0}" type="slidenum">
               <a:rPr lang="en-US" sz="800" b="0" i="0" u="none" smtClean="0">
                 <a:solidFill>
                   <a:srgbClr val="1A1816"/>
@@ -3167,7 +3167,7 @@
               </a:rPr>
               <a:t>  |  2020-03-20  |  Public  |  Page </a:t>
             </a:r>
-            <a:fld id="{77D5EA97-A2DE-40EF-9B81-68CBEA2D742D}" type="slidenum">
+            <a:fld id="{CFCFB559-A45D-4D93-8B8A-2A073771DC9B}" type="slidenum">
               <a:rPr lang="en-US" sz="800" b="0" i="0" u="none" smtClean="0">
                 <a:solidFill>
                   <a:schemeClr val="bg1"/>
@@ -3480,7 +3480,7 @@
               </a:rPr>
               <a:t>  |  2020-03-20  |  Public  |  Page </a:t>
             </a:r>
-            <a:fld id="{50398804-4C5D-4103-AFF7-036B1CFA3AD5}" type="slidenum">
+            <a:fld id="{91359FFB-0008-48DA-9AC1-0BF25E2DAF56}" type="slidenum">
               <a:rPr lang="en-US" sz="800" b="0" i="0" u="none" smtClean="0">
                 <a:solidFill>
                   <a:srgbClr val="1A1816"/>
@@ -3713,7 +3713,7 @@
               </a:rPr>
               <a:t>  |  2020-03-20  |  Public  |  Page </a:t>
             </a:r>
-            <a:fld id="{CBD9B7C3-1AC1-43E2-9B5B-C9A864A6FF95}" type="slidenum">
+            <a:fld id="{D6864809-1D53-4061-B7D9-DE48D1851CC2}" type="slidenum">
               <a:rPr lang="en-US" sz="800" b="0" i="0" u="none" smtClean="0">
                 <a:solidFill>
                   <a:srgbClr val="1A1816"/>
@@ -3873,7 +3873,7 @@
               </a:rPr>
               <a:t>  |  2020-03-20  |  Public  |  Page </a:t>
             </a:r>
-            <a:fld id="{97F105E0-6980-44EE-A567-D5FC82ECDA28}" type="slidenum">
+            <a:fld id="{53DE5CAB-F1CD-46F4-A62E-430EE9957FF7}" type="slidenum">
               <a:rPr lang="en-US" sz="800" b="0" i="0" u="none" smtClean="0">
                 <a:solidFill>
                   <a:srgbClr val="1A1816"/>
@@ -4079,7 +4079,7 @@
               </a:rPr>
               <a:t>  |  2020-03-20  |  Public  |  Page </a:t>
             </a:r>
-            <a:fld id="{F18F1E3D-72A5-408F-A0F1-31E4E86A6D5A}" type="slidenum">
+            <a:fld id="{CE35F244-4CA9-45B5-839A-5AB7FA536D4F}" type="slidenum">
               <a:rPr lang="en-US" sz="800" b="0" i="0" u="none" smtClean="0">
                 <a:solidFill>
                   <a:srgbClr val="1A1816"/>
@@ -4377,7 +4377,7 @@
               </a:rPr>
               <a:t>  |  2020-03-20  |  Public  |  Page </a:t>
             </a:r>
-            <a:fld id="{F3A344D7-E140-45D8-86C2-652F19DFB39C}" type="slidenum">
+            <a:fld id="{5DB14D11-B866-4A2A-91D0-C3B832CEE12C}" type="slidenum">
               <a:rPr lang="en-US" sz="800" b="0" i="0" u="none" smtClean="0">
                 <a:solidFill>
                   <a:schemeClr val="bg1"/>
@@ -4675,7 +4675,7 @@
               </a:rPr>
               <a:t>  |  2020-03-20  |  Public  |  Page </a:t>
             </a:r>
-            <a:fld id="{C1DF33F2-A8AF-4D4E-8A26-9D061EFE1296}" type="slidenum">
+            <a:fld id="{9BD66F31-0AAE-4B3D-A430-83C75CF01F0C}" type="slidenum">
               <a:rPr lang="en-US" sz="800" b="0" i="0" u="none" smtClean="0">
                 <a:solidFill>
                   <a:schemeClr val="bg1"/>
@@ -4973,7 +4973,7 @@
               </a:rPr>
               <a:t>  |  2020-03-20  |  Public  |  Page </a:t>
             </a:r>
-            <a:fld id="{03AD1571-7D87-4D8A-83A7-34C5EBA16BB9}" type="slidenum">
+            <a:fld id="{0DF653D0-30ED-41D0-BFFB-04E42CAFEBC3}" type="slidenum">
               <a:rPr lang="en-US" sz="800" b="0" i="0" u="none" smtClean="0">
                 <a:solidFill>
                   <a:schemeClr val="bg1"/>
@@ -5271,7 +5271,7 @@
               </a:rPr>
               <a:t>  |  2020-03-20  |  Public  |  Page </a:t>
             </a:r>
-            <a:fld id="{602AD30C-1076-45BC-8849-6D1B11038955}" type="slidenum">
+            <a:fld id="{B66563DC-09D7-42B7-8E73-418D9D7ECF26}" type="slidenum">
               <a:rPr lang="en-US" sz="800" b="0" i="0" u="none" smtClean="0">
                 <a:solidFill>
                   <a:schemeClr val="bg1"/>
@@ -5569,7 +5569,7 @@
               </a:rPr>
               <a:t>  |  2020-03-20  |  Public  |  Page </a:t>
             </a:r>
-            <a:fld id="{5DB1953B-BFE4-4826-A3CB-997209D755BE}" type="slidenum">
+            <a:fld id="{372FDFB1-0D93-4BF5-BDB3-6A4094874BD7}" type="slidenum">
               <a:rPr lang="en-US" sz="800" b="0" i="0" u="none" smtClean="0">
                 <a:solidFill>
                   <a:schemeClr val="bg1"/>
@@ -6083,7 +6083,7 @@
               </a:rPr>
               <a:t>  |  2020-03-20  |  Public  |  Page </a:t>
             </a:r>
-            <a:fld id="{137A0126-ABE1-4FD0-8BAD-DA24E022C725}" type="slidenum">
+            <a:fld id="{CBC50CB7-6B0D-450B-B130-80B8D545EA0E}" type="slidenum">
               <a:rPr lang="en-US" sz="800" b="0" i="0" u="none" smtClean="0">
                 <a:solidFill>
                   <a:schemeClr val="bg1"/>
@@ -6387,7 +6387,7 @@
               </a:rPr>
               <a:t>  |  2020-03-20  |  Public  |  Page </a:t>
             </a:r>
-            <a:fld id="{D8C2E545-C9C7-44B6-85FD-B8873F36AEA8}" type="slidenum">
+            <a:fld id="{606D1A8B-C4B2-4268-874C-B191201F240E}" type="slidenum">
               <a:rPr lang="en-US" sz="800" b="0" i="0" u="none" smtClean="0">
                 <a:solidFill>
                   <a:schemeClr val="bg1"/>
@@ -6685,7 +6685,7 @@
               </a:rPr>
               <a:t>  |  2020-03-20  |  Public  |  Page </a:t>
             </a:r>
-            <a:fld id="{B6276A48-5259-42AF-AB50-E62A98016126}" type="slidenum">
+            <a:fld id="{0A8558FD-ADE2-449D-8C7C-72434798ACAB}" type="slidenum">
               <a:rPr lang="en-US" sz="800" b="0" i="0" u="none" smtClean="0">
                 <a:solidFill>
                   <a:schemeClr val="bg1"/>
@@ -6972,7 +6972,7 @@
               </a:rPr>
               <a:t>  |  2020-03-20  |  Public  |  Page </a:t>
             </a:r>
-            <a:fld id="{EEB19463-FEE3-4E86-BDD1-558B1147D8B5}" type="slidenum">
+            <a:fld id="{D132C2F5-C047-4D1B-96E6-EFD016A7219E}" type="slidenum">
               <a:rPr lang="en-US" sz="800" b="0" i="0" u="none" smtClean="0">
                 <a:solidFill>
                   <a:srgbClr val="1A1816"/>
@@ -7259,7 +7259,7 @@
               </a:rPr>
               <a:t>  |  2020-03-20  |  Public  |  Page </a:t>
             </a:r>
-            <a:fld id="{571F911B-7FB4-4CF9-852E-AD79B30E3159}" type="slidenum">
+            <a:fld id="{6DF41FE1-FAD6-4107-96B3-85F21A2C44FA}" type="slidenum">
               <a:rPr lang="en-US" sz="800" b="0" i="0" u="none" smtClean="0">
                 <a:solidFill>
                   <a:srgbClr val="1A1816"/>
@@ -7552,7 +7552,7 @@
               </a:rPr>
               <a:t>  |  2020-03-20  |  Public  |  Page </a:t>
             </a:r>
-            <a:fld id="{8E63B24A-DE33-4AB3-93E6-DA720A7874AB}" type="slidenum">
+            <a:fld id="{4BA79DC0-3D51-4FEF-91BA-AA694AFFEDCC}" type="slidenum">
               <a:rPr lang="en-US" sz="800" b="0" i="0" u="none" smtClean="0">
                 <a:solidFill>
                   <a:srgbClr val="1A1816"/>
@@ -7839,7 +7839,7 @@
               </a:rPr>
               <a:t>  |  2020-03-20  |  Public  |  Page </a:t>
             </a:r>
-            <a:fld id="{74F82E6E-1B8E-4FAD-92C2-943CECE3B610}" type="slidenum">
+            <a:fld id="{159EDBFA-5C9F-4AF5-93A6-F98357395696}" type="slidenum">
               <a:rPr lang="en-US" sz="800" b="0" i="0" u="none" smtClean="0">
                 <a:solidFill>
                   <a:srgbClr val="1A1816"/>
@@ -8161,7 +8161,7 @@
               </a:rPr>
               <a:t>  |  2020-03-20  |  Public  |  Page </a:t>
             </a:r>
-            <a:fld id="{4EB63AFF-E5C1-4824-AB8F-F668FF09F25F}" type="slidenum">
+            <a:fld id="{3D1CE28D-7CEF-40C9-BCBE-DC3F8D796B6C}" type="slidenum">
               <a:rPr lang="en-US" sz="800" b="0" i="0" u="none" smtClean="0">
                 <a:solidFill>
                   <a:srgbClr val="1A1816"/>
@@ -8448,7 +8448,7 @@
               </a:rPr>
               <a:t>  |  2020-03-20  |  Public  |  Page </a:t>
             </a:r>
-            <a:fld id="{C5E3D660-1812-4704-A7AA-F1AC7067D239}" type="slidenum">
+            <a:fld id="{0AD9DDA3-4022-4F46-A3AA-A6E9F60FB1B0}" type="slidenum">
               <a:rPr lang="en-US" sz="800" b="0" i="0" u="none" smtClean="0">
                 <a:solidFill>
                   <a:srgbClr val="1A1816"/>
@@ -8770,7 +8770,7 @@
               </a:rPr>
               <a:t>  |  2020-03-20  |  Public  |  Page </a:t>
             </a:r>
-            <a:fld id="{667DC38F-369A-4EAC-A358-CB57A58010A2}" type="slidenum">
+            <a:fld id="{C0E82CD4-522A-40F4-A102-BDBFBDCF0D20}" type="slidenum">
               <a:rPr lang="en-US" sz="800" b="0" i="0" u="none" smtClean="0">
                 <a:solidFill>
                   <a:srgbClr val="1A1816"/>
@@ -9132,7 +9132,7 @@
               </a:rPr>
               <a:t>  |  2020-03-20  |  Public  |  Page </a:t>
             </a:r>
-            <a:fld id="{6E4B486C-B391-432E-9E54-F54CB0C6A3EE}" type="slidenum">
+            <a:fld id="{1AF9F41B-2996-486A-A70E-B49B8FBA4F3D}" type="slidenum">
               <a:rPr lang="en-US" sz="800" b="0" i="0" u="none" smtClean="0">
                 <a:solidFill>
                   <a:srgbClr val="1A1816"/>
@@ -9474,7 +9474,7 @@
               </a:rPr>
               <a:t>  |  2020-03-20  |  Public  |  Page </a:t>
             </a:r>
-            <a:fld id="{ABE7F858-8ADC-443A-913F-8080DAEE886D}" type="slidenum">
+            <a:fld id="{D987856D-52F8-464C-915C-B2485053AA35}" type="slidenum">
               <a:rPr lang="en-US" sz="800" b="0" i="0" u="none" smtClean="0">
                 <a:solidFill>
                   <a:srgbClr val="1A1816"/>
@@ -9823,7 +9823,7 @@
               </a:rPr>
               <a:t>  |  2020-03-20  |  Public  |  Page </a:t>
             </a:r>
-            <a:fld id="{D4A0F904-5CB4-4C05-8535-A5D2D625AA33}" type="slidenum">
+            <a:fld id="{AEBC74CB-30D1-4194-B7F0-D691DE54F1D1}" type="slidenum">
               <a:rPr lang="en-US" sz="800" b="0" i="0" u="none" smtClean="0">
                 <a:solidFill>
                   <a:srgbClr val="1A1816"/>
@@ -10185,7 +10185,7 @@
               </a:rPr>
               <a:t>  |  2020-03-20  |  Public  |  Page </a:t>
             </a:r>
-            <a:fld id="{DB6CAACE-F71E-49E2-BAC1-EC2FBAD70CE6}" type="slidenum">
+            <a:fld id="{4BE1FD00-66D6-4BFC-BD91-2D678ADEEE60}" type="slidenum">
               <a:rPr lang="en-US" sz="800" b="0" i="0" u="none" smtClean="0">
                 <a:solidFill>
                   <a:srgbClr val="1A1816"/>
@@ -10547,7 +10547,7 @@
               </a:rPr>
               <a:t>  |  2020-03-20  |  Public  |  Page </a:t>
             </a:r>
-            <a:fld id="{0114785F-AF2A-49A4-8E2B-3B49340E5F15}" type="slidenum">
+            <a:fld id="{8A652941-1185-4F42-8202-C6E502CAC816}" type="slidenum">
               <a:rPr lang="en-US" sz="800" b="0" i="0" u="none" smtClean="0">
                 <a:solidFill>
                   <a:srgbClr val="1A1816"/>
@@ -10909,7 +10909,7 @@
               </a:rPr>
               <a:t>  |  2020-03-20  |  Public  |  Page </a:t>
             </a:r>
-            <a:fld id="{55E5BFBC-11AD-48EE-BFD4-19AFA73F0539}" type="slidenum">
+            <a:fld id="{92105A3D-044B-49B8-A785-D93CD8A6D6C1}" type="slidenum">
               <a:rPr lang="en-US" sz="800" b="0" i="0" u="none" smtClean="0">
                 <a:solidFill>
                   <a:srgbClr val="1A1816"/>
@@ -11271,7 +11271,7 @@
               </a:rPr>
               <a:t>  |  2020-03-20  |  Public  |  Page </a:t>
             </a:r>
-            <a:fld id="{D14D63D1-EBB8-4BB5-B7D6-2CEE2463770E}" type="slidenum">
+            <a:fld id="{0FFABBFD-CC07-4D99-B535-2790CABA684E}" type="slidenum">
               <a:rPr lang="en-US" sz="800" b="0" i="0" u="none" smtClean="0">
                 <a:solidFill>
                   <a:srgbClr val="1A1816"/>
@@ -11693,7 +11693,7 @@
               </a:rPr>
               <a:t>  |  2020-03-20  |  Public  |  Page </a:t>
             </a:r>
-            <a:fld id="{E33B1299-0F24-425A-AAAD-0DD2BF30E801}" type="slidenum">
+            <a:fld id="{D315487D-A0E7-4653-A60B-C8791DB563AB}" type="slidenum">
               <a:rPr lang="en-US" sz="800" b="0" i="0" u="none" smtClean="0">
                 <a:solidFill>
                   <a:srgbClr val="1A1816"/>
@@ -12109,7 +12109,7 @@
               </a:rPr>
               <a:t>  |  2020-03-20  |  Public  |  Page </a:t>
             </a:r>
-            <a:fld id="{7C72E3A8-D170-4393-BF72-731DF97AA157}" type="slidenum">
+            <a:fld id="{2FB853D6-EB85-4EA1-BEFE-83E26640E4C0}" type="slidenum">
               <a:rPr lang="en-US" sz="800" b="0" i="0" u="none" smtClean="0">
                 <a:solidFill>
                   <a:srgbClr val="1A1816"/>
@@ -12584,7 +12584,7 @@
               </a:rPr>
               <a:t>  |  2020-03-20  |  Public  |  Page </a:t>
             </a:r>
-            <a:fld id="{19189E6B-F555-43A7-A1F3-39A3C0B2DEF3}" type="slidenum">
+            <a:fld id="{CBC5B28E-6B7A-401F-BD1E-DDD88CB84474}" type="slidenum">
               <a:rPr lang="en-US" sz="800" b="0" i="0" u="none" smtClean="0">
                 <a:solidFill>
                   <a:srgbClr val="1A1816"/>
@@ -13079,7 +13079,7 @@
               </a:rPr>
               <a:t>  |  2020-03-20  |  Public  |  Page </a:t>
             </a:r>
-            <a:fld id="{4004E49C-63DB-4DFD-A1D9-DDFC2325BA2C}" type="slidenum">
+            <a:fld id="{0513FCE1-E8E6-4210-BB49-EE12F0F52E74}" type="slidenum">
               <a:rPr lang="en-US" sz="800" b="0" i="0" u="none" smtClean="0">
                 <a:solidFill>
                   <a:srgbClr val="1A1816"/>
@@ -13535,7 +13535,7 @@
               </a:rPr>
               <a:t>  |  2020-03-20  |  Public  |  Page </a:t>
             </a:r>
-            <a:fld id="{BF083321-627B-4265-8C13-C6B49D98ADC5}" type="slidenum">
+            <a:fld id="{205B7888-FEC0-407C-8A00-83663A38EF76}" type="slidenum">
               <a:rPr lang="en-US" sz="800" b="0" i="0" u="none" smtClean="0">
                 <a:solidFill>
                   <a:srgbClr val="1A1816"/>
@@ -13923,7 +13923,7 @@
               </a:rPr>
               <a:t>  |  2020-03-20  |  Public  |  Page </a:t>
             </a:r>
-            <a:fld id="{8B105E84-BECC-44A9-A8D7-267ADEB50956}" type="slidenum">
+            <a:fld id="{A8B20A30-91FD-419D-9146-821B86B73BE1}" type="slidenum">
               <a:rPr lang="en-US" sz="800" b="0" i="0" u="none" smtClean="0">
                 <a:solidFill>
                   <a:schemeClr val="bg1"/>
@@ -14442,7 +14442,7 @@
               </a:rPr>
               <a:t>  |  2020-03-20  |  Public  |  Page </a:t>
             </a:r>
-            <a:fld id="{72C5D54A-5402-4699-A59A-D31CE83AB105}" type="slidenum">
+            <a:fld id="{6AF4944C-91AD-4E60-A2B3-17D743F5F181}" type="slidenum">
               <a:rPr lang="en-US" sz="800" b="0" i="0" u="none" smtClean="0">
                 <a:solidFill>
                   <a:srgbClr val="1A1816"/>
@@ -15151,7 +15151,7 @@
               </a:rPr>
               <a:t>  |  2020-03-20  |  Public  |  Page </a:t>
             </a:r>
-            <a:fld id="{0AE1781E-3F1C-4727-976C-8770CCEB5AE9}" type="slidenum">
+            <a:fld id="{182D0536-1604-4F6D-87B4-5A2469D4C947}" type="slidenum">
               <a:rPr lang="en-US" sz="800" b="0" i="0" u="none" smtClean="0">
                 <a:solidFill>
                   <a:srgbClr val="1A1816"/>
@@ -16630,7 +16630,7 @@
               </a:rPr>
               <a:t>  |  2020-03-20  |  Public  |  Page </a:t>
             </a:r>
-            <a:fld id="{87213B4E-646C-49D3-AD78-20EE867D3095}" type="slidenum">
+            <a:fld id="{0433F543-448A-444E-9F14-40B2B4890E55}" type="slidenum">
               <a:rPr lang="en-US" sz="800" b="0" i="0" u="none" smtClean="0">
                 <a:solidFill>
                   <a:schemeClr val="bg1"/>
@@ -17142,7 +17142,7 @@
               </a:rPr>
               <a:t>  |  2020-03-20  |  Public  |  Page </a:t>
             </a:r>
-            <a:fld id="{C6DB5963-8A66-43FA-8862-A8E2E26DAA38}" type="slidenum">
+            <a:fld id="{838A8D23-F70B-452E-9C9D-E3DA7113089F}" type="slidenum">
               <a:rPr lang="en-US" sz="800" b="0" i="0" u="none" smtClean="0">
                 <a:solidFill>
                   <a:schemeClr val="bg1"/>
@@ -17537,7 +17537,7 @@
               </a:rPr>
               <a:t>  |  2020-03-20  |  Public  |  Page </a:t>
             </a:r>
-            <a:fld id="{4BDDCC84-0CAA-4E47-9774-EBE289499824}" type="slidenum">
+            <a:fld id="{B485CE7E-559D-4F8A-8F78-99EA15F84D0F}" type="slidenum">
               <a:rPr lang="en-US" sz="800" b="0" i="0" u="none" smtClean="0">
                 <a:solidFill>
                   <a:schemeClr val="bg1"/>
@@ -18037,7 +18037,7 @@
               </a:rPr>
               <a:t>  |  2020-03-20  |  Public  |  Page </a:t>
             </a:r>
-            <a:fld id="{E60230CB-7453-4B09-A701-DEACBA045902}" type="slidenum">
+            <a:fld id="{7977713C-CE7E-4BB3-8582-01A430C85289}" type="slidenum">
               <a:rPr lang="en-US" sz="800" b="0" i="0" u="none" smtClean="0">
                 <a:solidFill>
                   <a:schemeClr val="bg1"/>
@@ -18537,7 +18537,7 @@
               </a:rPr>
               <a:t>  |  2020-03-20  |  Public  |  Page </a:t>
             </a:r>
-            <a:fld id="{A6C6540A-88A4-4E66-B7CA-67D5A32328A8}" type="slidenum">
+            <a:fld id="{3808AACC-49DC-42A4-9A06-0EAEA028062C}" type="slidenum">
               <a:rPr lang="en-US" sz="800" b="0" i="0" u="none" smtClean="0">
                 <a:solidFill>
                   <a:schemeClr val="bg1"/>
@@ -19546,7 +19546,7 @@
             </a:br>
             <a:r>
               <a:rPr lang="en-US" sz="5400" dirty="0"/>
-              <a:t>2020-07-03</a:t>
+              <a:t>2021-02-17</a:t>
             </a:r>
           </a:p>
         </p:txBody>
@@ -21335,193 +21335,193 @@
           <a:lstStyle/>
           <a:p>
             <a:r>
-              <a:rPr lang="en-US" sz="2400" dirty="0"/>
+              <a:rPr lang="en-US" dirty="0"/>
               <a:t>Firewalls may need to be opened up but it is most often not needed</a:t>
             </a:r>
           </a:p>
           <a:p>
             <a:pPr lvl="1"/>
             <a:r>
-              <a:rPr lang="en-US" dirty="0"/>
+              <a:rPr lang="en-US" sz="1800" dirty="0"/>
               <a:t>Use </a:t>
             </a:r>
             <a:r>
+              <a:rPr lang="en-US" sz="1800" dirty="0" err="1"/>
+              <a:t>e.g</a:t>
+            </a:r>
+            <a:r>
+              <a:rPr lang="en-US" sz="1800" dirty="0"/>
+              <a:t> firewall-</a:t>
+            </a:r>
+            <a:r>
+              <a:rPr lang="en-US" sz="1800" dirty="0" err="1"/>
+              <a:t>cmd</a:t>
+            </a:r>
+            <a:endParaRPr lang="en-US" sz="1800" dirty="0"/>
+          </a:p>
+          <a:p>
+            <a:pPr lvl="2"/>
+            <a:r>
+              <a:rPr lang="en-US" sz="1800" dirty="0" err="1"/>
+              <a:t>sudo</a:t>
+            </a:r>
+            <a:r>
+              <a:rPr lang="en-US" sz="1800" dirty="0"/>
+              <a:t> firewall-</a:t>
+            </a:r>
+            <a:r>
+              <a:rPr lang="en-US" sz="1800" dirty="0" err="1"/>
+              <a:t>cmd</a:t>
+            </a:r>
+            <a:r>
+              <a:rPr lang="en-US" sz="1800" dirty="0"/>
+              <a:t> --zone=public --add-port=30122/</a:t>
+            </a:r>
+            <a:r>
+              <a:rPr lang="en-US" sz="1800" dirty="0" err="1"/>
+              <a:t>udp</a:t>
+            </a:r>
+            <a:endParaRPr lang="en-US" sz="1800" dirty="0"/>
+          </a:p>
+          <a:p>
+            <a:pPr lvl="2"/>
+            <a:endParaRPr lang="en-US" sz="1800" dirty="0"/>
+          </a:p>
+          <a:p>
+            <a:r>
+              <a:rPr lang="en-US" dirty="0"/>
+              <a:t>Priority for </a:t>
+            </a:r>
+            <a:r>
               <a:rPr lang="en-US" dirty="0" err="1"/>
-              <a:t>e.g</a:t>
-            </a:r>
-            <a:r>
-              <a:rPr lang="en-US" dirty="0"/>
-              <a:t> firewall-</a:t>
+              <a:t>SCReAM</a:t>
+            </a:r>
+            <a:r>
+              <a:rPr lang="en-US" dirty="0"/>
+              <a:t> sender and receiver may need to be elevated to avoid that the </a:t>
             </a:r>
             <a:r>
               <a:rPr lang="en-US" dirty="0" err="1"/>
-              <a:t>cmd</a:t>
-            </a:r>
-            <a:endParaRPr lang="en-US" dirty="0"/>
-          </a:p>
-          <a:p>
-            <a:pPr lvl="2"/>
-            <a:r>
-              <a:rPr lang="en-US" dirty="0" err="1"/>
+              <a:t>SCReAM</a:t>
+            </a:r>
+            <a:r>
+              <a:rPr lang="en-US" dirty="0"/>
+              <a:t> processes are halted by other processes</a:t>
+            </a:r>
+          </a:p>
+          <a:p>
+            <a:pPr lvl="1"/>
+            <a:r>
+              <a:rPr lang="en-US" sz="1800" dirty="0"/>
+              <a:t>&gt;</a:t>
+            </a:r>
+            <a:r>
+              <a:rPr lang="en-US" sz="1800" dirty="0" err="1"/>
               <a:t>sudo</a:t>
             </a:r>
             <a:r>
-              <a:rPr lang="en-US" dirty="0"/>
-              <a:t> firewall-</a:t>
-            </a:r>
-            <a:r>
-              <a:rPr lang="en-US" dirty="0" err="1"/>
-              <a:t>cmd</a:t>
-            </a:r>
-            <a:r>
-              <a:rPr lang="en-US" dirty="0"/>
-              <a:t> --zone=public --add-port=30122/</a:t>
-            </a:r>
-            <a:r>
-              <a:rPr lang="en-US" dirty="0" err="1"/>
-              <a:t>udp</a:t>
-            </a:r>
-            <a:endParaRPr lang="en-US" dirty="0"/>
-          </a:p>
-          <a:p>
-            <a:pPr lvl="2"/>
-            <a:endParaRPr lang="en-US" dirty="0"/>
-          </a:p>
-          <a:p>
-            <a:r>
-              <a:rPr lang="en-US" sz="2400" dirty="0"/>
-              <a:t>Priority for </a:t>
-            </a:r>
-            <a:r>
-              <a:rPr lang="en-US" sz="2400" dirty="0" err="1"/>
-              <a:t>SCReAM</a:t>
-            </a:r>
-            <a:r>
-              <a:rPr lang="en-US" sz="2400" dirty="0"/>
-              <a:t> sender and receiver may need to be elevated to avoid that the </a:t>
-            </a:r>
-            <a:r>
-              <a:rPr lang="en-US" sz="2400" dirty="0" err="1"/>
-              <a:t>SCReAM</a:t>
-            </a:r>
-            <a:r>
-              <a:rPr lang="en-US" sz="2400" dirty="0"/>
-              <a:t> processes are halted by other processes</a:t>
+              <a:rPr lang="en-US" sz="1800" dirty="0"/>
+              <a:t> nice -n - 10 ./bin/scream-</a:t>
+            </a:r>
+            <a:r>
+              <a:rPr lang="en-US" sz="1800" dirty="0" err="1"/>
+              <a:t>bw</a:t>
+            </a:r>
+            <a:r>
+              <a:rPr lang="en-US" sz="1800" dirty="0"/>
+              <a:t>-test-</a:t>
+            </a:r>
+            <a:r>
+              <a:rPr lang="en-US" sz="1800" dirty="0" err="1"/>
+              <a:t>rx</a:t>
+            </a:r>
+            <a:r>
+              <a:rPr lang="en-US" sz="1800" dirty="0"/>
+              <a:t> …..</a:t>
             </a:r>
           </a:p>
           <a:p>
             <a:pPr lvl="1"/>
             <a:r>
-              <a:rPr lang="en-US" dirty="0"/>
+              <a:rPr lang="en-US" sz="1800" dirty="0"/>
               <a:t>&gt;</a:t>
             </a:r>
             <a:r>
-              <a:rPr lang="en-US" dirty="0" err="1"/>
+              <a:rPr lang="en-US" sz="1800" dirty="0" err="1"/>
               <a:t>sudo</a:t>
             </a:r>
             <a:r>
-              <a:rPr lang="en-US" dirty="0"/>
+              <a:rPr lang="en-US" sz="1800" dirty="0"/>
               <a:t> nice -n - 10 ./bin/scream-</a:t>
             </a:r>
             <a:r>
-              <a:rPr lang="en-US" dirty="0" err="1"/>
+              <a:rPr lang="en-US" sz="1800" dirty="0" err="1"/>
               <a:t>bw</a:t>
             </a:r>
             <a:r>
-              <a:rPr lang="en-US" dirty="0"/>
+              <a:rPr lang="en-US" sz="1800" dirty="0"/>
               <a:t>-test-</a:t>
             </a:r>
             <a:r>
-              <a:rPr lang="en-US" dirty="0" err="1"/>
+              <a:rPr lang="en-US" sz="1800" dirty="0" err="1"/>
               <a:t>rx</a:t>
             </a:r>
             <a:r>
-              <a:rPr lang="en-US" dirty="0"/>
+              <a:rPr lang="en-US" sz="1800" dirty="0"/>
               <a:t> …..</a:t>
             </a:r>
           </a:p>
           <a:p>
+            <a:r>
+              <a:rPr lang="en-US" dirty="0"/>
+              <a:t>UDP sockets may need more memory at high bitrates to avoid packet loss </a:t>
+            </a:r>
+          </a:p>
+          <a:p>
             <a:pPr lvl="1"/>
             <a:r>
-              <a:rPr lang="en-US" dirty="0"/>
-              <a:t>&gt;</a:t>
-            </a:r>
-            <a:r>
-              <a:rPr lang="en-US" dirty="0" err="1"/>
-              <a:t>sudo</a:t>
-            </a:r>
-            <a:r>
-              <a:rPr lang="en-US" dirty="0"/>
-              <a:t> nice -n - 10 ./bin/scream-</a:t>
-            </a:r>
-            <a:r>
-              <a:rPr lang="en-US" dirty="0" err="1"/>
-              <a:t>bw</a:t>
-            </a:r>
-            <a:r>
-              <a:rPr lang="en-US" dirty="0"/>
-              <a:t>-test-</a:t>
-            </a:r>
-            <a:r>
-              <a:rPr lang="en-US" dirty="0" err="1"/>
-              <a:t>rx</a:t>
-            </a:r>
-            <a:r>
-              <a:rPr lang="en-US" dirty="0"/>
-              <a:t> …..</a:t>
-            </a:r>
-          </a:p>
-          <a:p>
-            <a:r>
-              <a:rPr lang="en-US" sz="2400" dirty="0"/>
-              <a:t>UDP sockets may need more memory at high bitrates to avoid packet loss </a:t>
-            </a:r>
-          </a:p>
-          <a:p>
-            <a:pPr lvl="1"/>
-            <a:r>
-              <a:rPr lang="en-US" sz="1800" dirty="0"/>
+              <a:rPr lang="en-US" sz="1600" dirty="0"/>
               <a:t>See </a:t>
             </a:r>
             <a:r>
-              <a:rPr lang="en-US" sz="1800" dirty="0">
+              <a:rPr lang="en-US" sz="1600" dirty="0">
                 <a:hlinkClick r:id="rId3"/>
               </a:rPr>
               <a:t>https://medium.com/@CameronSparr/increase-os-udp-buffers-to-improve-performance-51d167bb1360</a:t>
             </a:r>
             <a:r>
-              <a:rPr lang="en-US" sz="1800" dirty="0"/>
+              <a:rPr lang="en-US" sz="1600" dirty="0"/>
               <a:t> for setting of </a:t>
             </a:r>
             <a:r>
-              <a:rPr lang="en-US" sz="1800" dirty="0" err="1"/>
+              <a:rPr lang="en-US" sz="1600" dirty="0" err="1"/>
               <a:t>net.core.rmem_max</a:t>
             </a:r>
             <a:r>
-              <a:rPr lang="en-US" sz="1800" dirty="0"/>
+              <a:rPr lang="en-US" sz="1600" dirty="0"/>
               <a:t>, </a:t>
             </a:r>
             <a:r>
-              <a:rPr lang="en-US" sz="1800" dirty="0" err="1"/>
+              <a:rPr lang="en-US" sz="1600" dirty="0" err="1"/>
               <a:t>net.core.rmem_default</a:t>
             </a:r>
             <a:r>
-              <a:rPr lang="en-US" sz="1800" dirty="0"/>
+              <a:rPr lang="en-US" sz="1600" dirty="0"/>
               <a:t>, </a:t>
             </a:r>
             <a:r>
-              <a:rPr lang="en-US" sz="1800" dirty="0" err="1"/>
+              <a:rPr lang="en-US" sz="1600" dirty="0" err="1"/>
               <a:t>net.core.wmem_max</a:t>
             </a:r>
             <a:r>
-              <a:rPr lang="en-US" sz="1800" dirty="0"/>
+              <a:rPr lang="en-US" sz="1600" dirty="0"/>
               <a:t> and </a:t>
             </a:r>
             <a:r>
-              <a:rPr lang="en-US" sz="1800" dirty="0" err="1"/>
+              <a:rPr lang="en-US" sz="1600" dirty="0" err="1"/>
               <a:t>net.core.wmem_default</a:t>
             </a:r>
-            <a:endParaRPr lang="en-US" sz="1800" dirty="0"/>
+            <a:endParaRPr lang="en-US" sz="1600" dirty="0"/>
           </a:p>
           <a:p>
             <a:pPr marL="183600" lvl="1" indent="0">
@@ -21759,15 +21759,15 @@
         </p:nvSpPr>
         <p:spPr>
           <a:xfrm>
-            <a:off x="937260" y="5798820"/>
-            <a:ext cx="2827020" cy="830580"/>
+            <a:off x="2185146" y="5383530"/>
+            <a:ext cx="5323692" cy="1318484"/>
           </a:xfrm>
           <a:prstGeom prst="rect">
             <a:avLst/>
           </a:prstGeom>
           <a:ln w="57150">
             <a:solidFill>
-              <a:schemeClr val="accent1"/>
+              <a:schemeClr val="accent6"/>
             </a:solidFill>
           </a:ln>
         </p:spPr>
@@ -21781,27 +21781,27 @@
               <a:buNone/>
             </a:pPr>
             <a:r>
-              <a:rPr lang="en-US" sz="1000" dirty="0" err="1"/>
+              <a:rPr lang="en-US" sz="1800" b="1" dirty="0" err="1"/>
               <a:t>sudo</a:t>
             </a:r>
             <a:r>
-              <a:rPr lang="en-US" sz="1000" dirty="0"/>
+              <a:rPr lang="en-US" sz="1800" b="1" dirty="0"/>
               <a:t> </a:t>
             </a:r>
             <a:r>
-              <a:rPr lang="en-US" sz="1000" dirty="0" err="1"/>
+              <a:rPr lang="en-US" sz="1800" b="1" dirty="0" err="1"/>
               <a:t>sysctl</a:t>
             </a:r>
             <a:r>
-              <a:rPr lang="en-US" sz="1000" dirty="0"/>
+              <a:rPr lang="en-US" sz="1800" b="1" dirty="0"/>
               <a:t> -w </a:t>
             </a:r>
             <a:r>
-              <a:rPr lang="en-US" sz="1000" dirty="0" err="1"/>
+              <a:rPr lang="en-US" sz="1800" b="1" dirty="0" err="1"/>
               <a:t>net.core.wmem_max</a:t>
             </a:r>
             <a:r>
-              <a:rPr lang="en-US" sz="1000" dirty="0"/>
+              <a:rPr lang="en-US" sz="1800" b="1" dirty="0"/>
               <a:t>=26214400</a:t>
             </a:r>
           </a:p>
@@ -21810,27 +21810,27 @@
               <a:buNone/>
             </a:pPr>
             <a:r>
-              <a:rPr lang="en-US" sz="1000" dirty="0" err="1"/>
+              <a:rPr lang="en-US" sz="1800" b="1" dirty="0" err="1"/>
               <a:t>sudo</a:t>
             </a:r>
             <a:r>
-              <a:rPr lang="en-US" sz="1000" dirty="0"/>
+              <a:rPr lang="en-US" sz="1800" b="1" dirty="0"/>
               <a:t> </a:t>
             </a:r>
             <a:r>
-              <a:rPr lang="en-US" sz="1000" dirty="0" err="1"/>
+              <a:rPr lang="en-US" sz="1800" b="1" dirty="0" err="1"/>
               <a:t>sysctl</a:t>
             </a:r>
             <a:r>
-              <a:rPr lang="en-US" sz="1000" dirty="0"/>
+              <a:rPr lang="en-US" sz="1800" b="1" dirty="0"/>
               <a:t> -w </a:t>
             </a:r>
             <a:r>
-              <a:rPr lang="en-US" sz="1000" dirty="0" err="1"/>
+              <a:rPr lang="en-US" sz="1800" b="1" dirty="0" err="1"/>
               <a:t>net.core.wmem_default</a:t>
             </a:r>
             <a:r>
-              <a:rPr lang="en-US" sz="1000" dirty="0"/>
+              <a:rPr lang="en-US" sz="1800" b="1" dirty="0"/>
               <a:t>=26214400</a:t>
             </a:r>
           </a:p>
@@ -21839,27 +21839,27 @@
               <a:buNone/>
             </a:pPr>
             <a:r>
-              <a:rPr lang="en-US" sz="1000" dirty="0" err="1"/>
+              <a:rPr lang="en-US" sz="1800" b="1" dirty="0" err="1"/>
               <a:t>sudo</a:t>
             </a:r>
             <a:r>
-              <a:rPr lang="en-US" sz="1000" dirty="0"/>
+              <a:rPr lang="en-US" sz="1800" b="1" dirty="0"/>
               <a:t> </a:t>
             </a:r>
             <a:r>
-              <a:rPr lang="en-US" sz="1000" dirty="0" err="1"/>
+              <a:rPr lang="en-US" sz="1800" b="1" dirty="0" err="1"/>
               <a:t>sysctl</a:t>
             </a:r>
             <a:r>
-              <a:rPr lang="en-US" sz="1000" dirty="0"/>
+              <a:rPr lang="en-US" sz="1800" b="1" dirty="0"/>
               <a:t> -w </a:t>
             </a:r>
             <a:r>
-              <a:rPr lang="en-US" sz="1000" dirty="0" err="1"/>
+              <a:rPr lang="en-US" sz="1800" b="1" dirty="0" err="1"/>
               <a:t>net.core.rmem_max</a:t>
             </a:r>
             <a:r>
-              <a:rPr lang="en-US" sz="1000" dirty="0"/>
+              <a:rPr lang="en-US" sz="1800" b="1" dirty="0"/>
               <a:t>=26214400</a:t>
             </a:r>
           </a:p>
@@ -21868,27 +21868,27 @@
               <a:buNone/>
             </a:pPr>
             <a:r>
-              <a:rPr lang="en-US" sz="1000" dirty="0" err="1"/>
+              <a:rPr lang="en-US" sz="1800" b="1" dirty="0" err="1"/>
               <a:t>sudo</a:t>
             </a:r>
             <a:r>
-              <a:rPr lang="en-US" sz="1000" dirty="0"/>
+              <a:rPr lang="en-US" sz="1800" b="1" dirty="0"/>
               <a:t> </a:t>
             </a:r>
             <a:r>
-              <a:rPr lang="en-US" sz="1000" dirty="0" err="1"/>
+              <a:rPr lang="en-US" sz="1800" b="1" dirty="0" err="1"/>
               <a:t>sysctl</a:t>
             </a:r>
             <a:r>
-              <a:rPr lang="en-US" sz="1000" dirty="0"/>
+              <a:rPr lang="en-US" sz="1800" b="1" dirty="0"/>
               <a:t> -w </a:t>
             </a:r>
             <a:r>
-              <a:rPr lang="en-US" sz="1000" dirty="0" err="1"/>
+              <a:rPr lang="en-US" sz="1800" b="1" dirty="0" err="1"/>
               <a:t>net.core.rmem_default</a:t>
             </a:r>
             <a:r>
-              <a:rPr lang="en-US" sz="1000" dirty="0"/>
+              <a:rPr lang="en-US" sz="1800" b="1" dirty="0"/>
               <a:t>=26214400</a:t>
             </a:r>
           </a:p>
@@ -23322,7 +23322,7 @@
           <a:graphicData uri="http://schemas.openxmlformats.org/presentationml/2006/ole">
             <mc:AlternateContent xmlns:mc="http://schemas.openxmlformats.org/markup-compatibility/2006">
               <mc:Choice xmlns:v="urn:schemas-microsoft-com:vml" Requires="v">
-                <p:oleObj spid="_x0000_s1059" name="Visio" r:id="rId5" imgW="2533577" imgH="3257685" progId="Visio.Drawing.11">
+                <p:oleObj spid="_x0000_s1061" name="Visio" r:id="rId5" imgW="2533577" imgH="3257685" progId="Visio.Drawing.11">
                   <p:embed/>
                 </p:oleObj>
               </mc:Choice>
@@ -27496,18 +27496,54 @@
 </file>
 
 <file path=customXml/item1.xml><?xml version="1.0" encoding="utf-8"?>
+<TemplafySlideTemplateConfiguration><![CDATA[{"documentContentValidatorConfiguration":{"enableDocumentContentValidator":false,"documentContentValidatorVersion":0},"elementsMetadata":[],"slideId":"637037983905221558","enableDocumentContentUpdater":true,"version":"1.9"}]]></TemplafySlideTemplateConfiguration>
+</file>
+
+<file path=customXml/item10.xml><?xml version="1.0" encoding="utf-8"?>
+<TemplafySlideTemplateConfiguration><![CDATA[{"documentContentValidatorConfiguration":{"enableDocumentContentValidator":false,"documentContentValidatorVersion":0},"elementsMetadata":[],"slideId":"637050925554934895","enableDocumentContentUpdater":true,"version":"1.9"}]]></TemplafySlideTemplateConfiguration>
+</file>
+
+<file path=customXml/item11.xml><?xml version="1.0" encoding="utf-8"?>
+<TemplafySlideTemplateConfiguration><![CDATA[{"documentContentValidatorConfiguration":{"enableDocumentContentValidator":false,"documentContentValidatorVersion":0},"elementsMetadata":[],"slideId":"637037983905678162","enableDocumentContentUpdater":true,"version":"1.9"}]]></TemplafySlideTemplateConfiguration>
+</file>
+
+<file path=customXml/item12.xml><?xml version="1.0" encoding="utf-8"?>
 <TemplafySlideFormConfiguration><![CDATA[{"formFields":[],"formDataEntries":[]}]]></TemplafySlideFormConfiguration>
 </file>
 
-<file path=customXml/item10.xml><?xml version="1.0" encoding="utf-8"?>
+<file path=customXml/item13.xml><?xml version="1.0" encoding="utf-8"?>
 <TemplafySlideFormConfiguration><![CDATA[{"formFields":[],"formDataEntries":[]}]]></TemplafySlideFormConfiguration>
 </file>
 
-<file path=customXml/item11.xml><?xml version="1.0" encoding="utf-8"?>
-<TemplafySlideTemplateConfiguration><![CDATA[{"elementsMetadata":[],"documentContentValidatorConfiguration":{"enableDocumentContentValidator":false,"documentContentValidatorVersion":0},"slideId":"637027476704980324","enableDocumentContentUpdater":true,"version":"1.9"}]]></TemplafySlideTemplateConfiguration>
+<file path=customXml/item14.xml><?xml version="1.0" encoding="utf-8"?>
+<TemplafySlideFormConfiguration><![CDATA[{"formFields":[],"formDataEntries":[]}]]></TemplafySlideFormConfiguration>
 </file>
 
-<file path=customXml/item12.xml><?xml version="1.0" encoding="utf-8"?>
+<file path=customXml/item15.xml><?xml version="1.0" encoding="utf-8"?>
+<TemplafySlideTemplateConfiguration><![CDATA[{"documentContentValidatorConfiguration":{"enableDocumentContentValidator":false,"documentContentValidatorVersion":0},"elementsMetadata":[],"slideId":"637171128435648944","enableDocumentContentUpdater":true,"version":"1.9"}]]></TemplafySlideTemplateConfiguration>
+</file>
+
+<file path=customXml/item16.xml><?xml version="1.0" encoding="utf-8"?>
+<TemplafySlideTemplateConfiguration><![CDATA[{"documentContentValidatorConfiguration":{"enableDocumentContentValidator":false,"documentContentValidatorVersion":0},"elementsMetadata":[],"slideId":"637171128435180813","enableDocumentContentUpdater":true,"version":"1.9"}]]></TemplafySlideTemplateConfiguration>
+</file>
+
+<file path=customXml/item17.xml><?xml version="1.0" encoding="utf-8"?>
+<TemplafySlideFormConfiguration><![CDATA[{"formFields":[],"formDataEntries":[]}]]></TemplafySlideFormConfiguration>
+</file>
+
+<file path=customXml/item18.xml><?xml version="1.0" encoding="utf-8"?>
+<TemplafyTemplateConfiguration><![CDATA[{"elementsMetadata":[{"type":"shape","id":"5d67e717-74bf-41a6-8dce-47082e2c1da1","elementConfiguration":{"inheritDimensions":"inheritNone","height":"1.34 cm","binding":"Form.LogoInsertion.Pplogoname","disableUpdates":false,"type":"image"}}],"transformationConfigurations":[{"language":"{{DocumentLanguage}}","disableUpdates":false,"type":"proofingLanguage"},{"propertyName":"FooterText","propertyValue":"true","disableUpdates":false,"type":"customDocumentProperty"},{"propertyName":"SecurityClass","propertyValue":"{{Form.ConfidentialityClass.Confidentiality}}","disableUpdates":false,"type":"customDocumentProperty"},{"propertyName":"ExtConf","propertyValue":"{{Form.ExternalConfidentialityLabel.ExternalConfidentiality}}","disableUpdates":false,"type":"customDocumentProperty"},{"propertyName":"Prepared","propertyValue":"{{Form.Prepared}}","disableUpdates":false,"type":"customDocumentProperty"},{"propertyName":"ApprovedBy","propertyValue":"{{Form.ApprovedBy}}","disableUpdates":false,"type":"customDocumentProperty"},{"propertyName":"DocNo","propertyValue":"{{Form.DocumentNumber}} {{Form.LanguageCode.LanguageCode}}","disableUpdates":false,"type":"customDocumentProperty"},{"propertyName":"Checked","propertyValue":"{{Form.Checked}}","disableUpdates":false,"type":"customDocumentProperty"},{"propertyName":"Date","propertyValue":"{{Form.Date}}","disableUpdates":false,"type":"customDocumentProperty"},{"propertyName":"Reference","propertyValue":"{{Form.Reference}}","disableUpdates":false,"type":"customDocumentProperty"},{"propertyName":"Title","propertyValue":"{{Form.DocumentTitle}}","disableUpdates":false,"type":"customDocumentProperty"},{"propertyName":"Keyword","propertyValue":"{{Form.Keywords}}","disableUpdates":false,"type":"customDocumentProperty"},{"propertyName":"DocumentType","propertyValue":"Presentation2011","disableUpdates":false,"type":"customDocumentProperty"},{"propertyName":"Language","propertyValue":"EnglishUS","disableUpdates":false,"type":"customDocumentProperty"},{"propertyName":"TemplateID","propertyValue":"FALSE","disableUpdates":false,"type":"customDocumentProperty"},{"propertyName":"ConfCtrl","propertyValue":"FALSE","disableUpdates":false,"type":"customDocumentProperty"},{"propertyName":"title","propertyValue":"{{Form.DocumentTitle}}","disableUpdates":false,"type":"documentProperty"},{"propertyName":"keywords","propertyValue":"{{Form.Keywords}}","disableUpdates":false,"type":"documentProperty"},{"propertyName":"creator","propertyValue":"{{Form.Prepared}}","disableUpdates":false,"type":"documentProperty"},{"propertyName":"DocTitle","propertyValue":"{{Form.DocTitle.DocTitle}}","disableUpdates":false,"type":"customDocumentProperty"},{"propertyName":"IsDocument","propertyValue":"{{Form.TemplateType.IsDocument}}","disableUpdates":false,"type":"customDocumentProperty"},{"propertyName":"IsPresentation","propertyValue":"{{Form.TemplateType.IsPresentation}}","disableUpdates":false,"type":"customDocumentProperty"},{"propertyName":"company","propertyValue":"Ericsson","disableUpdates":false,"type":"documentProperty"},{"propertyName":"PageNumberVisible","propertyValue":"{{Form.TotalPageNo.TotalPageNo_value}}","disableUpdates":false,"type":"customDocumentProperty"},{"propertyName":"Revision","propertyValue":"{{Form.Revision}}","disableUpdates":false,"type":"customDocumentProperty"},{"propertyName":"DocType","propertyValue":"{{Form.DocTypePresentation}}","disableUpdates":false,"type":"customDocumentProperty"},{"propertyName":"TemplateVersion","propertyValue":"R2A","disableUpdates":false,"type":"customDocumentProperty"},{"propertyName":"PackageNo","propertyValue":"LXA 119 603","disableUpdates":false,"type":"customDocumentProperty"},{"propertyName":"PackageVersion","propertyValue":"R6B","disableUpdates":false,"type":"customDocumentProperty"},{"propertyName":"TemplateName","propertyValue":"CXC 173 2731/1","disableUpdates":false,"type":"customDocumentProperty"},{"propertyName":"DocName","propertyValue":" ","disableUpdates":false,"type":"customDocumentProperty"},{"propertyName":"description","propertyValue":"{{Form.DocumentNumber}} {{Form.LanguageCode.LanguageCode}}\nRev {{Form.Revision}}","disableUpdates":false,"type":"documentProperty"}],"templateName":"New presentation (Standard landscape)","templateDescription":"","enableDocumentContentUpdater":true,"version":"1.9"}]]></TemplafyTemplateConfiguration>
+</file>
+
+<file path=customXml/item19.xml><?xml version="1.0" encoding="utf-8"?>
+<TemplafySlideFormConfiguration><![CDATA[{"formFields":[],"formDataEntries":[]}]]></TemplafySlideFormConfiguration>
+</file>
+
+<file path=customXml/item2.xml><?xml version="1.0" encoding="utf-8"?>
+<TemplafyFormConfiguration><![CDATA[{"formFields":[{"required":true,"placeholder":"","lines":0,"type":"textBox","name":"DocumentTitle","label":"Document Title","helpTexts":{"prefix":"","postfix":""},"spacing":{},"fullyQualifiedName":"DocumentTitle"},{"dataSource":"Confidentiality","displayColumn":"confidentiality","hideIfNoUserInteractionRequired":false,"distinct":true,"required":true,"autoSelectFirstOption":false,"type":"dropDown","name":"ConfidentialityClass","label":"Confidentiality Class","helpTexts":{"prefix":"","postfix":""},"spacing":{},"fullyQualifiedName":"ConfidentialityClass"},{"dataSource":"External Confidentiality label","displayColumn":"externalConfidentiality","hideIfNoUserInteractionRequired":false,"distinct":true,"required":false,"autoSelectFirstOption":false,"defaultValue":"1","type":"dropDown","name":"ExternalConfidentialityLabel","label":"External Confidentiality label","helpTexts":{"prefix":"","postfix":"If no external confidentiality class then please choose the blank value"},"spacing":{},"fullyQualifiedName":"ExternalConfidentialityLabel"},{"dataSource":"PowerPoint Document Type","column":"documentType","required":false,"placeholder":"","autoSelectFirstOption":false,"type":"comboBox","name":"DocTypePresentation","label":"Document Type Presentation","helpTexts":{"prefix":"","postfix":"If the document type differs from the default value, click on the X to delete and type/choose another type."},"spacing":{},"fullyQualifiedName":"DocTypePresentation"},{"required":false,"placeholder":"","lines":0,"type":"textBox","name":"DocumentNumber","label":"Document Number","helpTexts":{"prefix":"","postfix":""},"spacing":{},"fullyQualifiedName":"DocumentNumber"},{"dataSource":"Language code","displayColumn":"showName","hideIfNoUserInteractionRequired":false,"distinct":true,"required":false,"autoSelectFirstOption":false,"defaultValue":"1","type":"dropDown","name":"LanguageCode","label":"Language Code","helpTexts":{"prefix":"","postfix":"The language code will be appended to the Document No."},"spacing":{},"fullyQualifiedName":"LanguageCode"},{"dataSource":"Revision","column":"revision","required":false,"placeholder":"","autoSelectFirstOption":false,"type":"comboBox","name":"Revision","label":"Revision","helpTexts":{"prefix":"","postfix":""},"spacing":{},"fullyQualifiedName":"Revision"},{"required":false,"type":"datePicker","name":"Date","label":"Date","helpTexts":{"prefix":"","postfix":""},"spacing":{},"fullyQualifiedName":"Date"},{"type":"heading","name":"FooterVisibilityOptions","label":"Footer Visibility Options","helpTexts":{"prefix":"","postfix":""},"spacing":{},"fullyQualifiedName":"FooterVisibilityOptions"},{"dataSource":"PPT FooterVisibility","displayColumn":"templateType","hideIfNoUserInteractionRequired":false,"distinct":true,"required":true,"autoSelectFirstOption":false,"defaultValue":"1","type":"dropDown","name":"TemplateType","label":"Is this a document or presentation?","helpTexts":{"prefix":"","postfix":""},"spacing":{},"fullyQualifiedName":"TemplateType"},{"dataSource":"PPT FooterVisibility","displayColumn":"docTitle_label","hideIfNoUserInteractionRequired":false,"distinct":true,"required":false,"autoSelectFirstOption":true,"filter":{"column":"templateType","otherFieldName":"TemplateType","fullyQualifiedOtherFieldName":"TemplateType","otherFieldColumn":"TemplateType","formReference":"none","operator":"equals"},"type":"dropDown","name":"DocTitle","label":"Show document title in footer?","helpTexts":{"prefix":"","postfix":""},"spacing":{},"fullyQualifiedName":"DocTitle"},{"dataSource":"PPT FooterVisibility","displayColumn":"totalPageNo_text","hideIfNoUserInteractionRequired":false,"distinct":true,"required":false,"autoSelectFirstOption":true,"filter":{"column":"templateType","otherFieldName":"TemplateType","fullyQualifiedOtherFieldName":"TemplateType","otherFieldColumn":"TemplateType","formReference":"none","operator":"equals"},"type":"dropDown","name":"TotalPageNo","label":"Page numbering","helpTexts":{"prefix":"","postfix":""},"spacing":{},"fullyQualifiedName":"TotalPageNo"},{"required":false,"placeholder":"","lines":0,"defaultValue":"{{UserProfile.Prepared}}","type":"textBox","name":"Prepared","label":"Prepared By (Subject Responsible)","helpTexts":{"prefix":"","postfix":""},"spacing":{},"fullyQualifiedName":"Prepared"},{"required":false,"placeholder":"","lines":0,"type":"textBox","name":"ApprovedBy","label":"Approved By (Document Responsible)","helpTexts":{"prefix":"","postfix":""},"spacing":{},"fullyQualifiedName":"ApprovedBy"},{"required":false,"placeholder":"","lines":0,"type":"textBox","name":"Checked","label":"Checked","helpTexts":{"prefix":"","postfix":""},"spacing":{},"fullyQualifiedName":"Checked"},{"required":false,"placeholder":"","lines":0,"type":"textBox","name":"Reference","label":"Reference","helpTexts":{"prefix":"","postfix":""},"spacing":{},"fullyQualifiedName":"Reference"},{"required":false,"placeholder":"","lines":0,"type":"textBox","name":"Keywords","label":"Keywords","helpTexts":{"prefix":"","postfix":""},"spacing":{},"fullyQualifiedName":"Keywords"}],"formDataEntries":[{"name":"DocumentTitle","value":"HfKMJ7wB7KPEWJpFWibMqg=="},{"name":"ConfidentialityClass","value":"cT/FOwTWaPknrhRlNMh4SQ=="},{"name":"ExternalConfidentialityLabel","value":"u2D/MG3wyuAQhkGvE2fPaA=="},{"name":"LanguageCode","value":"5wlu7ZdPxHQj1W0w+yTNSg=="},{"name":"Date","value":"vb48xUhp/+BouvbbBJesXw=="},{"name":"TemplateType","value":"PxVEvJY8nE7m/hY9622Sng=="},{"name":"DocTitle","value":"PxVEvJY8nE7m/hY9622Sng=="},{"name":"TotalPageNo","value":"PxVEvJY8nE7m/hY9622Sng=="},{"name":"Prepared","value":"PqdHBiLjqdpOMxfLUK9Tonaq9XwuinzCFKYJ7RK3+SI="}]}]]></TemplafyFormConfiguration>
+</file>
+
+<file path=customXml/item3.xml><?xml version="1.0" encoding="utf-8"?>
 <ct:contentTypeSchema xmlns:ct="http://schemas.microsoft.com/office/2006/metadata/contentType" xmlns:ma="http://schemas.microsoft.com/office/2006/metadata/properties/metaAttributes" ct:_="" ma:_="" ma:contentTypeName="Document" ma:contentTypeID="0x0101002C8661F604A9A64C9627B875CBEE0D49" ma:contentTypeVersion="13" ma:contentTypeDescription="Create a new document." ma:contentTypeScope="" ma:versionID="efb89547655977800231d60c8e2388d5">
   <xsd:schema xmlns:xsd="http://www.w3.org/2001/XMLSchema" xmlns:xs="http://www.w3.org/2001/XMLSchema" xmlns:p="http://schemas.microsoft.com/office/2006/metadata/properties" xmlns:ns3="92e1255f-bb7b-4dc9-b051-584cc104eb44" xmlns:ns4="a6550eff-0fc9-443f-8e77-72cbcf778382" targetNamespace="http://schemas.microsoft.com/office/2006/metadata/properties" ma:root="true" ma:fieldsID="5147822fdb6803771ba7305cbc438486" ns3:_="" ns4:_="">
     <xsd:import namespace="92e1255f-bb7b-4dc9-b051-584cc104eb44"/>
@@ -27730,23 +27766,7 @@
 </ct:contentTypeSchema>
 </file>
 
-<file path=customXml/item13.xml><?xml version="1.0" encoding="utf-8"?>
-<TemplafyTemplateConfiguration><![CDATA[{"elementsMetadata":[{"type":"shape","id":"5d67e717-74bf-41a6-8dce-47082e2c1da1","elementConfiguration":{"inheritDimensions":"inheritNone","height":"1.34 cm","binding":"Form.LogoInsertion.Pplogoname","disableUpdates":false,"type":"image"}}],"transformationConfigurations":[{"language":"{{DocumentLanguage}}","disableUpdates":false,"type":"proofingLanguage"},{"propertyName":"FooterText","propertyValue":"true","disableUpdates":false,"type":"customDocumentProperty"},{"propertyName":"SecurityClass","propertyValue":"{{Form.ConfidentialityClass.Confidentiality}}","disableUpdates":false,"type":"customDocumentProperty"},{"propertyName":"ExtConf","propertyValue":"{{Form.ExternalConfidentialityLabel.ExternalConfidentiality}}","disableUpdates":false,"type":"customDocumentProperty"},{"propertyName":"Prepared","propertyValue":"{{Form.Prepared}}","disableUpdates":false,"type":"customDocumentProperty"},{"propertyName":"ApprovedBy","propertyValue":"{{Form.ApprovedBy}}","disableUpdates":false,"type":"customDocumentProperty"},{"propertyName":"DocNo","propertyValue":"{{Form.DocumentNumber}} {{Form.LanguageCode.LanguageCode}}","disableUpdates":false,"type":"customDocumentProperty"},{"propertyName":"Checked","propertyValue":"{{Form.Checked}}","disableUpdates":false,"type":"customDocumentProperty"},{"propertyName":"Date","propertyValue":"{{Form.Date}}","disableUpdates":false,"type":"customDocumentProperty"},{"propertyName":"Reference","propertyValue":"{{Form.Reference}}","disableUpdates":false,"type":"customDocumentProperty"},{"propertyName":"Title","propertyValue":"{{Form.DocumentTitle}}","disableUpdates":false,"type":"customDocumentProperty"},{"propertyName":"Keyword","propertyValue":"{{Form.Keywords}}","disableUpdates":false,"type":"customDocumentProperty"},{"propertyName":"DocumentType","propertyValue":"Presentation2011","disableUpdates":false,"type":"customDocumentProperty"},{"propertyName":"Language","propertyValue":"EnglishUS","disableUpdates":false,"type":"customDocumentProperty"},{"propertyName":"TemplateID","propertyValue":"FALSE","disableUpdates":false,"type":"customDocumentProperty"},{"propertyName":"ConfCtrl","propertyValue":"FALSE","disableUpdates":false,"type":"customDocumentProperty"},{"propertyName":"title","propertyValue":"{{Form.DocumentTitle}}","disableUpdates":false,"type":"documentProperty"},{"propertyName":"keywords","propertyValue":"{{Form.Keywords}}","disableUpdates":false,"type":"documentProperty"},{"propertyName":"creator","propertyValue":"{{Form.Prepared}}","disableUpdates":false,"type":"documentProperty"},{"propertyName":"DocTitle","propertyValue":"{{Form.DocTitle.DocTitle}}","disableUpdates":false,"type":"customDocumentProperty"},{"propertyName":"IsDocument","propertyValue":"{{Form.TemplateType.IsDocument}}","disableUpdates":false,"type":"customDocumentProperty"},{"propertyName":"IsPresentation","propertyValue":"{{Form.TemplateType.IsPresentation}}","disableUpdates":false,"type":"customDocumentProperty"},{"propertyName":"company","propertyValue":"Ericsson","disableUpdates":false,"type":"documentProperty"},{"propertyName":"PageNumberVisible","propertyValue":"{{Form.TotalPageNo.TotalPageNo_value}}","disableUpdates":false,"type":"customDocumentProperty"},{"propertyName":"Revision","propertyValue":"{{Form.Revision}}","disableUpdates":false,"type":"customDocumentProperty"},{"propertyName":"DocType","propertyValue":"{{Form.DocTypePresentation}}","disableUpdates":false,"type":"customDocumentProperty"},{"propertyName":"TemplateVersion","propertyValue":"R2A","disableUpdates":false,"type":"customDocumentProperty"},{"propertyName":"PackageNo","propertyValue":"LXA 119 603","disableUpdates":false,"type":"customDocumentProperty"},{"propertyName":"PackageVersion","propertyValue":"R6B","disableUpdates":false,"type":"customDocumentProperty"},{"propertyName":"TemplateName","propertyValue":"CXC 173 2731/1","disableUpdates":false,"type":"customDocumentProperty"},{"propertyName":"DocName","propertyValue":" ","disableUpdates":false,"type":"customDocumentProperty"},{"propertyName":"description","propertyValue":"{{Form.DocumentNumber}} {{Form.LanguageCode.LanguageCode}}\nRev {{Form.Revision}}","disableUpdates":false,"type":"documentProperty"}],"templateName":"New presentation (Standard landscape)","templateDescription":"","enableDocumentContentUpdater":true,"version":"1.9"}]]></TemplafyTemplateConfiguration>
-</file>
-
-<file path=customXml/item14.xml><?xml version="1.0" encoding="utf-8"?>
-<TemplafySlideTemplateConfiguration><![CDATA[{"documentContentValidatorConfiguration":{"enableDocumentContentValidator":false,"documentContentValidatorVersion":0},"elementsMetadata":[],"slideId":"637171128435180813","enableDocumentContentUpdater":true,"version":"1.9"}]]></TemplafySlideTemplateConfiguration>
-</file>
-
-<file path=customXml/item15.xml><?xml version="1.0" encoding="utf-8"?>
-<TemplafySlideTemplateConfiguration><![CDATA[{"documentContentValidatorConfiguration":{"enableDocumentContentValidator":false,"documentContentValidatorVersion":0},"elementsMetadata":[],"slideId":"637037983905678162","enableDocumentContentUpdater":true,"version":"1.9"}]]></TemplafySlideTemplateConfiguration>
-</file>
-
-<file path=customXml/item16.xml><?xml version="1.0" encoding="utf-8"?>
-<TemplafySlideFormConfiguration><![CDATA[{"formFields":[],"formDataEntries":[]}]]></TemplafySlideFormConfiguration>
-</file>
-
-<file path=customXml/item17.xml><?xml version="1.0" encoding="utf-8"?>
+<file path=customXml/item4.xml><?xml version="1.0" encoding="utf-8"?>
 <?mso-contentType ?>
 <FormTemplates xmlns="http://schemas.microsoft.com/sharepoint/v3/contenttype/forms">
   <Display>DocumentLibraryForm</Display>
@@ -27755,67 +27775,101 @@
 </FormTemplates>
 </file>
 
-<file path=customXml/item18.xml><?xml version="1.0" encoding="utf-8"?>
-<TemplafySlideFormConfiguration><![CDATA[{"formFields":[],"formDataEntries":[]}]]></TemplafySlideFormConfiguration>
-</file>
-
-<file path=customXml/item19.xml><?xml version="1.0" encoding="utf-8"?>
-<TemplafySlideFormConfiguration><![CDATA[{"formFields":[],"formDataEntries":[]}]]></TemplafySlideFormConfiguration>
-</file>
-
-<file path=customXml/item2.xml><?xml version="1.0" encoding="utf-8"?>
+<file path=customXml/item5.xml><?xml version="1.0" encoding="utf-8"?>
 <p:properties xmlns:p="http://schemas.microsoft.com/office/2006/metadata/properties" xmlns:xsi="http://www.w3.org/2001/XMLSchema-instance" xmlns:pc="http://schemas.microsoft.com/office/infopath/2007/PartnerControls">
   <documentManagement/>
 </p:properties>
 </file>
 
-<file path=customXml/item3.xml><?xml version="1.0" encoding="utf-8"?>
-<TemplafySlideTemplateConfiguration><![CDATA[{"documentContentValidatorConfiguration":{"enableDocumentContentValidator":false,"documentContentValidatorVersion":0},"elementsMetadata":[],"slideId":"637037983905221558","enableDocumentContentUpdater":true,"version":"1.9"}]]></TemplafySlideTemplateConfiguration>
-</file>
-
-<file path=customXml/item4.xml><?xml version="1.0" encoding="utf-8"?>
+<file path=customXml/item6.xml><?xml version="1.0" encoding="utf-8"?>
 <TemplafySlideFormConfiguration><![CDATA[{"formFields":[],"formDataEntries":[]}]]></TemplafySlideFormConfiguration>
 </file>
 
-<file path=customXml/item5.xml><?xml version="1.0" encoding="utf-8"?>
-<TemplafySlideTemplateConfiguration><![CDATA[{"documentContentValidatorConfiguration":{"enableDocumentContentValidator":false,"documentContentValidatorVersion":0},"elementsMetadata":[],"slideId":"637050925554934895","enableDocumentContentUpdater":true,"version":"1.9"}]]></TemplafySlideTemplateConfiguration>
+<file path=customXml/item7.xml><?xml version="1.0" encoding="utf-8"?>
+<TemplafySlideFormConfiguration><![CDATA[{"formFields":[],"formDataEntries":[]}]]></TemplafySlideFormConfiguration>
 </file>
 
-<file path=customXml/item6.xml><?xml version="1.0" encoding="utf-8"?>
+<file path=customXml/item8.xml><?xml version="1.0" encoding="utf-8"?>
 <TemplafySlideTemplateConfiguration><![CDATA[{"documentContentValidatorConfiguration":{"enableDocumentContentValidator":false,"documentContentValidatorVersion":0},"elementsMetadata":[],"slideId":"637037983905221557","enableDocumentContentUpdater":true,"version":"1.9"}]]></TemplafySlideTemplateConfiguration>
 </file>
 
-<file path=customXml/item7.xml><?xml version="1.0" encoding="utf-8"?>
-<TemplafyFormConfiguration><![CDATA[{"formFields":[{"required":true,"placeholder":"","lines":0,"type":"textBox","name":"DocumentTitle","label":"Document Title","helpTexts":{"prefix":"","postfix":""},"spacing":{},"fullyQualifiedName":"DocumentTitle"},{"dataSource":"Confidentiality","displayColumn":"confidentiality","hideIfNoUserInteractionRequired":false,"distinct":true,"required":true,"autoSelectFirstOption":false,"type":"dropDown","name":"ConfidentialityClass","label":"Confidentiality Class","helpTexts":{"prefix":"","postfix":""},"spacing":{},"fullyQualifiedName":"ConfidentialityClass"},{"dataSource":"External Confidentiality label","displayColumn":"externalConfidentiality","hideIfNoUserInteractionRequired":false,"distinct":true,"required":false,"autoSelectFirstOption":false,"defaultValue":"1","type":"dropDown","name":"ExternalConfidentialityLabel","label":"External Confidentiality label","helpTexts":{"prefix":"","postfix":"If no external confidentiality class then please choose the blank value"},"spacing":{},"fullyQualifiedName":"ExternalConfidentialityLabel"},{"dataSource":"PowerPoint Document Type","column":"documentType","required":false,"placeholder":"","autoSelectFirstOption":false,"type":"comboBox","name":"DocTypePresentation","label":"Document Type Presentation","helpTexts":{"prefix":"","postfix":"If the document type differs from the default value, click on the X to delete and type/choose another type."},"spacing":{},"fullyQualifiedName":"DocTypePresentation"},{"required":false,"placeholder":"","lines":0,"type":"textBox","name":"DocumentNumber","label":"Document Number","helpTexts":{"prefix":"","postfix":""},"spacing":{},"fullyQualifiedName":"DocumentNumber"},{"dataSource":"Language code","displayColumn":"showName","hideIfNoUserInteractionRequired":false,"distinct":true,"required":false,"autoSelectFirstOption":false,"defaultValue":"1","type":"dropDown","name":"LanguageCode","label":"Language Code","helpTexts":{"prefix":"","postfix":"The language code will be appended to the Document No."},"spacing":{},"fullyQualifiedName":"LanguageCode"},{"dataSource":"Revision","column":"revision","required":false,"placeholder":"","autoSelectFirstOption":false,"type":"comboBox","name":"Revision","label":"Revision","helpTexts":{"prefix":"","postfix":""},"spacing":{},"fullyQualifiedName":"Revision"},{"required":false,"type":"datePicker","name":"Date","label":"Date","helpTexts":{"prefix":"","postfix":""},"spacing":{},"fullyQualifiedName":"Date"},{"type":"heading","name":"FooterVisibilityOptions","label":"Footer Visibility Options","helpTexts":{"prefix":"","postfix":""},"spacing":{},"fullyQualifiedName":"FooterVisibilityOptions"},{"dataSource":"PPT FooterVisibility","displayColumn":"templateType","hideIfNoUserInteractionRequired":false,"distinct":true,"required":true,"autoSelectFirstOption":false,"defaultValue":"1","type":"dropDown","name":"TemplateType","label":"Is this a document or presentation?","helpTexts":{"prefix":"","postfix":""},"spacing":{},"fullyQualifiedName":"TemplateType"},{"dataSource":"PPT FooterVisibility","displayColumn":"docTitle_label","hideIfNoUserInteractionRequired":false,"distinct":true,"required":false,"autoSelectFirstOption":true,"filter":{"column":"templateType","otherFieldName":"TemplateType","fullyQualifiedOtherFieldName":"TemplateType","otherFieldColumn":"TemplateType","formReference":"none","operator":"equals"},"type":"dropDown","name":"DocTitle","label":"Show document title in footer?","helpTexts":{"prefix":"","postfix":""},"spacing":{},"fullyQualifiedName":"DocTitle"},{"dataSource":"PPT FooterVisibility","displayColumn":"totalPageNo_text","hideIfNoUserInteractionRequired":false,"distinct":true,"required":false,"autoSelectFirstOption":true,"filter":{"column":"templateType","otherFieldName":"TemplateType","fullyQualifiedOtherFieldName":"TemplateType","otherFieldColumn":"TemplateType","formReference":"none","operator":"equals"},"type":"dropDown","name":"TotalPageNo","label":"Page numbering","helpTexts":{"prefix":"","postfix":""},"spacing":{},"fullyQualifiedName":"TotalPageNo"},{"required":false,"placeholder":"","lines":0,"defaultValue":"{{UserProfile.Prepared}}","type":"textBox","name":"Prepared","label":"Prepared By (Subject Responsible)","helpTexts":{"prefix":"","postfix":""},"spacing":{},"fullyQualifiedName":"Prepared"},{"required":false,"placeholder":"","lines":0,"type":"textBox","name":"ApprovedBy","label":"Approved By (Document Responsible)","helpTexts":{"prefix":"","postfix":""},"spacing":{},"fullyQualifiedName":"ApprovedBy"},{"required":false,"placeholder":"","lines":0,"type":"textBox","name":"Checked","label":"Checked","helpTexts":{"prefix":"","postfix":""},"spacing":{},"fullyQualifiedName":"Checked"},{"required":false,"placeholder":"","lines":0,"type":"textBox","name":"Reference","label":"Reference","helpTexts":{"prefix":"","postfix":""},"spacing":{},"fullyQualifiedName":"Reference"},{"required":false,"placeholder":"","lines":0,"type":"textBox","name":"Keywords","label":"Keywords","helpTexts":{"prefix":"","postfix":""},"spacing":{},"fullyQualifiedName":"Keywords"}],"formDataEntries":[{"name":"DocumentTitle","value":"HfKMJ7wB7KPEWJpFWibMqg=="},{"name":"ConfidentialityClass","value":"cT/FOwTWaPknrhRlNMh4SQ=="},{"name":"ExternalConfidentialityLabel","value":"u2D/MG3wyuAQhkGvE2fPaA=="},{"name":"LanguageCode","value":"5wlu7ZdPxHQj1W0w+yTNSg=="},{"name":"Date","value":"vb48xUhp/+BouvbbBJesXw=="},{"name":"TemplateType","value":"PxVEvJY8nE7m/hY9622Sng=="},{"name":"DocTitle","value":"PxVEvJY8nE7m/hY9622Sng=="},{"name":"TotalPageNo","value":"PxVEvJY8nE7m/hY9622Sng=="},{"name":"Prepared","value":"PqdHBiLjqdpOMxfLUK9Tonaq9XwuinzCFKYJ7RK3+SI="}]}]]></TemplafyFormConfiguration>
-</file>
-
-<file path=customXml/item8.xml><?xml version="1.0" encoding="utf-8"?>
-<TemplafySlideFormConfiguration><![CDATA[{"formFields":[],"formDataEntries":[]}]]></TemplafySlideFormConfiguration>
-</file>
-
 <file path=customXml/item9.xml><?xml version="1.0" encoding="utf-8"?>
-<TemplafySlideTemplateConfiguration><![CDATA[{"documentContentValidatorConfiguration":{"enableDocumentContentValidator":false,"documentContentValidatorVersion":0},"elementsMetadata":[],"slideId":"637171128435648944","enableDocumentContentUpdater":true,"version":"1.9"}]]></TemplafySlideTemplateConfiguration>
+<TemplafySlideTemplateConfiguration><![CDATA[{"elementsMetadata":[],"documentContentValidatorConfiguration":{"enableDocumentContentValidator":false,"documentContentValidatorVersion":0},"slideId":"637027476704980324","enableDocumentContentUpdater":true,"version":"1.9"}]]></TemplafySlideTemplateConfiguration>
 </file>
 
 <file path=customXml/itemProps1.xml><?xml version="1.0" encoding="utf-8"?>
-<ds:datastoreItem xmlns:ds="http://schemas.openxmlformats.org/officeDocument/2006/customXml" ds:itemID="{822D38AD-8010-4CD3-BD6B-117CB8DF70A4}">
+<ds:datastoreItem xmlns:ds="http://schemas.openxmlformats.org/officeDocument/2006/customXml" ds:itemID="{683FEB75-8CFA-449C-A6B1-B1E4A86A58A1}">
   <ds:schemaRefs/>
 </ds:datastoreItem>
 </file>
 
 <file path=customXml/itemProps10.xml><?xml version="1.0" encoding="utf-8"?>
+<ds:datastoreItem xmlns:ds="http://schemas.openxmlformats.org/officeDocument/2006/customXml" ds:itemID="{03AF3FDC-ACD1-46F3-A43E-782322DF9816}">
+  <ds:schemaRefs/>
+</ds:datastoreItem>
+</file>
+
+<file path=customXml/itemProps11.xml><?xml version="1.0" encoding="utf-8"?>
+<ds:datastoreItem xmlns:ds="http://schemas.openxmlformats.org/officeDocument/2006/customXml" ds:itemID="{1CE36EA9-2186-4EB1-871A-8AE59C2A13BB}">
+  <ds:schemaRefs/>
+</ds:datastoreItem>
+</file>
+
+<file path=customXml/itemProps12.xml><?xml version="1.0" encoding="utf-8"?>
 <ds:datastoreItem xmlns:ds="http://schemas.openxmlformats.org/officeDocument/2006/customXml" ds:itemID="{58CC0B31-82B9-497A-9A2E-F3F72D0BBDAD}">
   <ds:schemaRefs/>
 </ds:datastoreItem>
 </file>
 
-<file path=customXml/itemProps11.xml><?xml version="1.0" encoding="utf-8"?>
-<ds:datastoreItem xmlns:ds="http://schemas.openxmlformats.org/officeDocument/2006/customXml" ds:itemID="{C09F197C-6A49-47D0-B877-F88807989676}">
+<file path=customXml/itemProps13.xml><?xml version="1.0" encoding="utf-8"?>
+<ds:datastoreItem xmlns:ds="http://schemas.openxmlformats.org/officeDocument/2006/customXml" ds:itemID="{C99E78A0-C9D4-446F-B674-4DD3E2B46C5D}">
   <ds:schemaRefs/>
 </ds:datastoreItem>
 </file>
 
-<file path=customXml/itemProps12.xml><?xml version="1.0" encoding="utf-8"?>
+<file path=customXml/itemProps14.xml><?xml version="1.0" encoding="utf-8"?>
+<ds:datastoreItem xmlns:ds="http://schemas.openxmlformats.org/officeDocument/2006/customXml" ds:itemID="{32BA7684-6BE4-4F73-B22E-30934AB379B8}">
+  <ds:schemaRefs/>
+</ds:datastoreItem>
+</file>
+
+<file path=customXml/itemProps15.xml><?xml version="1.0" encoding="utf-8"?>
+<ds:datastoreItem xmlns:ds="http://schemas.openxmlformats.org/officeDocument/2006/customXml" ds:itemID="{C750C5DC-043F-4BD3-940C-EB6F7625E286}">
+  <ds:schemaRefs/>
+</ds:datastoreItem>
+</file>
+
+<file path=customXml/itemProps16.xml><?xml version="1.0" encoding="utf-8"?>
+<ds:datastoreItem xmlns:ds="http://schemas.openxmlformats.org/officeDocument/2006/customXml" ds:itemID="{AB2F4486-6448-49E3-8249-BB9C7492711D}">
+  <ds:schemaRefs/>
+</ds:datastoreItem>
+</file>
+
+<file path=customXml/itemProps17.xml><?xml version="1.0" encoding="utf-8"?>
+<ds:datastoreItem xmlns:ds="http://schemas.openxmlformats.org/officeDocument/2006/customXml" ds:itemID="{847502A6-7CBE-43AF-BDF6-4D4423521D8C}">
+  <ds:schemaRefs/>
+</ds:datastoreItem>
+</file>
+
+<file path=customXml/itemProps18.xml><?xml version="1.0" encoding="utf-8"?>
+<ds:datastoreItem xmlns:ds="http://schemas.openxmlformats.org/officeDocument/2006/customXml" ds:itemID="{07958A4E-FAB1-42E4-B6B5-29B01F63F87B}">
+  <ds:schemaRefs/>
+</ds:datastoreItem>
+</file>
+
+<file path=customXml/itemProps19.xml><?xml version="1.0" encoding="utf-8"?>
+<ds:datastoreItem xmlns:ds="http://schemas.openxmlformats.org/officeDocument/2006/customXml" ds:itemID="{B9AEDDE3-EA02-4A8F-B8F8-0606A0AA45FC}">
+  <ds:schemaRefs/>
+</ds:datastoreItem>
+</file>
+
+<file path=customXml/itemProps2.xml><?xml version="1.0" encoding="utf-8"?>
+<ds:datastoreItem xmlns:ds="http://schemas.openxmlformats.org/officeDocument/2006/customXml" ds:itemID="{D92C3DF5-A179-4E2D-BD20-07044B39171F}">
+  <ds:schemaRefs/>
+</ds:datastoreItem>
+</file>
+
+<file path=customXml/itemProps3.xml><?xml version="1.0" encoding="utf-8"?>
 <ds:datastoreItem xmlns:ds="http://schemas.openxmlformats.org/officeDocument/2006/customXml" ds:itemID="{058EED06-94C4-4781-888F-0A8BB816BC9F}">
   <ds:schemaRefs>
     <ds:schemaRef ds:uri="http://schemas.microsoft.com/office/2006/metadata/contentType"/>
@@ -27834,31 +27888,7 @@
 </ds:datastoreItem>
 </file>
 
-<file path=customXml/itemProps13.xml><?xml version="1.0" encoding="utf-8"?>
-<ds:datastoreItem xmlns:ds="http://schemas.openxmlformats.org/officeDocument/2006/customXml" ds:itemID="{07958A4E-FAB1-42E4-B6B5-29B01F63F87B}">
-  <ds:schemaRefs/>
-</ds:datastoreItem>
-</file>
-
-<file path=customXml/itemProps14.xml><?xml version="1.0" encoding="utf-8"?>
-<ds:datastoreItem xmlns:ds="http://schemas.openxmlformats.org/officeDocument/2006/customXml" ds:itemID="{AB2F4486-6448-49E3-8249-BB9C7492711D}">
-  <ds:schemaRefs/>
-</ds:datastoreItem>
-</file>
-
-<file path=customXml/itemProps15.xml><?xml version="1.0" encoding="utf-8"?>
-<ds:datastoreItem xmlns:ds="http://schemas.openxmlformats.org/officeDocument/2006/customXml" ds:itemID="{1CE36EA9-2186-4EB1-871A-8AE59C2A13BB}">
-  <ds:schemaRefs/>
-</ds:datastoreItem>
-</file>
-
-<file path=customXml/itemProps16.xml><?xml version="1.0" encoding="utf-8"?>
-<ds:datastoreItem xmlns:ds="http://schemas.openxmlformats.org/officeDocument/2006/customXml" ds:itemID="{D72A95EB-8536-47FD-944A-8DD76726FC96}">
-  <ds:schemaRefs/>
-</ds:datastoreItem>
-</file>
-
-<file path=customXml/itemProps17.xml><?xml version="1.0" encoding="utf-8"?>
+<file path=customXml/itemProps4.xml><?xml version="1.0" encoding="utf-8"?>
 <ds:datastoreItem xmlns:ds="http://schemas.openxmlformats.org/officeDocument/2006/customXml" ds:itemID="{F5A7E41D-6E7F-4B05-AFAB-F540BD4C068B}">
   <ds:schemaRefs>
     <ds:schemaRef ds:uri="http://schemas.microsoft.com/sharepoint/v3/contenttype/forms"/>
@@ -27866,19 +27896,7 @@
 </ds:datastoreItem>
 </file>
 
-<file path=customXml/itemProps18.xml><?xml version="1.0" encoding="utf-8"?>
-<ds:datastoreItem xmlns:ds="http://schemas.openxmlformats.org/officeDocument/2006/customXml" ds:itemID="{B9AEDDE3-EA02-4A8F-B8F8-0606A0AA45FC}">
-  <ds:schemaRefs/>
-</ds:datastoreItem>
-</file>
-
-<file path=customXml/itemProps19.xml><?xml version="1.0" encoding="utf-8"?>
-<ds:datastoreItem xmlns:ds="http://schemas.openxmlformats.org/officeDocument/2006/customXml" ds:itemID="{C99E78A0-C9D4-446F-B674-4DD3E2B46C5D}">
-  <ds:schemaRefs/>
-</ds:datastoreItem>
-</file>
-
-<file path=customXml/itemProps2.xml><?xml version="1.0" encoding="utf-8"?>
+<file path=customXml/itemProps5.xml><?xml version="1.0" encoding="utf-8"?>
 <ds:datastoreItem xmlns:ds="http://schemas.openxmlformats.org/officeDocument/2006/customXml" ds:itemID="{56F2EE69-0CCA-4F48-BE22-EC4A886C57A7}">
   <ds:schemaRefs>
     <ds:schemaRef ds:uri="http://schemas.microsoft.com/office/infopath/2007/PartnerControls"/>
@@ -27895,44 +27913,26 @@
 </ds:datastoreItem>
 </file>
 
-<file path=customXml/itemProps3.xml><?xml version="1.0" encoding="utf-8"?>
-<ds:datastoreItem xmlns:ds="http://schemas.openxmlformats.org/officeDocument/2006/customXml" ds:itemID="{683FEB75-8CFA-449C-A6B1-B1E4A86A58A1}">
+<file path=customXml/itemProps6.xml><?xml version="1.0" encoding="utf-8"?>
+<ds:datastoreItem xmlns:ds="http://schemas.openxmlformats.org/officeDocument/2006/customXml" ds:itemID="{D72A95EB-8536-47FD-944A-8DD76726FC96}">
   <ds:schemaRefs/>
 </ds:datastoreItem>
 </file>
 
-<file path=customXml/itemProps4.xml><?xml version="1.0" encoding="utf-8"?>
-<ds:datastoreItem xmlns:ds="http://schemas.openxmlformats.org/officeDocument/2006/customXml" ds:itemID="{32BA7684-6BE4-4F73-B22E-30934AB379B8}">
+<file path=customXml/itemProps7.xml><?xml version="1.0" encoding="utf-8"?>
+<ds:datastoreItem xmlns:ds="http://schemas.openxmlformats.org/officeDocument/2006/customXml" ds:itemID="{822D38AD-8010-4CD3-BD6B-117CB8DF70A4}">
   <ds:schemaRefs/>
 </ds:datastoreItem>
 </file>
 
-<file path=customXml/itemProps5.xml><?xml version="1.0" encoding="utf-8"?>
-<ds:datastoreItem xmlns:ds="http://schemas.openxmlformats.org/officeDocument/2006/customXml" ds:itemID="{03AF3FDC-ACD1-46F3-A43E-782322DF9816}">
-  <ds:schemaRefs/>
-</ds:datastoreItem>
-</file>
-
-<file path=customXml/itemProps6.xml><?xml version="1.0" encoding="utf-8"?>
+<file path=customXml/itemProps8.xml><?xml version="1.0" encoding="utf-8"?>
 <ds:datastoreItem xmlns:ds="http://schemas.openxmlformats.org/officeDocument/2006/customXml" ds:itemID="{72516535-7702-46AF-9B1F-8623A67A824E}">
   <ds:schemaRefs/>
 </ds:datastoreItem>
 </file>
 
-<file path=customXml/itemProps7.xml><?xml version="1.0" encoding="utf-8"?>
-<ds:datastoreItem xmlns:ds="http://schemas.openxmlformats.org/officeDocument/2006/customXml" ds:itemID="{D92C3DF5-A179-4E2D-BD20-07044B39171F}">
-  <ds:schemaRefs/>
-</ds:datastoreItem>
-</file>
-
-<file path=customXml/itemProps8.xml><?xml version="1.0" encoding="utf-8"?>
-<ds:datastoreItem xmlns:ds="http://schemas.openxmlformats.org/officeDocument/2006/customXml" ds:itemID="{847502A6-7CBE-43AF-BDF6-4D4423521D8C}">
-  <ds:schemaRefs/>
-</ds:datastoreItem>
-</file>
-
 <file path=customXml/itemProps9.xml><?xml version="1.0" encoding="utf-8"?>
-<ds:datastoreItem xmlns:ds="http://schemas.openxmlformats.org/officeDocument/2006/customXml" ds:itemID="{C750C5DC-043F-4BD3-940C-EB6F7625E286}">
+<ds:datastoreItem xmlns:ds="http://schemas.openxmlformats.org/officeDocument/2006/customXml" ds:itemID="{C09F197C-6A49-47D0-B877-F88807989676}">
   <ds:schemaRefs/>
 </ds:datastoreItem>
 </file>
</xml_diff>

<commit_message>
Increased robustness against cases when video coder rate control loop locks down to low rates. Fixed bug in stream prioritization. Updated SCReAM BW test description
</commit_message>
<xml_diff>
--- a/SCReAM-BW-test-tool.pptx
+++ b/SCReAM-BW-test-tool.pptx
@@ -35,17 +35,20 @@
       <p:font typeface="Ericsson Hilda" panose="00000500000000000000" pitchFamily="2" charset="0"/>
       <p:regular r:id="rId39"/>
       <p:bold r:id="rId40"/>
+      <p:italic r:id="rId41"/>
+      <p:boldItalic r:id="rId42"/>
     </p:embeddedFont>
     <p:embeddedFont>
       <p:font typeface="Ericsson Hilda Light" panose="00000400000000000000" pitchFamily="2" charset="0"/>
-      <p:regular r:id="rId41"/>
+      <p:regular r:id="rId43"/>
+      <p:italic r:id="rId44"/>
     </p:embeddedFont>
     <p:embeddedFont>
       <p:font typeface="Ericsson Technical Icons" panose="00000500000000000000" pitchFamily="2" charset="0"/>
-      <p:regular r:id="rId42"/>
-      <p:bold r:id="rId43"/>
-      <p:italic r:id="rId44"/>
-      <p:boldItalic r:id="rId45"/>
+      <p:regular r:id="rId45"/>
+      <p:bold r:id="rId46"/>
+      <p:italic r:id="rId47"/>
+      <p:boldItalic r:id="rId48"/>
     </p:embeddedFont>
   </p:embeddedFontLst>
   <p:defaultTextStyle>
@@ -2662,7 +2665,7 @@
               </a:rPr>
               <a:t>  |  2020-03-20  |  Public  |  Page </a:t>
             </a:r>
-            <a:fld id="{32940D27-CA2B-40E0-9351-B6997C5B1CC0}" type="slidenum">
+            <a:fld id="{6E6C7B26-E4CC-4388-BDE8-ED9AD8223C6C}" type="slidenum">
               <a:rPr lang="en-US" sz="800" b="0" i="0" u="none" smtClean="0">
                 <a:solidFill>
                   <a:srgbClr val="1A1816"/>
@@ -3167,7 +3170,7 @@
               </a:rPr>
               <a:t>  |  2020-03-20  |  Public  |  Page </a:t>
             </a:r>
-            <a:fld id="{CFCFB559-A45D-4D93-8B8A-2A073771DC9B}" type="slidenum">
+            <a:fld id="{5EA05853-D26A-4D0E-ABF9-7771105788EC}" type="slidenum">
               <a:rPr lang="en-US" sz="800" b="0" i="0" u="none" smtClean="0">
                 <a:solidFill>
                   <a:schemeClr val="bg1"/>
@@ -3480,7 +3483,7 @@
               </a:rPr>
               <a:t>  |  2020-03-20  |  Public  |  Page </a:t>
             </a:r>
-            <a:fld id="{91359FFB-0008-48DA-9AC1-0BF25E2DAF56}" type="slidenum">
+            <a:fld id="{A8E3BF8C-A8B4-4E25-891C-D3A0183B34DC}" type="slidenum">
               <a:rPr lang="en-US" sz="800" b="0" i="0" u="none" smtClean="0">
                 <a:solidFill>
                   <a:srgbClr val="1A1816"/>
@@ -3713,7 +3716,7 @@
               </a:rPr>
               <a:t>  |  2020-03-20  |  Public  |  Page </a:t>
             </a:r>
-            <a:fld id="{D6864809-1D53-4061-B7D9-DE48D1851CC2}" type="slidenum">
+            <a:fld id="{8F7F5BC6-EC19-49BB-B060-3DFF1150EC9C}" type="slidenum">
               <a:rPr lang="en-US" sz="800" b="0" i="0" u="none" smtClean="0">
                 <a:solidFill>
                   <a:srgbClr val="1A1816"/>
@@ -3873,7 +3876,7 @@
               </a:rPr>
               <a:t>  |  2020-03-20  |  Public  |  Page </a:t>
             </a:r>
-            <a:fld id="{53DE5CAB-F1CD-46F4-A62E-430EE9957FF7}" type="slidenum">
+            <a:fld id="{78E67735-229B-4E93-8473-EB6B441AE5D1}" type="slidenum">
               <a:rPr lang="en-US" sz="800" b="0" i="0" u="none" smtClean="0">
                 <a:solidFill>
                   <a:srgbClr val="1A1816"/>
@@ -4079,7 +4082,7 @@
               </a:rPr>
               <a:t>  |  2020-03-20  |  Public  |  Page </a:t>
             </a:r>
-            <a:fld id="{CE35F244-4CA9-45B5-839A-5AB7FA536D4F}" type="slidenum">
+            <a:fld id="{0E0D8882-F762-45C9-AD84-88557DCE0245}" type="slidenum">
               <a:rPr lang="en-US" sz="800" b="0" i="0" u="none" smtClean="0">
                 <a:solidFill>
                   <a:srgbClr val="1A1816"/>
@@ -4377,7 +4380,7 @@
               </a:rPr>
               <a:t>  |  2020-03-20  |  Public  |  Page </a:t>
             </a:r>
-            <a:fld id="{5DB14D11-B866-4A2A-91D0-C3B832CEE12C}" type="slidenum">
+            <a:fld id="{2C359AAD-46FA-4C39-B756-D3F8F79CC373}" type="slidenum">
               <a:rPr lang="en-US" sz="800" b="0" i="0" u="none" smtClean="0">
                 <a:solidFill>
                   <a:schemeClr val="bg1"/>
@@ -4675,7 +4678,7 @@
               </a:rPr>
               <a:t>  |  2020-03-20  |  Public  |  Page </a:t>
             </a:r>
-            <a:fld id="{9BD66F31-0AAE-4B3D-A430-83C75CF01F0C}" type="slidenum">
+            <a:fld id="{FAA7EBDB-BA67-4B10-A8A6-F8728ED8E984}" type="slidenum">
               <a:rPr lang="en-US" sz="800" b="0" i="0" u="none" smtClean="0">
                 <a:solidFill>
                   <a:schemeClr val="bg1"/>
@@ -4973,7 +4976,7 @@
               </a:rPr>
               <a:t>  |  2020-03-20  |  Public  |  Page </a:t>
             </a:r>
-            <a:fld id="{0DF653D0-30ED-41D0-BFFB-04E42CAFEBC3}" type="slidenum">
+            <a:fld id="{C9FE44B2-6211-4E86-AABB-B8C2E78972B1}" type="slidenum">
               <a:rPr lang="en-US" sz="800" b="0" i="0" u="none" smtClean="0">
                 <a:solidFill>
                   <a:schemeClr val="bg1"/>
@@ -5271,7 +5274,7 @@
               </a:rPr>
               <a:t>  |  2020-03-20  |  Public  |  Page </a:t>
             </a:r>
-            <a:fld id="{B66563DC-09D7-42B7-8E73-418D9D7ECF26}" type="slidenum">
+            <a:fld id="{5598625E-C109-4495-A3E6-48F53579AEF7}" type="slidenum">
               <a:rPr lang="en-US" sz="800" b="0" i="0" u="none" smtClean="0">
                 <a:solidFill>
                   <a:schemeClr val="bg1"/>
@@ -5569,7 +5572,7 @@
               </a:rPr>
               <a:t>  |  2020-03-20  |  Public  |  Page </a:t>
             </a:r>
-            <a:fld id="{372FDFB1-0D93-4BF5-BDB3-6A4094874BD7}" type="slidenum">
+            <a:fld id="{2B5D39C5-4B56-40EB-8F39-53045EA849D8}" type="slidenum">
               <a:rPr lang="en-US" sz="800" b="0" i="0" u="none" smtClean="0">
                 <a:solidFill>
                   <a:schemeClr val="bg1"/>
@@ -6083,7 +6086,7 @@
               </a:rPr>
               <a:t>  |  2020-03-20  |  Public  |  Page </a:t>
             </a:r>
-            <a:fld id="{CBC50CB7-6B0D-450B-B130-80B8D545EA0E}" type="slidenum">
+            <a:fld id="{5A00A16A-30C3-4AAD-BFB4-D2FF0FC1120E}" type="slidenum">
               <a:rPr lang="en-US" sz="800" b="0" i="0" u="none" smtClean="0">
                 <a:solidFill>
                   <a:schemeClr val="bg1"/>
@@ -6387,7 +6390,7 @@
               </a:rPr>
               <a:t>  |  2020-03-20  |  Public  |  Page </a:t>
             </a:r>
-            <a:fld id="{606D1A8B-C4B2-4268-874C-B191201F240E}" type="slidenum">
+            <a:fld id="{40792D3E-0047-48A2-B11B-8D7162D31CBB}" type="slidenum">
               <a:rPr lang="en-US" sz="800" b="0" i="0" u="none" smtClean="0">
                 <a:solidFill>
                   <a:schemeClr val="bg1"/>
@@ -6685,7 +6688,7 @@
               </a:rPr>
               <a:t>  |  2020-03-20  |  Public  |  Page </a:t>
             </a:r>
-            <a:fld id="{0A8558FD-ADE2-449D-8C7C-72434798ACAB}" type="slidenum">
+            <a:fld id="{80F1DF9A-93A6-4970-8567-089C54A90F17}" type="slidenum">
               <a:rPr lang="en-US" sz="800" b="0" i="0" u="none" smtClean="0">
                 <a:solidFill>
                   <a:schemeClr val="bg1"/>
@@ -6972,7 +6975,7 @@
               </a:rPr>
               <a:t>  |  2020-03-20  |  Public  |  Page </a:t>
             </a:r>
-            <a:fld id="{D132C2F5-C047-4D1B-96E6-EFD016A7219E}" type="slidenum">
+            <a:fld id="{2BFB6B8A-D145-49FB-A4F9-F3AF83D1B1BA}" type="slidenum">
               <a:rPr lang="en-US" sz="800" b="0" i="0" u="none" smtClean="0">
                 <a:solidFill>
                   <a:srgbClr val="1A1816"/>
@@ -7259,7 +7262,7 @@
               </a:rPr>
               <a:t>  |  2020-03-20  |  Public  |  Page </a:t>
             </a:r>
-            <a:fld id="{6DF41FE1-FAD6-4107-96B3-85F21A2C44FA}" type="slidenum">
+            <a:fld id="{A955C00F-46E2-4973-910D-642A579B1785}" type="slidenum">
               <a:rPr lang="en-US" sz="800" b="0" i="0" u="none" smtClean="0">
                 <a:solidFill>
                   <a:srgbClr val="1A1816"/>
@@ -7552,7 +7555,7 @@
               </a:rPr>
               <a:t>  |  2020-03-20  |  Public  |  Page </a:t>
             </a:r>
-            <a:fld id="{4BA79DC0-3D51-4FEF-91BA-AA694AFFEDCC}" type="slidenum">
+            <a:fld id="{C9F549EE-278A-422F-82FA-6E3512849079}" type="slidenum">
               <a:rPr lang="en-US" sz="800" b="0" i="0" u="none" smtClean="0">
                 <a:solidFill>
                   <a:srgbClr val="1A1816"/>
@@ -7839,7 +7842,7 @@
               </a:rPr>
               <a:t>  |  2020-03-20  |  Public  |  Page </a:t>
             </a:r>
-            <a:fld id="{159EDBFA-5C9F-4AF5-93A6-F98357395696}" type="slidenum">
+            <a:fld id="{2F1B1BD5-C0C0-4235-AB54-5EF93EED97D6}" type="slidenum">
               <a:rPr lang="en-US" sz="800" b="0" i="0" u="none" smtClean="0">
                 <a:solidFill>
                   <a:srgbClr val="1A1816"/>
@@ -8161,7 +8164,7 @@
               </a:rPr>
               <a:t>  |  2020-03-20  |  Public  |  Page </a:t>
             </a:r>
-            <a:fld id="{3D1CE28D-7CEF-40C9-BCBE-DC3F8D796B6C}" type="slidenum">
+            <a:fld id="{5A24DD0F-57F5-4FC7-81CC-50724DAF2BB9}" type="slidenum">
               <a:rPr lang="en-US" sz="800" b="0" i="0" u="none" smtClean="0">
                 <a:solidFill>
                   <a:srgbClr val="1A1816"/>
@@ -8448,7 +8451,7 @@
               </a:rPr>
               <a:t>  |  2020-03-20  |  Public  |  Page </a:t>
             </a:r>
-            <a:fld id="{0AD9DDA3-4022-4F46-A3AA-A6E9F60FB1B0}" type="slidenum">
+            <a:fld id="{334E182D-6229-49DA-A937-A820773DEB6A}" type="slidenum">
               <a:rPr lang="en-US" sz="800" b="0" i="0" u="none" smtClean="0">
                 <a:solidFill>
                   <a:srgbClr val="1A1816"/>
@@ -8770,7 +8773,7 @@
               </a:rPr>
               <a:t>  |  2020-03-20  |  Public  |  Page </a:t>
             </a:r>
-            <a:fld id="{C0E82CD4-522A-40F4-A102-BDBFBDCF0D20}" type="slidenum">
+            <a:fld id="{192B3526-168D-44E1-9EB1-C73D754E3273}" type="slidenum">
               <a:rPr lang="en-US" sz="800" b="0" i="0" u="none" smtClean="0">
                 <a:solidFill>
                   <a:srgbClr val="1A1816"/>
@@ -9132,7 +9135,7 @@
               </a:rPr>
               <a:t>  |  2020-03-20  |  Public  |  Page </a:t>
             </a:r>
-            <a:fld id="{1AF9F41B-2996-486A-A70E-B49B8FBA4F3D}" type="slidenum">
+            <a:fld id="{7736F9BE-67DE-4729-AC0F-0AAA582BA8F8}" type="slidenum">
               <a:rPr lang="en-US" sz="800" b="0" i="0" u="none" smtClean="0">
                 <a:solidFill>
                   <a:srgbClr val="1A1816"/>
@@ -9474,7 +9477,7 @@
               </a:rPr>
               <a:t>  |  2020-03-20  |  Public  |  Page </a:t>
             </a:r>
-            <a:fld id="{D987856D-52F8-464C-915C-B2485053AA35}" type="slidenum">
+            <a:fld id="{AAE92499-B0A8-4B63-B5EF-B5E5019F32BD}" type="slidenum">
               <a:rPr lang="en-US" sz="800" b="0" i="0" u="none" smtClean="0">
                 <a:solidFill>
                   <a:srgbClr val="1A1816"/>
@@ -9823,7 +9826,7 @@
               </a:rPr>
               <a:t>  |  2020-03-20  |  Public  |  Page </a:t>
             </a:r>
-            <a:fld id="{AEBC74CB-30D1-4194-B7F0-D691DE54F1D1}" type="slidenum">
+            <a:fld id="{1AC36E7D-4C6B-4CB8-AB63-25992BF95D22}" type="slidenum">
               <a:rPr lang="en-US" sz="800" b="0" i="0" u="none" smtClean="0">
                 <a:solidFill>
                   <a:srgbClr val="1A1816"/>
@@ -10185,7 +10188,7 @@
               </a:rPr>
               <a:t>  |  2020-03-20  |  Public  |  Page </a:t>
             </a:r>
-            <a:fld id="{4BE1FD00-66D6-4BFC-BD91-2D678ADEEE60}" type="slidenum">
+            <a:fld id="{60198F18-B86B-48C4-907A-5D2FFE521090}" type="slidenum">
               <a:rPr lang="en-US" sz="800" b="0" i="0" u="none" smtClean="0">
                 <a:solidFill>
                   <a:srgbClr val="1A1816"/>
@@ -10547,7 +10550,7 @@
               </a:rPr>
               <a:t>  |  2020-03-20  |  Public  |  Page </a:t>
             </a:r>
-            <a:fld id="{8A652941-1185-4F42-8202-C6E502CAC816}" type="slidenum">
+            <a:fld id="{D2EB56E9-29E9-400E-B062-C5DF0BBF44D8}" type="slidenum">
               <a:rPr lang="en-US" sz="800" b="0" i="0" u="none" smtClean="0">
                 <a:solidFill>
                   <a:srgbClr val="1A1816"/>
@@ -10909,7 +10912,7 @@
               </a:rPr>
               <a:t>  |  2020-03-20  |  Public  |  Page </a:t>
             </a:r>
-            <a:fld id="{92105A3D-044B-49B8-A785-D93CD8A6D6C1}" type="slidenum">
+            <a:fld id="{BAF44C2A-236E-4802-B9FC-A8625CE44E06}" type="slidenum">
               <a:rPr lang="en-US" sz="800" b="0" i="0" u="none" smtClean="0">
                 <a:solidFill>
                   <a:srgbClr val="1A1816"/>
@@ -11271,7 +11274,7 @@
               </a:rPr>
               <a:t>  |  2020-03-20  |  Public  |  Page </a:t>
             </a:r>
-            <a:fld id="{0FFABBFD-CC07-4D99-B535-2790CABA684E}" type="slidenum">
+            <a:fld id="{05A40BA2-0C66-45C5-B5DF-DBEF8E1277BF}" type="slidenum">
               <a:rPr lang="en-US" sz="800" b="0" i="0" u="none" smtClean="0">
                 <a:solidFill>
                   <a:srgbClr val="1A1816"/>
@@ -11693,7 +11696,7 @@
               </a:rPr>
               <a:t>  |  2020-03-20  |  Public  |  Page </a:t>
             </a:r>
-            <a:fld id="{D315487D-A0E7-4653-A60B-C8791DB563AB}" type="slidenum">
+            <a:fld id="{5AC59626-B588-4084-B5ED-F18DE30E4665}" type="slidenum">
               <a:rPr lang="en-US" sz="800" b="0" i="0" u="none" smtClean="0">
                 <a:solidFill>
                   <a:srgbClr val="1A1816"/>
@@ -12109,7 +12112,7 @@
               </a:rPr>
               <a:t>  |  2020-03-20  |  Public  |  Page </a:t>
             </a:r>
-            <a:fld id="{2FB853D6-EB85-4EA1-BEFE-83E26640E4C0}" type="slidenum">
+            <a:fld id="{A45EA1F9-2CD0-4581-A906-0EB81FD6B5A9}" type="slidenum">
               <a:rPr lang="en-US" sz="800" b="0" i="0" u="none" smtClean="0">
                 <a:solidFill>
                   <a:srgbClr val="1A1816"/>
@@ -12584,7 +12587,7 @@
               </a:rPr>
               <a:t>  |  2020-03-20  |  Public  |  Page </a:t>
             </a:r>
-            <a:fld id="{CBC5B28E-6B7A-401F-BD1E-DDD88CB84474}" type="slidenum">
+            <a:fld id="{30575430-EDC8-4F33-9A13-83025F36CF91}" type="slidenum">
               <a:rPr lang="en-US" sz="800" b="0" i="0" u="none" smtClean="0">
                 <a:solidFill>
                   <a:srgbClr val="1A1816"/>
@@ -13079,7 +13082,7 @@
               </a:rPr>
               <a:t>  |  2020-03-20  |  Public  |  Page </a:t>
             </a:r>
-            <a:fld id="{0513FCE1-E8E6-4210-BB49-EE12F0F52E74}" type="slidenum">
+            <a:fld id="{552B3162-E4A6-4BEB-AD77-4D0E6914241F}" type="slidenum">
               <a:rPr lang="en-US" sz="800" b="0" i="0" u="none" smtClean="0">
                 <a:solidFill>
                   <a:srgbClr val="1A1816"/>
@@ -13535,7 +13538,7 @@
               </a:rPr>
               <a:t>  |  2020-03-20  |  Public  |  Page </a:t>
             </a:r>
-            <a:fld id="{205B7888-FEC0-407C-8A00-83663A38EF76}" type="slidenum">
+            <a:fld id="{796ED7BD-2C59-4FC1-9BEB-0B4326486944}" type="slidenum">
               <a:rPr lang="en-US" sz="800" b="0" i="0" u="none" smtClean="0">
                 <a:solidFill>
                   <a:srgbClr val="1A1816"/>
@@ -13923,7 +13926,7 @@
               </a:rPr>
               <a:t>  |  2020-03-20  |  Public  |  Page </a:t>
             </a:r>
-            <a:fld id="{A8B20A30-91FD-419D-9146-821B86B73BE1}" type="slidenum">
+            <a:fld id="{7E8FEB7B-0756-41B3-863F-5AD7D3FBE622}" type="slidenum">
               <a:rPr lang="en-US" sz="800" b="0" i="0" u="none" smtClean="0">
                 <a:solidFill>
                   <a:schemeClr val="bg1"/>
@@ -14442,7 +14445,7 @@
               </a:rPr>
               <a:t>  |  2020-03-20  |  Public  |  Page </a:t>
             </a:r>
-            <a:fld id="{6AF4944C-91AD-4E60-A2B3-17D743F5F181}" type="slidenum">
+            <a:fld id="{E0CF89C7-5E26-42DE-8D2E-BA4BF9B01CF1}" type="slidenum">
               <a:rPr lang="en-US" sz="800" b="0" i="0" u="none" smtClean="0">
                 <a:solidFill>
                   <a:srgbClr val="1A1816"/>
@@ -15151,7 +15154,7 @@
               </a:rPr>
               <a:t>  |  2020-03-20  |  Public  |  Page </a:t>
             </a:r>
-            <a:fld id="{182D0536-1604-4F6D-87B4-5A2469D4C947}" type="slidenum">
+            <a:fld id="{EEC64424-22F9-436A-A0E8-A32C6AC8744D}" type="slidenum">
               <a:rPr lang="en-US" sz="800" b="0" i="0" u="none" smtClean="0">
                 <a:solidFill>
                   <a:srgbClr val="1A1816"/>
@@ -16630,7 +16633,7 @@
               </a:rPr>
               <a:t>  |  2020-03-20  |  Public  |  Page </a:t>
             </a:r>
-            <a:fld id="{0433F543-448A-444E-9F14-40B2B4890E55}" type="slidenum">
+            <a:fld id="{76155D7A-DA90-4B1A-B2E7-66C1328E80C9}" type="slidenum">
               <a:rPr lang="en-US" sz="800" b="0" i="0" u="none" smtClean="0">
                 <a:solidFill>
                   <a:schemeClr val="bg1"/>
@@ -17142,7 +17145,7 @@
               </a:rPr>
               <a:t>  |  2020-03-20  |  Public  |  Page </a:t>
             </a:r>
-            <a:fld id="{838A8D23-F70B-452E-9C9D-E3DA7113089F}" type="slidenum">
+            <a:fld id="{8052B7F4-CC9A-4D6C-9E8F-3E17FD6AE2EE}" type="slidenum">
               <a:rPr lang="en-US" sz="800" b="0" i="0" u="none" smtClean="0">
                 <a:solidFill>
                   <a:schemeClr val="bg1"/>
@@ -17537,7 +17540,7 @@
               </a:rPr>
               <a:t>  |  2020-03-20  |  Public  |  Page </a:t>
             </a:r>
-            <a:fld id="{B485CE7E-559D-4F8A-8F78-99EA15F84D0F}" type="slidenum">
+            <a:fld id="{B9C99EF1-9D22-4801-8012-4FF671E7D8BB}" type="slidenum">
               <a:rPr lang="en-US" sz="800" b="0" i="0" u="none" smtClean="0">
                 <a:solidFill>
                   <a:schemeClr val="bg1"/>
@@ -18037,7 +18040,7 @@
               </a:rPr>
               <a:t>  |  2020-03-20  |  Public  |  Page </a:t>
             </a:r>
-            <a:fld id="{7977713C-CE7E-4BB3-8582-01A430C85289}" type="slidenum">
+            <a:fld id="{2A31BAFB-7538-4EBF-A197-721EE726BBB8}" type="slidenum">
               <a:rPr lang="en-US" sz="800" b="0" i="0" u="none" smtClean="0">
                 <a:solidFill>
                   <a:schemeClr val="bg1"/>
@@ -18537,7 +18540,7 @@
               </a:rPr>
               <a:t>  |  2020-03-20  |  Public  |  Page </a:t>
             </a:r>
-            <a:fld id="{3808AACC-49DC-42A4-9A06-0EAEA028062C}" type="slidenum">
+            <a:fld id="{0A79DB4D-3647-4B6E-9D04-BB7D939C122C}" type="slidenum">
               <a:rPr lang="en-US" sz="800" b="0" i="0" u="none" smtClean="0">
                 <a:solidFill>
                   <a:schemeClr val="bg1"/>
@@ -19546,7 +19549,7 @@
             </a:br>
             <a:r>
               <a:rPr lang="en-US" sz="5400" dirty="0"/>
-              <a:t>2021-02-17</a:t>
+              <a:t>2023-01-17</a:t>
             </a:r>
           </a:p>
         </p:txBody>
@@ -21335,203 +21338,259 @@
           <a:lstStyle/>
           <a:p>
             <a:r>
-              <a:rPr lang="en-US" dirty="0"/>
+              <a:rPr lang="en-US" sz="1800" dirty="0"/>
               <a:t>Firewalls may need to be opened up but it is most often not needed</a:t>
             </a:r>
           </a:p>
           <a:p>
             <a:pPr lvl="1"/>
             <a:r>
+              <a:rPr lang="en-US" sz="1600" dirty="0"/>
+              <a:t>Use </a:t>
+            </a:r>
+            <a:r>
+              <a:rPr lang="en-US" sz="1600" dirty="0" err="1"/>
+              <a:t>e.g</a:t>
+            </a:r>
+            <a:r>
+              <a:rPr lang="en-US" sz="1600" dirty="0"/>
+              <a:t> firewall-</a:t>
+            </a:r>
+            <a:r>
+              <a:rPr lang="en-US" sz="1600" dirty="0" err="1"/>
+              <a:t>cmd</a:t>
+            </a:r>
+            <a:endParaRPr lang="en-US" sz="1600" dirty="0"/>
+          </a:p>
+          <a:p>
+            <a:pPr lvl="2"/>
+            <a:r>
+              <a:rPr lang="en-US" sz="1600" dirty="0" err="1"/>
+              <a:t>sudo</a:t>
+            </a:r>
+            <a:r>
+              <a:rPr lang="en-US" sz="1600" dirty="0"/>
+              <a:t> firewall-</a:t>
+            </a:r>
+            <a:r>
+              <a:rPr lang="en-US" sz="1600" dirty="0" err="1"/>
+              <a:t>cmd</a:t>
+            </a:r>
+            <a:r>
+              <a:rPr lang="en-US" sz="1600" dirty="0"/>
+              <a:t> --zone=public --add-port=30122/</a:t>
+            </a:r>
+            <a:r>
+              <a:rPr lang="en-US" sz="1600" dirty="0" err="1"/>
+              <a:t>udp</a:t>
+            </a:r>
+            <a:endParaRPr lang="en-US" sz="1600" dirty="0"/>
+          </a:p>
+          <a:p>
+            <a:pPr lvl="2"/>
+            <a:endParaRPr lang="en-US" sz="1600" dirty="0"/>
+          </a:p>
+          <a:p>
+            <a:r>
               <a:rPr lang="en-US" sz="1800" dirty="0"/>
-              <a:t>Use </a:t>
+              <a:t>Priority for </a:t>
             </a:r>
             <a:r>
               <a:rPr lang="en-US" sz="1800" dirty="0" err="1"/>
-              <a:t>e.g</a:t>
+              <a:t>SCReAM</a:t>
             </a:r>
             <a:r>
               <a:rPr lang="en-US" sz="1800" dirty="0"/>
-              <a:t> firewall-</a:t>
+              <a:t> sender and receiver may need to be elevated to avoid that the </a:t>
             </a:r>
             <a:r>
               <a:rPr lang="en-US" sz="1800" dirty="0" err="1"/>
-              <a:t>cmd</a:t>
-            </a:r>
-            <a:endParaRPr lang="en-US" sz="1800" dirty="0"/>
-          </a:p>
-          <a:p>
-            <a:pPr lvl="2"/>
-            <a:r>
-              <a:rPr lang="en-US" sz="1800" dirty="0" err="1"/>
+              <a:t>SCReAM</a:t>
+            </a:r>
+            <a:r>
+              <a:rPr lang="en-US" sz="1800" dirty="0"/>
+              <a:t> processes are halted by other processes</a:t>
+            </a:r>
+          </a:p>
+          <a:p>
+            <a:pPr lvl="1"/>
+            <a:r>
+              <a:rPr lang="en-US" sz="1600" dirty="0"/>
+              <a:t>&gt;</a:t>
+            </a:r>
+            <a:r>
+              <a:rPr lang="en-US" sz="1600" dirty="0" err="1"/>
               <a:t>sudo</a:t>
             </a:r>
             <a:r>
+              <a:rPr lang="en-US" sz="1600" dirty="0"/>
+              <a:t> nice -n - 10 ./bin/scream-</a:t>
+            </a:r>
+            <a:r>
+              <a:rPr lang="en-US" sz="1600" dirty="0" err="1"/>
+              <a:t>bw</a:t>
+            </a:r>
+            <a:r>
+              <a:rPr lang="en-US" sz="1600" dirty="0"/>
+              <a:t>-test-</a:t>
+            </a:r>
+            <a:r>
+              <a:rPr lang="en-US" sz="1600" dirty="0" err="1"/>
+              <a:t>rx</a:t>
+            </a:r>
+            <a:r>
+              <a:rPr lang="en-US" sz="1600" dirty="0"/>
+              <a:t> …..</a:t>
+            </a:r>
+          </a:p>
+          <a:p>
+            <a:pPr lvl="1"/>
+            <a:r>
+              <a:rPr lang="en-US" sz="1600" dirty="0"/>
+              <a:t>&gt;</a:t>
+            </a:r>
+            <a:r>
+              <a:rPr lang="en-US" sz="1600" dirty="0" err="1"/>
+              <a:t>sudo</a:t>
+            </a:r>
+            <a:r>
+              <a:rPr lang="en-US" sz="1600" dirty="0"/>
+              <a:t> nice -n - 10 ./bin/scream-</a:t>
+            </a:r>
+            <a:r>
+              <a:rPr lang="en-US" sz="1600" dirty="0" err="1"/>
+              <a:t>bw</a:t>
+            </a:r>
+            <a:r>
+              <a:rPr lang="en-US" sz="1600" dirty="0"/>
+              <a:t>-test-</a:t>
+            </a:r>
+            <a:r>
+              <a:rPr lang="en-US" sz="1600" dirty="0" err="1"/>
+              <a:t>rx</a:t>
+            </a:r>
+            <a:r>
+              <a:rPr lang="en-US" sz="1600" dirty="0"/>
+              <a:t> …..</a:t>
+            </a:r>
+          </a:p>
+          <a:p>
+            <a:r>
               <a:rPr lang="en-US" sz="1800" dirty="0"/>
-              <a:t> firewall-</a:t>
-            </a:r>
-            <a:r>
-              <a:rPr lang="en-US" sz="1800" dirty="0" err="1"/>
-              <a:t>cmd</a:t>
-            </a:r>
-            <a:r>
-              <a:rPr lang="en-US" sz="1800" dirty="0"/>
-              <a:t> --zone=public --add-port=30122/</a:t>
-            </a:r>
-            <a:r>
-              <a:rPr lang="en-US" sz="1800" dirty="0" err="1"/>
-              <a:t>udp</a:t>
-            </a:r>
-            <a:endParaRPr lang="en-US" sz="1800" dirty="0"/>
-          </a:p>
-          <a:p>
-            <a:pPr lvl="2"/>
-            <a:endParaRPr lang="en-US" sz="1800" dirty="0"/>
-          </a:p>
-          <a:p>
-            <a:r>
-              <a:rPr lang="en-US" dirty="0"/>
-              <a:t>Priority for </a:t>
-            </a:r>
-            <a:r>
-              <a:rPr lang="en-US" dirty="0" err="1"/>
-              <a:t>SCReAM</a:t>
-            </a:r>
-            <a:r>
-              <a:rPr lang="en-US" dirty="0"/>
-              <a:t> sender and receiver may need to be elevated to avoid that the </a:t>
-            </a:r>
-            <a:r>
-              <a:rPr lang="en-US" dirty="0" err="1"/>
-              <a:t>SCReAM</a:t>
-            </a:r>
-            <a:r>
-              <a:rPr lang="en-US" dirty="0"/>
-              <a:t> processes are halted by other processes</a:t>
+              <a:t>UDP sockets may need more memory at high bitrates to avoid packet loss </a:t>
             </a:r>
           </a:p>
           <a:p>
             <a:pPr lvl="1"/>
             <a:r>
-              <a:rPr lang="en-US" sz="1800" dirty="0"/>
-              <a:t>&gt;</a:t>
-            </a:r>
-            <a:r>
-              <a:rPr lang="en-US" sz="1800" dirty="0" err="1"/>
-              <a:t>sudo</a:t>
-            </a:r>
-            <a:r>
-              <a:rPr lang="en-US" sz="1800" dirty="0"/>
-              <a:t> nice -n - 10 ./bin/scream-</a:t>
-            </a:r>
-            <a:r>
-              <a:rPr lang="en-US" sz="1800" dirty="0" err="1"/>
-              <a:t>bw</a:t>
-            </a:r>
-            <a:r>
-              <a:rPr lang="en-US" sz="1800" dirty="0"/>
-              <a:t>-test-</a:t>
-            </a:r>
-            <a:r>
-              <a:rPr lang="en-US" sz="1800" dirty="0" err="1"/>
-              <a:t>rx</a:t>
-            </a:r>
-            <a:r>
-              <a:rPr lang="en-US" sz="1800" dirty="0"/>
-              <a:t> …..</a:t>
-            </a:r>
-          </a:p>
-          <a:p>
-            <a:pPr lvl="1"/>
-            <a:r>
-              <a:rPr lang="en-US" sz="1800" dirty="0"/>
-              <a:t>&gt;</a:t>
-            </a:r>
-            <a:r>
-              <a:rPr lang="en-US" sz="1800" dirty="0" err="1"/>
-              <a:t>sudo</a:t>
-            </a:r>
-            <a:r>
-              <a:rPr lang="en-US" sz="1800" dirty="0"/>
-              <a:t> nice -n - 10 ./bin/scream-</a:t>
-            </a:r>
-            <a:r>
-              <a:rPr lang="en-US" sz="1800" dirty="0" err="1"/>
-              <a:t>bw</a:t>
-            </a:r>
-            <a:r>
-              <a:rPr lang="en-US" sz="1800" dirty="0"/>
-              <a:t>-test-</a:t>
-            </a:r>
-            <a:r>
-              <a:rPr lang="en-US" sz="1800" dirty="0" err="1"/>
-              <a:t>rx</a:t>
-            </a:r>
-            <a:r>
-              <a:rPr lang="en-US" sz="1800" dirty="0"/>
-              <a:t> …..</a:t>
-            </a:r>
-          </a:p>
-          <a:p>
-            <a:r>
-              <a:rPr lang="en-US" dirty="0"/>
-              <a:t>UDP sockets may need more memory at high bitrates to avoid packet loss </a:t>
-            </a:r>
-          </a:p>
-          <a:p>
-            <a:pPr lvl="1"/>
-            <a:r>
-              <a:rPr lang="en-US" sz="1600" dirty="0"/>
+              <a:rPr lang="en-US" sz="1400" dirty="0"/>
               <a:t>See </a:t>
             </a:r>
             <a:r>
-              <a:rPr lang="en-US" sz="1600" dirty="0">
+              <a:rPr lang="en-US" sz="1400" dirty="0">
                 <a:hlinkClick r:id="rId3"/>
               </a:rPr>
               <a:t>https://medium.com/@CameronSparr/increase-os-udp-buffers-to-improve-performance-51d167bb1360</a:t>
             </a:r>
             <a:r>
+              <a:rPr lang="en-US" sz="1400" dirty="0"/>
+              <a:t> for setting of </a:t>
+            </a:r>
+            <a:r>
+              <a:rPr lang="en-US" sz="1400" dirty="0" err="1"/>
+              <a:t>net.core.rmem_max</a:t>
+            </a:r>
+            <a:r>
+              <a:rPr lang="en-US" sz="1400" dirty="0"/>
+              <a:t>, </a:t>
+            </a:r>
+            <a:r>
+              <a:rPr lang="en-US" sz="1400" dirty="0" err="1"/>
+              <a:t>net.core.rmem_default</a:t>
+            </a:r>
+            <a:r>
+              <a:rPr lang="en-US" sz="1400" dirty="0"/>
+              <a:t>, </a:t>
+            </a:r>
+            <a:r>
+              <a:rPr lang="en-US" sz="1400" dirty="0" err="1"/>
+              <a:t>net.core.wmem_max</a:t>
+            </a:r>
+            <a:r>
+              <a:rPr lang="en-US" sz="1400" dirty="0"/>
+              <a:t> and </a:t>
+            </a:r>
+            <a:r>
+              <a:rPr lang="en-US" sz="1400" dirty="0" err="1"/>
+              <a:t>net.core.wmem_default</a:t>
+            </a:r>
+            <a:endParaRPr lang="en-US" sz="1400" dirty="0"/>
+          </a:p>
+          <a:p>
+            <a:pPr lvl="1"/>
+            <a:r>
+              <a:rPr lang="en-US" sz="1400" dirty="0"/>
+              <a:t>Edit in the following in </a:t>
+            </a:r>
+            <a:r>
+              <a:rPr lang="sv-SE" sz="1200" b="0" i="0" dirty="0">
+                <a:solidFill>
+                  <a:srgbClr val="242424"/>
+                </a:solidFill>
+                <a:effectLst/>
+                <a:latin typeface="-apple-system"/>
+              </a:rPr>
+              <a:t>/etc/sysctl.conf</a:t>
+            </a:r>
+            <a:endParaRPr lang="en-US" sz="1400" dirty="0"/>
+          </a:p>
+          <a:p>
+            <a:pPr marL="542925" lvl="1" indent="0">
+              <a:buNone/>
+            </a:pPr>
+            <a:r>
               <a:rPr lang="en-US" sz="1600" dirty="0"/>
-              <a:t> for setting of </a:t>
-            </a:r>
+              <a:t>net.core.rmem_default=26214400</a:t>
+            </a:r>
+          </a:p>
+          <a:p>
+            <a:pPr marL="542925" lvl="1" indent="0">
+              <a:buNone/>
+            </a:pPr>
+            <a:r>
+              <a:rPr lang="en-US" sz="1600" dirty="0" err="1"/>
+              <a:t>net.core.wmem_default</a:t>
+            </a:r>
+            <a:r>
+              <a:rPr lang="en-US" sz="1600" dirty="0"/>
+              <a:t>=26214400</a:t>
+            </a:r>
+          </a:p>
+          <a:p>
+            <a:pPr marL="542925" lvl="1" indent="0">
+              <a:buNone/>
+            </a:pPr>
             <a:r>
               <a:rPr lang="en-US" sz="1600" dirty="0" err="1"/>
               <a:t>net.core.rmem_max</a:t>
             </a:r>
             <a:r>
               <a:rPr lang="en-US" sz="1600" dirty="0"/>
-              <a:t>, </a:t>
-            </a:r>
-            <a:r>
-              <a:rPr lang="en-US" sz="1600" dirty="0" err="1"/>
-              <a:t>net.core.rmem_default</a:t>
-            </a:r>
-            <a:r>
-              <a:rPr lang="en-US" sz="1600" dirty="0"/>
-              <a:t>, </a:t>
-            </a:r>
+              <a:t>=26214400</a:t>
+            </a:r>
+          </a:p>
+          <a:p>
+            <a:pPr marL="542925" lvl="1" indent="0">
+              <a:buNone/>
+            </a:pPr>
             <a:r>
               <a:rPr lang="en-US" sz="1600" dirty="0" err="1"/>
               <a:t>net.core.wmem_max</a:t>
             </a:r>
             <a:r>
               <a:rPr lang="en-US" sz="1600" dirty="0"/>
-              <a:t> and </a:t>
-            </a:r>
-            <a:r>
-              <a:rPr lang="en-US" sz="1600" dirty="0" err="1"/>
-              <a:t>net.core.wmem_default</a:t>
-            </a:r>
-            <a:endParaRPr lang="en-US" sz="1600" dirty="0"/>
-          </a:p>
-          <a:p>
-            <a:pPr marL="183600" lvl="1" indent="0">
-              <a:buNone/>
-            </a:pPr>
-            <a:endParaRPr lang="en-US" sz="1600" dirty="0"/>
-          </a:p>
-          <a:p>
-            <a:pPr lvl="1"/>
-            <a:endParaRPr lang="en-US" sz="1600" dirty="0"/>
+              <a:t>=26214400</a:t>
+            </a:r>
           </a:p>
           <a:p>
             <a:pPr lvl="2"/>
@@ -21759,8 +21818,8 @@
         </p:nvSpPr>
         <p:spPr>
           <a:xfrm>
-            <a:off x="2185146" y="5383530"/>
-            <a:ext cx="5323692" cy="1318484"/>
+            <a:off x="1024099" y="5191083"/>
+            <a:ext cx="3375623" cy="1411250"/>
           </a:xfrm>
           <a:prstGeom prst="rect">
             <a:avLst/>
@@ -21780,117 +21839,7 @@
             <a:pPr marL="0" indent="0">
               <a:buNone/>
             </a:pPr>
-            <a:r>
-              <a:rPr lang="en-US" sz="1800" b="1" dirty="0" err="1"/>
-              <a:t>sudo</a:t>
-            </a:r>
-            <a:r>
-              <a:rPr lang="en-US" sz="1800" b="1" dirty="0"/>
-              <a:t> </a:t>
-            </a:r>
-            <a:r>
-              <a:rPr lang="en-US" sz="1800" b="1" dirty="0" err="1"/>
-              <a:t>sysctl</a:t>
-            </a:r>
-            <a:r>
-              <a:rPr lang="en-US" sz="1800" b="1" dirty="0"/>
-              <a:t> -w </a:t>
-            </a:r>
-            <a:r>
-              <a:rPr lang="en-US" sz="1800" b="1" dirty="0" err="1"/>
-              <a:t>net.core.wmem_max</a:t>
-            </a:r>
-            <a:r>
-              <a:rPr lang="en-US" sz="1800" b="1" dirty="0"/>
-              <a:t>=26214400</a:t>
-            </a:r>
-          </a:p>
-          <a:p>
-            <a:pPr marL="0" indent="0">
-              <a:buNone/>
-            </a:pPr>
-            <a:r>
-              <a:rPr lang="en-US" sz="1800" b="1" dirty="0" err="1"/>
-              <a:t>sudo</a:t>
-            </a:r>
-            <a:r>
-              <a:rPr lang="en-US" sz="1800" b="1" dirty="0"/>
-              <a:t> </a:t>
-            </a:r>
-            <a:r>
-              <a:rPr lang="en-US" sz="1800" b="1" dirty="0" err="1"/>
-              <a:t>sysctl</a:t>
-            </a:r>
-            <a:r>
-              <a:rPr lang="en-US" sz="1800" b="1" dirty="0"/>
-              <a:t> -w </a:t>
-            </a:r>
-            <a:r>
-              <a:rPr lang="en-US" sz="1800" b="1" dirty="0" err="1"/>
-              <a:t>net.core.wmem_default</a:t>
-            </a:r>
-            <a:r>
-              <a:rPr lang="en-US" sz="1800" b="1" dirty="0"/>
-              <a:t>=26214400</a:t>
-            </a:r>
-          </a:p>
-          <a:p>
-            <a:pPr marL="0" indent="0">
-              <a:buNone/>
-            </a:pPr>
-            <a:r>
-              <a:rPr lang="en-US" sz="1800" b="1" dirty="0" err="1"/>
-              <a:t>sudo</a:t>
-            </a:r>
-            <a:r>
-              <a:rPr lang="en-US" sz="1800" b="1" dirty="0"/>
-              <a:t> </a:t>
-            </a:r>
-            <a:r>
-              <a:rPr lang="en-US" sz="1800" b="1" dirty="0" err="1"/>
-              <a:t>sysctl</a:t>
-            </a:r>
-            <a:r>
-              <a:rPr lang="en-US" sz="1800" b="1" dirty="0"/>
-              <a:t> -w </a:t>
-            </a:r>
-            <a:r>
-              <a:rPr lang="en-US" sz="1800" b="1" dirty="0" err="1"/>
-              <a:t>net.core.rmem_max</a:t>
-            </a:r>
-            <a:r>
-              <a:rPr lang="en-US" sz="1800" b="1" dirty="0"/>
-              <a:t>=26214400</a:t>
-            </a:r>
-          </a:p>
-          <a:p>
-            <a:pPr marL="0" indent="0">
-              <a:buNone/>
-            </a:pPr>
-            <a:r>
-              <a:rPr lang="en-US" sz="1800" b="1" dirty="0" err="1"/>
-              <a:t>sudo</a:t>
-            </a:r>
-            <a:r>
-              <a:rPr lang="en-US" sz="1800" b="1" dirty="0"/>
-              <a:t> </a:t>
-            </a:r>
-            <a:r>
-              <a:rPr lang="en-US" sz="1800" b="1" dirty="0" err="1"/>
-              <a:t>sysctl</a:t>
-            </a:r>
-            <a:r>
-              <a:rPr lang="en-US" sz="1800" b="1" dirty="0"/>
-              <a:t> -w </a:t>
-            </a:r>
-            <a:r>
-              <a:rPr lang="en-US" sz="1800" b="1" dirty="0" err="1"/>
-              <a:t>net.core.rmem_default</a:t>
-            </a:r>
-            <a:r>
-              <a:rPr lang="en-US" sz="1800" b="1" dirty="0"/>
-              <a:t>=26214400</a:t>
-            </a:r>
+            <a:endParaRPr lang="en-US" sz="1800" b="1" dirty="0"/>
           </a:p>
         </p:txBody>
       </p:sp>
@@ -23322,7 +23271,7 @@
           <a:graphicData uri="http://schemas.openxmlformats.org/presentationml/2006/ole">
             <mc:AlternateContent xmlns:mc="http://schemas.openxmlformats.org/markup-compatibility/2006">
               <mc:Choice xmlns:v="urn:schemas-microsoft-com:vml" Requires="v">
-                <p:oleObj spid="_x0000_s1061" name="Visio" r:id="rId5" imgW="2533577" imgH="3257685" progId="Visio.Drawing.11">
+                <p:oleObj spid="_x0000_s1062" name="Visio" r:id="rId5" imgW="2533577" imgH="3257685" progId="Visio.Drawing.11">
                   <p:embed/>
                 </p:oleObj>
               </mc:Choice>
@@ -27496,19 +27445,24 @@
 </file>
 
 <file path=customXml/item1.xml><?xml version="1.0" encoding="utf-8"?>
-<TemplafySlideTemplateConfiguration><![CDATA[{"documentContentValidatorConfiguration":{"enableDocumentContentValidator":false,"documentContentValidatorVersion":0},"elementsMetadata":[],"slideId":"637037983905221558","enableDocumentContentUpdater":true,"version":"1.9"}]]></TemplafySlideTemplateConfiguration>
+<TemplafySlideFormConfiguration><![CDATA[{"formFields":[],"formDataEntries":[]}]]></TemplafySlideFormConfiguration>
 </file>
 
 <file path=customXml/item10.xml><?xml version="1.0" encoding="utf-8"?>
-<TemplafySlideTemplateConfiguration><![CDATA[{"documentContentValidatorConfiguration":{"enableDocumentContentValidator":false,"documentContentValidatorVersion":0},"elementsMetadata":[],"slideId":"637050925554934895","enableDocumentContentUpdater":true,"version":"1.9"}]]></TemplafySlideTemplateConfiguration>
+<TemplafySlideFormConfiguration><![CDATA[{"formFields":[],"formDataEntries":[]}]]></TemplafySlideFormConfiguration>
 </file>
 
 <file path=customXml/item11.xml><?xml version="1.0" encoding="utf-8"?>
-<TemplafySlideTemplateConfiguration><![CDATA[{"documentContentValidatorConfiguration":{"enableDocumentContentValidator":false,"documentContentValidatorVersion":0},"elementsMetadata":[],"slideId":"637037983905678162","enableDocumentContentUpdater":true,"version":"1.9"}]]></TemplafySlideTemplateConfiguration>
+<?mso-contentType ?>
+<FormTemplates xmlns="http://schemas.microsoft.com/sharepoint/v3/contenttype/forms">
+  <Display>DocumentLibraryForm</Display>
+  <Edit>DocumentLibraryForm</Edit>
+  <New>DocumentLibraryForm</New>
+</FormTemplates>
 </file>
 
 <file path=customXml/item12.xml><?xml version="1.0" encoding="utf-8"?>
-<TemplafySlideFormConfiguration><![CDATA[{"formFields":[],"formDataEntries":[]}]]></TemplafySlideFormConfiguration>
+<TemplafySlideTemplateConfiguration><![CDATA[{"elementsMetadata":[],"documentContentValidatorConfiguration":{"enableDocumentContentValidator":false,"documentContentValidatorVersion":0},"slideId":"637027476704980324","enableDocumentContentUpdater":true,"version":"1.9"}]]></TemplafySlideTemplateConfiguration>
 </file>
 
 <file path=customXml/item13.xml><?xml version="1.0" encoding="utf-8"?>
@@ -27516,34 +27470,10 @@
 </file>
 
 <file path=customXml/item14.xml><?xml version="1.0" encoding="utf-8"?>
-<TemplafySlideFormConfiguration><![CDATA[{"formFields":[],"formDataEntries":[]}]]></TemplafySlideFormConfiguration>
+<TemplafySlideTemplateConfiguration><![CDATA[{"documentContentValidatorConfiguration":{"enableDocumentContentValidator":false,"documentContentValidatorVersion":0},"elementsMetadata":[],"slideId":"637037983905221557","enableDocumentContentUpdater":true,"version":"1.9"}]]></TemplafySlideTemplateConfiguration>
 </file>
 
 <file path=customXml/item15.xml><?xml version="1.0" encoding="utf-8"?>
-<TemplafySlideTemplateConfiguration><![CDATA[{"documentContentValidatorConfiguration":{"enableDocumentContentValidator":false,"documentContentValidatorVersion":0},"elementsMetadata":[],"slideId":"637171128435648944","enableDocumentContentUpdater":true,"version":"1.9"}]]></TemplafySlideTemplateConfiguration>
-</file>
-
-<file path=customXml/item16.xml><?xml version="1.0" encoding="utf-8"?>
-<TemplafySlideTemplateConfiguration><![CDATA[{"documentContentValidatorConfiguration":{"enableDocumentContentValidator":false,"documentContentValidatorVersion":0},"elementsMetadata":[],"slideId":"637171128435180813","enableDocumentContentUpdater":true,"version":"1.9"}]]></TemplafySlideTemplateConfiguration>
-</file>
-
-<file path=customXml/item17.xml><?xml version="1.0" encoding="utf-8"?>
-<TemplafySlideFormConfiguration><![CDATA[{"formFields":[],"formDataEntries":[]}]]></TemplafySlideFormConfiguration>
-</file>
-
-<file path=customXml/item18.xml><?xml version="1.0" encoding="utf-8"?>
-<TemplafyTemplateConfiguration><![CDATA[{"elementsMetadata":[{"type":"shape","id":"5d67e717-74bf-41a6-8dce-47082e2c1da1","elementConfiguration":{"inheritDimensions":"inheritNone","height":"1.34 cm","binding":"Form.LogoInsertion.Pplogoname","disableUpdates":false,"type":"image"}}],"transformationConfigurations":[{"language":"{{DocumentLanguage}}","disableUpdates":false,"type":"proofingLanguage"},{"propertyName":"FooterText","propertyValue":"true","disableUpdates":false,"type":"customDocumentProperty"},{"propertyName":"SecurityClass","propertyValue":"{{Form.ConfidentialityClass.Confidentiality}}","disableUpdates":false,"type":"customDocumentProperty"},{"propertyName":"ExtConf","propertyValue":"{{Form.ExternalConfidentialityLabel.ExternalConfidentiality}}","disableUpdates":false,"type":"customDocumentProperty"},{"propertyName":"Prepared","propertyValue":"{{Form.Prepared}}","disableUpdates":false,"type":"customDocumentProperty"},{"propertyName":"ApprovedBy","propertyValue":"{{Form.ApprovedBy}}","disableUpdates":false,"type":"customDocumentProperty"},{"propertyName":"DocNo","propertyValue":"{{Form.DocumentNumber}} {{Form.LanguageCode.LanguageCode}}","disableUpdates":false,"type":"customDocumentProperty"},{"propertyName":"Checked","propertyValue":"{{Form.Checked}}","disableUpdates":false,"type":"customDocumentProperty"},{"propertyName":"Date","propertyValue":"{{Form.Date}}","disableUpdates":false,"type":"customDocumentProperty"},{"propertyName":"Reference","propertyValue":"{{Form.Reference}}","disableUpdates":false,"type":"customDocumentProperty"},{"propertyName":"Title","propertyValue":"{{Form.DocumentTitle}}","disableUpdates":false,"type":"customDocumentProperty"},{"propertyName":"Keyword","propertyValue":"{{Form.Keywords}}","disableUpdates":false,"type":"customDocumentProperty"},{"propertyName":"DocumentType","propertyValue":"Presentation2011","disableUpdates":false,"type":"customDocumentProperty"},{"propertyName":"Language","propertyValue":"EnglishUS","disableUpdates":false,"type":"customDocumentProperty"},{"propertyName":"TemplateID","propertyValue":"FALSE","disableUpdates":false,"type":"customDocumentProperty"},{"propertyName":"ConfCtrl","propertyValue":"FALSE","disableUpdates":false,"type":"customDocumentProperty"},{"propertyName":"title","propertyValue":"{{Form.DocumentTitle}}","disableUpdates":false,"type":"documentProperty"},{"propertyName":"keywords","propertyValue":"{{Form.Keywords}}","disableUpdates":false,"type":"documentProperty"},{"propertyName":"creator","propertyValue":"{{Form.Prepared}}","disableUpdates":false,"type":"documentProperty"},{"propertyName":"DocTitle","propertyValue":"{{Form.DocTitle.DocTitle}}","disableUpdates":false,"type":"customDocumentProperty"},{"propertyName":"IsDocument","propertyValue":"{{Form.TemplateType.IsDocument}}","disableUpdates":false,"type":"customDocumentProperty"},{"propertyName":"IsPresentation","propertyValue":"{{Form.TemplateType.IsPresentation}}","disableUpdates":false,"type":"customDocumentProperty"},{"propertyName":"company","propertyValue":"Ericsson","disableUpdates":false,"type":"documentProperty"},{"propertyName":"PageNumberVisible","propertyValue":"{{Form.TotalPageNo.TotalPageNo_value}}","disableUpdates":false,"type":"customDocumentProperty"},{"propertyName":"Revision","propertyValue":"{{Form.Revision}}","disableUpdates":false,"type":"customDocumentProperty"},{"propertyName":"DocType","propertyValue":"{{Form.DocTypePresentation}}","disableUpdates":false,"type":"customDocumentProperty"},{"propertyName":"TemplateVersion","propertyValue":"R2A","disableUpdates":false,"type":"customDocumentProperty"},{"propertyName":"PackageNo","propertyValue":"LXA 119 603","disableUpdates":false,"type":"customDocumentProperty"},{"propertyName":"PackageVersion","propertyValue":"R6B","disableUpdates":false,"type":"customDocumentProperty"},{"propertyName":"TemplateName","propertyValue":"CXC 173 2731/1","disableUpdates":false,"type":"customDocumentProperty"},{"propertyName":"DocName","propertyValue":" ","disableUpdates":false,"type":"customDocumentProperty"},{"propertyName":"description","propertyValue":"{{Form.DocumentNumber}} {{Form.LanguageCode.LanguageCode}}\nRev {{Form.Revision}}","disableUpdates":false,"type":"documentProperty"}],"templateName":"New presentation (Standard landscape)","templateDescription":"","enableDocumentContentUpdater":true,"version":"1.9"}]]></TemplafyTemplateConfiguration>
-</file>
-
-<file path=customXml/item19.xml><?xml version="1.0" encoding="utf-8"?>
-<TemplafySlideFormConfiguration><![CDATA[{"formFields":[],"formDataEntries":[]}]]></TemplafySlideFormConfiguration>
-</file>
-
-<file path=customXml/item2.xml><?xml version="1.0" encoding="utf-8"?>
-<TemplafyFormConfiguration><![CDATA[{"formFields":[{"required":true,"placeholder":"","lines":0,"type":"textBox","name":"DocumentTitle","label":"Document Title","helpTexts":{"prefix":"","postfix":""},"spacing":{},"fullyQualifiedName":"DocumentTitle"},{"dataSource":"Confidentiality","displayColumn":"confidentiality","hideIfNoUserInteractionRequired":false,"distinct":true,"required":true,"autoSelectFirstOption":false,"type":"dropDown","name":"ConfidentialityClass","label":"Confidentiality Class","helpTexts":{"prefix":"","postfix":""},"spacing":{},"fullyQualifiedName":"ConfidentialityClass"},{"dataSource":"External Confidentiality label","displayColumn":"externalConfidentiality","hideIfNoUserInteractionRequired":false,"distinct":true,"required":false,"autoSelectFirstOption":false,"defaultValue":"1","type":"dropDown","name":"ExternalConfidentialityLabel","label":"External Confidentiality label","helpTexts":{"prefix":"","postfix":"If no external confidentiality class then please choose the blank value"},"spacing":{},"fullyQualifiedName":"ExternalConfidentialityLabel"},{"dataSource":"PowerPoint Document Type","column":"documentType","required":false,"placeholder":"","autoSelectFirstOption":false,"type":"comboBox","name":"DocTypePresentation","label":"Document Type Presentation","helpTexts":{"prefix":"","postfix":"If the document type differs from the default value, click on the X to delete and type/choose another type."},"spacing":{},"fullyQualifiedName":"DocTypePresentation"},{"required":false,"placeholder":"","lines":0,"type":"textBox","name":"DocumentNumber","label":"Document Number","helpTexts":{"prefix":"","postfix":""},"spacing":{},"fullyQualifiedName":"DocumentNumber"},{"dataSource":"Language code","displayColumn":"showName","hideIfNoUserInteractionRequired":false,"distinct":true,"required":false,"autoSelectFirstOption":false,"defaultValue":"1","type":"dropDown","name":"LanguageCode","label":"Language Code","helpTexts":{"prefix":"","postfix":"The language code will be appended to the Document No."},"spacing":{},"fullyQualifiedName":"LanguageCode"},{"dataSource":"Revision","column":"revision","required":false,"placeholder":"","autoSelectFirstOption":false,"type":"comboBox","name":"Revision","label":"Revision","helpTexts":{"prefix":"","postfix":""},"spacing":{},"fullyQualifiedName":"Revision"},{"required":false,"type":"datePicker","name":"Date","label":"Date","helpTexts":{"prefix":"","postfix":""},"spacing":{},"fullyQualifiedName":"Date"},{"type":"heading","name":"FooterVisibilityOptions","label":"Footer Visibility Options","helpTexts":{"prefix":"","postfix":""},"spacing":{},"fullyQualifiedName":"FooterVisibilityOptions"},{"dataSource":"PPT FooterVisibility","displayColumn":"templateType","hideIfNoUserInteractionRequired":false,"distinct":true,"required":true,"autoSelectFirstOption":false,"defaultValue":"1","type":"dropDown","name":"TemplateType","label":"Is this a document or presentation?","helpTexts":{"prefix":"","postfix":""},"spacing":{},"fullyQualifiedName":"TemplateType"},{"dataSource":"PPT FooterVisibility","displayColumn":"docTitle_label","hideIfNoUserInteractionRequired":false,"distinct":true,"required":false,"autoSelectFirstOption":true,"filter":{"column":"templateType","otherFieldName":"TemplateType","fullyQualifiedOtherFieldName":"TemplateType","otherFieldColumn":"TemplateType","formReference":"none","operator":"equals"},"type":"dropDown","name":"DocTitle","label":"Show document title in footer?","helpTexts":{"prefix":"","postfix":""},"spacing":{},"fullyQualifiedName":"DocTitle"},{"dataSource":"PPT FooterVisibility","displayColumn":"totalPageNo_text","hideIfNoUserInteractionRequired":false,"distinct":true,"required":false,"autoSelectFirstOption":true,"filter":{"column":"templateType","otherFieldName":"TemplateType","fullyQualifiedOtherFieldName":"TemplateType","otherFieldColumn":"TemplateType","formReference":"none","operator":"equals"},"type":"dropDown","name":"TotalPageNo","label":"Page numbering","helpTexts":{"prefix":"","postfix":""},"spacing":{},"fullyQualifiedName":"TotalPageNo"},{"required":false,"placeholder":"","lines":0,"defaultValue":"{{UserProfile.Prepared}}","type":"textBox","name":"Prepared","label":"Prepared By (Subject Responsible)","helpTexts":{"prefix":"","postfix":""},"spacing":{},"fullyQualifiedName":"Prepared"},{"required":false,"placeholder":"","lines":0,"type":"textBox","name":"ApprovedBy","label":"Approved By (Document Responsible)","helpTexts":{"prefix":"","postfix":""},"spacing":{},"fullyQualifiedName":"ApprovedBy"},{"required":false,"placeholder":"","lines":0,"type":"textBox","name":"Checked","label":"Checked","helpTexts":{"prefix":"","postfix":""},"spacing":{},"fullyQualifiedName":"Checked"},{"required":false,"placeholder":"","lines":0,"type":"textBox","name":"Reference","label":"Reference","helpTexts":{"prefix":"","postfix":""},"spacing":{},"fullyQualifiedName":"Reference"},{"required":false,"placeholder":"","lines":0,"type":"textBox","name":"Keywords","label":"Keywords","helpTexts":{"prefix":"","postfix":""},"spacing":{},"fullyQualifiedName":"Keywords"}],"formDataEntries":[{"name":"DocumentTitle","value":"HfKMJ7wB7KPEWJpFWibMqg=="},{"name":"ConfidentialityClass","value":"cT/FOwTWaPknrhRlNMh4SQ=="},{"name":"ExternalConfidentialityLabel","value":"u2D/MG3wyuAQhkGvE2fPaA=="},{"name":"LanguageCode","value":"5wlu7ZdPxHQj1W0w+yTNSg=="},{"name":"Date","value":"vb48xUhp/+BouvbbBJesXw=="},{"name":"TemplateType","value":"PxVEvJY8nE7m/hY9622Sng=="},{"name":"DocTitle","value":"PxVEvJY8nE7m/hY9622Sng=="},{"name":"TotalPageNo","value":"PxVEvJY8nE7m/hY9622Sng=="},{"name":"Prepared","value":"PqdHBiLjqdpOMxfLUK9Tonaq9XwuinzCFKYJ7RK3+SI="}]}]]></TemplafyFormConfiguration>
-</file>
-
-<file path=customXml/item3.xml><?xml version="1.0" encoding="utf-8"?>
 <ct:contentTypeSchema xmlns:ct="http://schemas.microsoft.com/office/2006/metadata/contentType" xmlns:ma="http://schemas.microsoft.com/office/2006/metadata/properties/metaAttributes" ct:_="" ma:_="" ma:contentTypeName="Document" ma:contentTypeID="0x0101002C8661F604A9A64C9627B875CBEE0D49" ma:contentTypeVersion="13" ma:contentTypeDescription="Create a new document." ma:contentTypeScope="" ma:versionID="efb89547655977800231d60c8e2388d5">
   <xsd:schema xmlns:xsd="http://www.w3.org/2001/XMLSchema" xmlns:xs="http://www.w3.org/2001/XMLSchema" xmlns:p="http://schemas.microsoft.com/office/2006/metadata/properties" xmlns:ns3="92e1255f-bb7b-4dc9-b051-584cc104eb44" xmlns:ns4="a6550eff-0fc9-443f-8e77-72cbcf778382" targetNamespace="http://schemas.microsoft.com/office/2006/metadata/properties" ma:root="true" ma:fieldsID="5147822fdb6803771ba7305cbc438486" ns3:_="" ns4:_="">
     <xsd:import namespace="92e1255f-bb7b-4dc9-b051-584cc104eb44"/>
@@ -27766,110 +27696,95 @@
 </ct:contentTypeSchema>
 </file>
 
+<file path=customXml/item16.xml><?xml version="1.0" encoding="utf-8"?>
+<TemplafySlideFormConfiguration><![CDATA[{"formFields":[],"formDataEntries":[]}]]></TemplafySlideFormConfiguration>
+</file>
+
+<file path=customXml/item17.xml><?xml version="1.0" encoding="utf-8"?>
+<TemplafySlideFormConfiguration><![CDATA[{"formFields":[],"formDataEntries":[]}]]></TemplafySlideFormConfiguration>
+</file>
+
+<file path=customXml/item18.xml><?xml version="1.0" encoding="utf-8"?>
+<TemplafySlideTemplateConfiguration><![CDATA[{"documentContentValidatorConfiguration":{"enableDocumentContentValidator":false,"documentContentValidatorVersion":0},"elementsMetadata":[],"slideId":"637037983905221558","enableDocumentContentUpdater":true,"version":"1.9"}]]></TemplafySlideTemplateConfiguration>
+</file>
+
+<file path=customXml/item19.xml><?xml version="1.0" encoding="utf-8"?>
+<TemplafySlideFormConfiguration><![CDATA[{"formFields":[],"formDataEntries":[]}]]></TemplafySlideFormConfiguration>
+</file>
+
+<file path=customXml/item2.xml><?xml version="1.0" encoding="utf-8"?>
+<TemplafyTemplateConfiguration><![CDATA[{"elementsMetadata":[{"type":"shape","id":"5d67e717-74bf-41a6-8dce-47082e2c1da1","elementConfiguration":{"inheritDimensions":"inheritNone","height":"1.34 cm","binding":"Form.LogoInsertion.Pplogoname","disableUpdates":false,"type":"image"}}],"transformationConfigurations":[{"language":"{{DocumentLanguage}}","disableUpdates":false,"type":"proofingLanguage"},{"propertyName":"FooterText","propertyValue":"true","disableUpdates":false,"type":"customDocumentProperty"},{"propertyName":"SecurityClass","propertyValue":"{{Form.ConfidentialityClass.Confidentiality}}","disableUpdates":false,"type":"customDocumentProperty"},{"propertyName":"ExtConf","propertyValue":"{{Form.ExternalConfidentialityLabel.ExternalConfidentiality}}","disableUpdates":false,"type":"customDocumentProperty"},{"propertyName":"Prepared","propertyValue":"{{Form.Prepared}}","disableUpdates":false,"type":"customDocumentProperty"},{"propertyName":"ApprovedBy","propertyValue":"{{Form.ApprovedBy}}","disableUpdates":false,"type":"customDocumentProperty"},{"propertyName":"DocNo","propertyValue":"{{Form.DocumentNumber}} {{Form.LanguageCode.LanguageCode}}","disableUpdates":false,"type":"customDocumentProperty"},{"propertyName":"Checked","propertyValue":"{{Form.Checked}}","disableUpdates":false,"type":"customDocumentProperty"},{"propertyName":"Date","propertyValue":"{{Form.Date}}","disableUpdates":false,"type":"customDocumentProperty"},{"propertyName":"Reference","propertyValue":"{{Form.Reference}}","disableUpdates":false,"type":"customDocumentProperty"},{"propertyName":"Title","propertyValue":"{{Form.DocumentTitle}}","disableUpdates":false,"type":"customDocumentProperty"},{"propertyName":"Keyword","propertyValue":"{{Form.Keywords}}","disableUpdates":false,"type":"customDocumentProperty"},{"propertyName":"DocumentType","propertyValue":"Presentation2011","disableUpdates":false,"type":"customDocumentProperty"},{"propertyName":"Language","propertyValue":"EnglishUS","disableUpdates":false,"type":"customDocumentProperty"},{"propertyName":"TemplateID","propertyValue":"FALSE","disableUpdates":false,"type":"customDocumentProperty"},{"propertyName":"ConfCtrl","propertyValue":"FALSE","disableUpdates":false,"type":"customDocumentProperty"},{"propertyName":"title","propertyValue":"{{Form.DocumentTitle}}","disableUpdates":false,"type":"documentProperty"},{"propertyName":"keywords","propertyValue":"{{Form.Keywords}}","disableUpdates":false,"type":"documentProperty"},{"propertyName":"creator","propertyValue":"{{Form.Prepared}}","disableUpdates":false,"type":"documentProperty"},{"propertyName":"DocTitle","propertyValue":"{{Form.DocTitle.DocTitle}}","disableUpdates":false,"type":"customDocumentProperty"},{"propertyName":"IsDocument","propertyValue":"{{Form.TemplateType.IsDocument}}","disableUpdates":false,"type":"customDocumentProperty"},{"propertyName":"IsPresentation","propertyValue":"{{Form.TemplateType.IsPresentation}}","disableUpdates":false,"type":"customDocumentProperty"},{"propertyName":"company","propertyValue":"Ericsson","disableUpdates":false,"type":"documentProperty"},{"propertyName":"PageNumberVisible","propertyValue":"{{Form.TotalPageNo.TotalPageNo_value}}","disableUpdates":false,"type":"customDocumentProperty"},{"propertyName":"Revision","propertyValue":"{{Form.Revision}}","disableUpdates":false,"type":"customDocumentProperty"},{"propertyName":"DocType","propertyValue":"{{Form.DocTypePresentation}}","disableUpdates":false,"type":"customDocumentProperty"},{"propertyName":"TemplateVersion","propertyValue":"R2A","disableUpdates":false,"type":"customDocumentProperty"},{"propertyName":"PackageNo","propertyValue":"LXA 119 603","disableUpdates":false,"type":"customDocumentProperty"},{"propertyName":"PackageVersion","propertyValue":"R6B","disableUpdates":false,"type":"customDocumentProperty"},{"propertyName":"TemplateName","propertyValue":"CXC 173 2731/1","disableUpdates":false,"type":"customDocumentProperty"},{"propertyName":"DocName","propertyValue":" ","disableUpdates":false,"type":"customDocumentProperty"},{"propertyName":"description","propertyValue":"{{Form.DocumentNumber}} {{Form.LanguageCode.LanguageCode}}\nRev {{Form.Revision}}","disableUpdates":false,"type":"documentProperty"}],"templateName":"New presentation (Standard landscape)","templateDescription":"","enableDocumentContentUpdater":true,"version":"1.9"}]]></TemplafyTemplateConfiguration>
+</file>
+
+<file path=customXml/item3.xml><?xml version="1.0" encoding="utf-8"?>
+<TemplafySlideFormConfiguration><![CDATA[{"formFields":[],"formDataEntries":[]}]]></TemplafySlideFormConfiguration>
+</file>
+
 <file path=customXml/item4.xml><?xml version="1.0" encoding="utf-8"?>
-<?mso-contentType ?>
-<FormTemplates xmlns="http://schemas.microsoft.com/sharepoint/v3/contenttype/forms">
-  <Display>DocumentLibraryForm</Display>
-  <Edit>DocumentLibraryForm</Edit>
-  <New>DocumentLibraryForm</New>
-</FormTemplates>
+<TemplafyFormConfiguration><![CDATA[{"formFields":[{"required":true,"placeholder":"","lines":0,"type":"textBox","name":"DocumentTitle","label":"Document Title","helpTexts":{"prefix":"","postfix":""},"spacing":{},"fullyQualifiedName":"DocumentTitle"},{"dataSource":"Confidentiality","displayColumn":"confidentiality","hideIfNoUserInteractionRequired":false,"distinct":true,"required":true,"autoSelectFirstOption":false,"type":"dropDown","name":"ConfidentialityClass","label":"Confidentiality Class","helpTexts":{"prefix":"","postfix":""},"spacing":{},"fullyQualifiedName":"ConfidentialityClass"},{"dataSource":"External Confidentiality label","displayColumn":"externalConfidentiality","hideIfNoUserInteractionRequired":false,"distinct":true,"required":false,"autoSelectFirstOption":false,"defaultValue":"1","type":"dropDown","name":"ExternalConfidentialityLabel","label":"External Confidentiality label","helpTexts":{"prefix":"","postfix":"If no external confidentiality class then please choose the blank value"},"spacing":{},"fullyQualifiedName":"ExternalConfidentialityLabel"},{"dataSource":"PowerPoint Document Type","column":"documentType","required":false,"placeholder":"","autoSelectFirstOption":false,"type":"comboBox","name":"DocTypePresentation","label":"Document Type Presentation","helpTexts":{"prefix":"","postfix":"If the document type differs from the default value, click on the X to delete and type/choose another type."},"spacing":{},"fullyQualifiedName":"DocTypePresentation"},{"required":false,"placeholder":"","lines":0,"type":"textBox","name":"DocumentNumber","label":"Document Number","helpTexts":{"prefix":"","postfix":""},"spacing":{},"fullyQualifiedName":"DocumentNumber"},{"dataSource":"Language code","displayColumn":"showName","hideIfNoUserInteractionRequired":false,"distinct":true,"required":false,"autoSelectFirstOption":false,"defaultValue":"1","type":"dropDown","name":"LanguageCode","label":"Language Code","helpTexts":{"prefix":"","postfix":"The language code will be appended to the Document No."},"spacing":{},"fullyQualifiedName":"LanguageCode"},{"dataSource":"Revision","column":"revision","required":false,"placeholder":"","autoSelectFirstOption":false,"type":"comboBox","name":"Revision","label":"Revision","helpTexts":{"prefix":"","postfix":""},"spacing":{},"fullyQualifiedName":"Revision"},{"required":false,"type":"datePicker","name":"Date","label":"Date","helpTexts":{"prefix":"","postfix":""},"spacing":{},"fullyQualifiedName":"Date"},{"type":"heading","name":"FooterVisibilityOptions","label":"Footer Visibility Options","helpTexts":{"prefix":"","postfix":""},"spacing":{},"fullyQualifiedName":"FooterVisibilityOptions"},{"dataSource":"PPT FooterVisibility","displayColumn":"templateType","hideIfNoUserInteractionRequired":false,"distinct":true,"required":true,"autoSelectFirstOption":false,"defaultValue":"1","type":"dropDown","name":"TemplateType","label":"Is this a document or presentation?","helpTexts":{"prefix":"","postfix":""},"spacing":{},"fullyQualifiedName":"TemplateType"},{"dataSource":"PPT FooterVisibility","displayColumn":"docTitle_label","hideIfNoUserInteractionRequired":false,"distinct":true,"required":false,"autoSelectFirstOption":true,"filter":{"column":"templateType","otherFieldName":"TemplateType","fullyQualifiedOtherFieldName":"TemplateType","otherFieldColumn":"TemplateType","formReference":"none","operator":"equals"},"type":"dropDown","name":"DocTitle","label":"Show document title in footer?","helpTexts":{"prefix":"","postfix":""},"spacing":{},"fullyQualifiedName":"DocTitle"},{"dataSource":"PPT FooterVisibility","displayColumn":"totalPageNo_text","hideIfNoUserInteractionRequired":false,"distinct":true,"required":false,"autoSelectFirstOption":true,"filter":{"column":"templateType","otherFieldName":"TemplateType","fullyQualifiedOtherFieldName":"TemplateType","otherFieldColumn":"TemplateType","formReference":"none","operator":"equals"},"type":"dropDown","name":"TotalPageNo","label":"Page numbering","helpTexts":{"prefix":"","postfix":""},"spacing":{},"fullyQualifiedName":"TotalPageNo"},{"required":false,"placeholder":"","lines":0,"defaultValue":"{{UserProfile.Prepared}}","type":"textBox","name":"Prepared","label":"Prepared By (Subject Responsible)","helpTexts":{"prefix":"","postfix":""},"spacing":{},"fullyQualifiedName":"Prepared"},{"required":false,"placeholder":"","lines":0,"type":"textBox","name":"ApprovedBy","label":"Approved By (Document Responsible)","helpTexts":{"prefix":"","postfix":""},"spacing":{},"fullyQualifiedName":"ApprovedBy"},{"required":false,"placeholder":"","lines":0,"type":"textBox","name":"Checked","label":"Checked","helpTexts":{"prefix":"","postfix":""},"spacing":{},"fullyQualifiedName":"Checked"},{"required":false,"placeholder":"","lines":0,"type":"textBox","name":"Reference","label":"Reference","helpTexts":{"prefix":"","postfix":""},"spacing":{},"fullyQualifiedName":"Reference"},{"required":false,"placeholder":"","lines":0,"type":"textBox","name":"Keywords","label":"Keywords","helpTexts":{"prefix":"","postfix":""},"spacing":{},"fullyQualifiedName":"Keywords"}],"formDataEntries":[{"name":"DocumentTitle","value":"HfKMJ7wB7KPEWJpFWibMqg=="},{"name":"ConfidentialityClass","value":"cT/FOwTWaPknrhRlNMh4SQ=="},{"name":"ExternalConfidentialityLabel","value":"u2D/MG3wyuAQhkGvE2fPaA=="},{"name":"LanguageCode","value":"5wlu7ZdPxHQj1W0w+yTNSg=="},{"name":"Date","value":"vb48xUhp/+BouvbbBJesXw=="},{"name":"TemplateType","value":"PxVEvJY8nE7m/hY9622Sng=="},{"name":"DocTitle","value":"PxVEvJY8nE7m/hY9622Sng=="},{"name":"TotalPageNo","value":"PxVEvJY8nE7m/hY9622Sng=="},{"name":"Prepared","value":"PqdHBiLjqdpOMxfLUK9Tonaq9XwuinzCFKYJ7RK3+SI="}]}]]></TemplafyFormConfiguration>
 </file>
 
 <file path=customXml/item5.xml><?xml version="1.0" encoding="utf-8"?>
+<TemplafySlideTemplateConfiguration><![CDATA[{"documentContentValidatorConfiguration":{"enableDocumentContentValidator":false,"documentContentValidatorVersion":0},"elementsMetadata":[],"slideId":"637171128435180813","enableDocumentContentUpdater":true,"version":"1.9"}]]></TemplafySlideTemplateConfiguration>
+</file>
+
+<file path=customXml/item6.xml><?xml version="1.0" encoding="utf-8"?>
+<TemplafySlideTemplateConfiguration><![CDATA[{"documentContentValidatorConfiguration":{"enableDocumentContentValidator":false,"documentContentValidatorVersion":0},"elementsMetadata":[],"slideId":"637037983905678162","enableDocumentContentUpdater":true,"version":"1.9"}]]></TemplafySlideTemplateConfiguration>
+</file>
+
+<file path=customXml/item7.xml><?xml version="1.0" encoding="utf-8"?>
 <p:properties xmlns:p="http://schemas.microsoft.com/office/2006/metadata/properties" xmlns:xsi="http://www.w3.org/2001/XMLSchema-instance" xmlns:pc="http://schemas.microsoft.com/office/infopath/2007/PartnerControls">
   <documentManagement/>
 </p:properties>
 </file>
 
-<file path=customXml/item6.xml><?xml version="1.0" encoding="utf-8"?>
-<TemplafySlideFormConfiguration><![CDATA[{"formFields":[],"formDataEntries":[]}]]></TemplafySlideFormConfiguration>
-</file>
-
-<file path=customXml/item7.xml><?xml version="1.0" encoding="utf-8"?>
-<TemplafySlideFormConfiguration><![CDATA[{"formFields":[],"formDataEntries":[]}]]></TemplafySlideFormConfiguration>
-</file>
-
 <file path=customXml/item8.xml><?xml version="1.0" encoding="utf-8"?>
-<TemplafySlideTemplateConfiguration><![CDATA[{"documentContentValidatorConfiguration":{"enableDocumentContentValidator":false,"documentContentValidatorVersion":0},"elementsMetadata":[],"slideId":"637037983905221557","enableDocumentContentUpdater":true,"version":"1.9"}]]></TemplafySlideTemplateConfiguration>
+<TemplafySlideTemplateConfiguration><![CDATA[{"documentContentValidatorConfiguration":{"enableDocumentContentValidator":false,"documentContentValidatorVersion":0},"elementsMetadata":[],"slideId":"637171128435648944","enableDocumentContentUpdater":true,"version":"1.9"}]]></TemplafySlideTemplateConfiguration>
 </file>
 
 <file path=customXml/item9.xml><?xml version="1.0" encoding="utf-8"?>
-<TemplafySlideTemplateConfiguration><![CDATA[{"elementsMetadata":[],"documentContentValidatorConfiguration":{"enableDocumentContentValidator":false,"documentContentValidatorVersion":0},"slideId":"637027476704980324","enableDocumentContentUpdater":true,"version":"1.9"}]]></TemplafySlideTemplateConfiguration>
+<TemplafySlideTemplateConfiguration><![CDATA[{"documentContentValidatorConfiguration":{"enableDocumentContentValidator":false,"documentContentValidatorVersion":0},"elementsMetadata":[],"slideId":"637050925554934895","enableDocumentContentUpdater":true,"version":"1.9"}]]></TemplafySlideTemplateConfiguration>
 </file>
 
 <file path=customXml/itemProps1.xml><?xml version="1.0" encoding="utf-8"?>
-<ds:datastoreItem xmlns:ds="http://schemas.openxmlformats.org/officeDocument/2006/customXml" ds:itemID="{683FEB75-8CFA-449C-A6B1-B1E4A86A58A1}">
+<ds:datastoreItem xmlns:ds="http://schemas.openxmlformats.org/officeDocument/2006/customXml" ds:itemID="{C99E78A0-C9D4-446F-B674-4DD3E2B46C5D}">
   <ds:schemaRefs/>
 </ds:datastoreItem>
 </file>
 
 <file path=customXml/itemProps10.xml><?xml version="1.0" encoding="utf-8"?>
-<ds:datastoreItem xmlns:ds="http://schemas.openxmlformats.org/officeDocument/2006/customXml" ds:itemID="{03AF3FDC-ACD1-46F3-A43E-782322DF9816}">
+<ds:datastoreItem xmlns:ds="http://schemas.openxmlformats.org/officeDocument/2006/customXml" ds:itemID="{B9AEDDE3-EA02-4A8F-B8F8-0606A0AA45FC}">
   <ds:schemaRefs/>
 </ds:datastoreItem>
 </file>
 
 <file path=customXml/itemProps11.xml><?xml version="1.0" encoding="utf-8"?>
-<ds:datastoreItem xmlns:ds="http://schemas.openxmlformats.org/officeDocument/2006/customXml" ds:itemID="{1CE36EA9-2186-4EB1-871A-8AE59C2A13BB}">
-  <ds:schemaRefs/>
+<ds:datastoreItem xmlns:ds="http://schemas.openxmlformats.org/officeDocument/2006/customXml" ds:itemID="{F5A7E41D-6E7F-4B05-AFAB-F540BD4C068B}">
+  <ds:schemaRefs>
+    <ds:schemaRef ds:uri="http://schemas.microsoft.com/sharepoint/v3/contenttype/forms"/>
+  </ds:schemaRefs>
 </ds:datastoreItem>
 </file>
 
 <file path=customXml/itemProps12.xml><?xml version="1.0" encoding="utf-8"?>
-<ds:datastoreItem xmlns:ds="http://schemas.openxmlformats.org/officeDocument/2006/customXml" ds:itemID="{58CC0B31-82B9-497A-9A2E-F3F72D0BBDAD}">
+<ds:datastoreItem xmlns:ds="http://schemas.openxmlformats.org/officeDocument/2006/customXml" ds:itemID="{C09F197C-6A49-47D0-B877-F88807989676}">
   <ds:schemaRefs/>
 </ds:datastoreItem>
 </file>
 
 <file path=customXml/itemProps13.xml><?xml version="1.0" encoding="utf-8"?>
-<ds:datastoreItem xmlns:ds="http://schemas.openxmlformats.org/officeDocument/2006/customXml" ds:itemID="{C99E78A0-C9D4-446F-B674-4DD3E2B46C5D}">
+<ds:datastoreItem xmlns:ds="http://schemas.openxmlformats.org/officeDocument/2006/customXml" ds:itemID="{32BA7684-6BE4-4F73-B22E-30934AB379B8}">
   <ds:schemaRefs/>
 </ds:datastoreItem>
 </file>
 
 <file path=customXml/itemProps14.xml><?xml version="1.0" encoding="utf-8"?>
-<ds:datastoreItem xmlns:ds="http://schemas.openxmlformats.org/officeDocument/2006/customXml" ds:itemID="{32BA7684-6BE4-4F73-B22E-30934AB379B8}">
+<ds:datastoreItem xmlns:ds="http://schemas.openxmlformats.org/officeDocument/2006/customXml" ds:itemID="{72516535-7702-46AF-9B1F-8623A67A824E}">
   <ds:schemaRefs/>
 </ds:datastoreItem>
 </file>
 
 <file path=customXml/itemProps15.xml><?xml version="1.0" encoding="utf-8"?>
-<ds:datastoreItem xmlns:ds="http://schemas.openxmlformats.org/officeDocument/2006/customXml" ds:itemID="{C750C5DC-043F-4BD3-940C-EB6F7625E286}">
-  <ds:schemaRefs/>
-</ds:datastoreItem>
-</file>
-
-<file path=customXml/itemProps16.xml><?xml version="1.0" encoding="utf-8"?>
-<ds:datastoreItem xmlns:ds="http://schemas.openxmlformats.org/officeDocument/2006/customXml" ds:itemID="{AB2F4486-6448-49E3-8249-BB9C7492711D}">
-  <ds:schemaRefs/>
-</ds:datastoreItem>
-</file>
-
-<file path=customXml/itemProps17.xml><?xml version="1.0" encoding="utf-8"?>
-<ds:datastoreItem xmlns:ds="http://schemas.openxmlformats.org/officeDocument/2006/customXml" ds:itemID="{847502A6-7CBE-43AF-BDF6-4D4423521D8C}">
-  <ds:schemaRefs/>
-</ds:datastoreItem>
-</file>
-
-<file path=customXml/itemProps18.xml><?xml version="1.0" encoding="utf-8"?>
-<ds:datastoreItem xmlns:ds="http://schemas.openxmlformats.org/officeDocument/2006/customXml" ds:itemID="{07958A4E-FAB1-42E4-B6B5-29B01F63F87B}">
-  <ds:schemaRefs/>
-</ds:datastoreItem>
-</file>
-
-<file path=customXml/itemProps19.xml><?xml version="1.0" encoding="utf-8"?>
-<ds:datastoreItem xmlns:ds="http://schemas.openxmlformats.org/officeDocument/2006/customXml" ds:itemID="{B9AEDDE3-EA02-4A8F-B8F8-0606A0AA45FC}">
-  <ds:schemaRefs/>
-</ds:datastoreItem>
-</file>
-
-<file path=customXml/itemProps2.xml><?xml version="1.0" encoding="utf-8"?>
-<ds:datastoreItem xmlns:ds="http://schemas.openxmlformats.org/officeDocument/2006/customXml" ds:itemID="{D92C3DF5-A179-4E2D-BD20-07044B39171F}">
-  <ds:schemaRefs/>
-</ds:datastoreItem>
-</file>
-
-<file path=customXml/itemProps3.xml><?xml version="1.0" encoding="utf-8"?>
 <ds:datastoreItem xmlns:ds="http://schemas.openxmlformats.org/officeDocument/2006/customXml" ds:itemID="{058EED06-94C4-4781-888F-0A8BB816BC9F}">
   <ds:schemaRefs>
     <ds:schemaRef ds:uri="http://schemas.microsoft.com/office/2006/metadata/contentType"/>
@@ -27888,15 +27803,61 @@
 </ds:datastoreItem>
 </file>
 
+<file path=customXml/itemProps16.xml><?xml version="1.0" encoding="utf-8"?>
+<ds:datastoreItem xmlns:ds="http://schemas.openxmlformats.org/officeDocument/2006/customXml" ds:itemID="{58CC0B31-82B9-497A-9A2E-F3F72D0BBDAD}">
+  <ds:schemaRefs/>
+</ds:datastoreItem>
+</file>
+
+<file path=customXml/itemProps17.xml><?xml version="1.0" encoding="utf-8"?>
+<ds:datastoreItem xmlns:ds="http://schemas.openxmlformats.org/officeDocument/2006/customXml" ds:itemID="{847502A6-7CBE-43AF-BDF6-4D4423521D8C}">
+  <ds:schemaRefs/>
+</ds:datastoreItem>
+</file>
+
+<file path=customXml/itemProps18.xml><?xml version="1.0" encoding="utf-8"?>
+<ds:datastoreItem xmlns:ds="http://schemas.openxmlformats.org/officeDocument/2006/customXml" ds:itemID="{683FEB75-8CFA-449C-A6B1-B1E4A86A58A1}">
+  <ds:schemaRefs/>
+</ds:datastoreItem>
+</file>
+
+<file path=customXml/itemProps19.xml><?xml version="1.0" encoding="utf-8"?>
+<ds:datastoreItem xmlns:ds="http://schemas.openxmlformats.org/officeDocument/2006/customXml" ds:itemID="{D72A95EB-8536-47FD-944A-8DD76726FC96}">
+  <ds:schemaRefs/>
+</ds:datastoreItem>
+</file>
+
+<file path=customXml/itemProps2.xml><?xml version="1.0" encoding="utf-8"?>
+<ds:datastoreItem xmlns:ds="http://schemas.openxmlformats.org/officeDocument/2006/customXml" ds:itemID="{07958A4E-FAB1-42E4-B6B5-29B01F63F87B}">
+  <ds:schemaRefs/>
+</ds:datastoreItem>
+</file>
+
+<file path=customXml/itemProps3.xml><?xml version="1.0" encoding="utf-8"?>
+<ds:datastoreItem xmlns:ds="http://schemas.openxmlformats.org/officeDocument/2006/customXml" ds:itemID="{822D38AD-8010-4CD3-BD6B-117CB8DF70A4}">
+  <ds:schemaRefs/>
+</ds:datastoreItem>
+</file>
+
 <file path=customXml/itemProps4.xml><?xml version="1.0" encoding="utf-8"?>
-<ds:datastoreItem xmlns:ds="http://schemas.openxmlformats.org/officeDocument/2006/customXml" ds:itemID="{F5A7E41D-6E7F-4B05-AFAB-F540BD4C068B}">
-  <ds:schemaRefs>
-    <ds:schemaRef ds:uri="http://schemas.microsoft.com/sharepoint/v3/contenttype/forms"/>
-  </ds:schemaRefs>
+<ds:datastoreItem xmlns:ds="http://schemas.openxmlformats.org/officeDocument/2006/customXml" ds:itemID="{D92C3DF5-A179-4E2D-BD20-07044B39171F}">
+  <ds:schemaRefs/>
 </ds:datastoreItem>
 </file>
 
 <file path=customXml/itemProps5.xml><?xml version="1.0" encoding="utf-8"?>
+<ds:datastoreItem xmlns:ds="http://schemas.openxmlformats.org/officeDocument/2006/customXml" ds:itemID="{AB2F4486-6448-49E3-8249-BB9C7492711D}">
+  <ds:schemaRefs/>
+</ds:datastoreItem>
+</file>
+
+<file path=customXml/itemProps6.xml><?xml version="1.0" encoding="utf-8"?>
+<ds:datastoreItem xmlns:ds="http://schemas.openxmlformats.org/officeDocument/2006/customXml" ds:itemID="{1CE36EA9-2186-4EB1-871A-8AE59C2A13BB}">
+  <ds:schemaRefs/>
+</ds:datastoreItem>
+</file>
+
+<file path=customXml/itemProps7.xml><?xml version="1.0" encoding="utf-8"?>
 <ds:datastoreItem xmlns:ds="http://schemas.openxmlformats.org/officeDocument/2006/customXml" ds:itemID="{56F2EE69-0CCA-4F48-BE22-EC4A886C57A7}">
   <ds:schemaRefs>
     <ds:schemaRef ds:uri="http://schemas.microsoft.com/office/infopath/2007/PartnerControls"/>
@@ -27913,26 +27874,14 @@
 </ds:datastoreItem>
 </file>
 
-<file path=customXml/itemProps6.xml><?xml version="1.0" encoding="utf-8"?>
-<ds:datastoreItem xmlns:ds="http://schemas.openxmlformats.org/officeDocument/2006/customXml" ds:itemID="{D72A95EB-8536-47FD-944A-8DD76726FC96}">
-  <ds:schemaRefs/>
-</ds:datastoreItem>
-</file>
-
-<file path=customXml/itemProps7.xml><?xml version="1.0" encoding="utf-8"?>
-<ds:datastoreItem xmlns:ds="http://schemas.openxmlformats.org/officeDocument/2006/customXml" ds:itemID="{822D38AD-8010-4CD3-BD6B-117CB8DF70A4}">
-  <ds:schemaRefs/>
-</ds:datastoreItem>
-</file>
-
 <file path=customXml/itemProps8.xml><?xml version="1.0" encoding="utf-8"?>
-<ds:datastoreItem xmlns:ds="http://schemas.openxmlformats.org/officeDocument/2006/customXml" ds:itemID="{72516535-7702-46AF-9B1F-8623A67A824E}">
+<ds:datastoreItem xmlns:ds="http://schemas.openxmlformats.org/officeDocument/2006/customXml" ds:itemID="{C750C5DC-043F-4BD3-940C-EB6F7625E286}">
   <ds:schemaRefs/>
 </ds:datastoreItem>
 </file>
 
 <file path=customXml/itemProps9.xml><?xml version="1.0" encoding="utf-8"?>
-<ds:datastoreItem xmlns:ds="http://schemas.openxmlformats.org/officeDocument/2006/customXml" ds:itemID="{C09F197C-6A49-47D0-B877-F88807989676}">
+<ds:datastoreItem xmlns:ds="http://schemas.openxmlformats.org/officeDocument/2006/customXml" ds:itemID="{03AF3FDC-ACD1-46F3-A43E-782322DF9816}">
   <ds:schemaRefs/>
 </ds:datastoreItem>
 </file>
</xml_diff>